<commit_message>
updated 2nd half, title slide, formatting
</commit_message>
<xml_diff>
--- a/QMO_2019_prepsentation_draft1.pptx
+++ b/QMO_2019_prepsentation_draft1.pptx
@@ -13,10 +13,10 @@
     <p:sldMasterId id="2147483849" r:id="rId9"/>
   </p:sldMasterIdLst>
   <p:notesMasterIdLst>
-    <p:notesMasterId r:id="rId22"/>
+    <p:notesMasterId r:id="rId24"/>
   </p:notesMasterIdLst>
   <p:handoutMasterIdLst>
-    <p:handoutMasterId r:id="rId23"/>
+    <p:handoutMasterId r:id="rId25"/>
   </p:handoutMasterIdLst>
   <p:sldIdLst>
     <p:sldId id="256" r:id="rId10"/>
@@ -26,11 +26,13 @@
     <p:sldId id="261" r:id="rId14"/>
     <p:sldId id="271" r:id="rId15"/>
     <p:sldId id="272" r:id="rId16"/>
-    <p:sldId id="273" r:id="rId17"/>
-    <p:sldId id="274" r:id="rId18"/>
-    <p:sldId id="275" r:id="rId19"/>
-    <p:sldId id="277" r:id="rId20"/>
-    <p:sldId id="263" r:id="rId21"/>
+    <p:sldId id="278" r:id="rId17"/>
+    <p:sldId id="273" r:id="rId18"/>
+    <p:sldId id="279" r:id="rId19"/>
+    <p:sldId id="274" r:id="rId20"/>
+    <p:sldId id="275" r:id="rId21"/>
+    <p:sldId id="277" r:id="rId22"/>
+    <p:sldId id="263" r:id="rId23"/>
   </p:sldIdLst>
   <p:sldSz cx="9144000" cy="6858000" type="screen4x3"/>
   <p:notesSz cx="7099300" cy="10234613"/>
@@ -297,7 +299,7 @@
               <a:rPr lang="de-DE" smtClean="0">
                 <a:latin typeface="Arial" panose="020B0604020202020204" pitchFamily="34" charset="0"/>
               </a:rPr>
-              <a:t>15.05.2019</a:t>
+              <a:t>17.05.2019</a:t>
             </a:fld>
             <a:endParaRPr lang="de-DE" dirty="0">
               <a:latin typeface="Arial" panose="020B0604020202020204" pitchFamily="34" charset="0"/>
@@ -476,7 +478,7 @@
             <a:fld id="{BCDB334D-D17F-49C4-91DD-37BB7E818209}" type="datetimeFigureOut">
               <a:rPr lang="de-CH" smtClean="0"/>
               <a:pPr/>
-              <a:t>15.05.2019</a:t>
+              <a:t>17.05.2019</a:t>
             </a:fld>
             <a:endParaRPr lang="de-CH" dirty="0"/>
           </a:p>
@@ -905,31 +907,10 @@
           <a:lstStyle/>
           <a:p>
             <a:r>
-              <a:rPr lang="en-GB" dirty="0"/>
-              <a:t>1.12.2014</a:t>
-            </a:r>
-          </a:p>
-        </p:txBody>
-      </p:sp>
-      <p:sp>
-        <p:nvSpPr>
-          <p:cNvPr id="5" name="Fußzeilenplatzhalter 4"/>
-          <p:cNvSpPr>
-            <a:spLocks noGrp="1"/>
-          </p:cNvSpPr>
-          <p:nvPr>
-            <p:ph type="ftr" sz="quarter" idx="11"/>
-          </p:nvPr>
-        </p:nvSpPr>
-        <p:spPr/>
-        <p:txBody>
-          <a:bodyPr/>
-          <a:lstStyle/>
-          <a:p>
-            <a:r>
-              <a:rPr lang="en-GB" dirty="0"/>
-              <a:t>First name Surname (edit via “Insert” &gt; “Header &amp; Footer”)</a:t>
-            </a:r>
+              <a:rPr lang="en-US" smtClean="0"/>
+              <a:t>22.05.2019</a:t>
+            </a:r>
+            <a:endParaRPr lang="en-GB" dirty="0"/>
           </a:p>
         </p:txBody>
       </p:sp>
@@ -1211,9 +1192,10 @@
           <a:lstStyle/>
           <a:p>
             <a:r>
-              <a:rPr lang="en-GB" dirty="0"/>
-              <a:t>1.12.2014</a:t>
-            </a:r>
+              <a:rPr lang="en-US" smtClean="0"/>
+              <a:t>22.05.2019</a:t>
+            </a:r>
+            <a:endParaRPr lang="en-GB" dirty="0"/>
           </a:p>
         </p:txBody>
       </p:sp>
@@ -1232,10 +1214,7 @@
           <a:bodyPr/>
           <a:lstStyle/>
           <a:p>
-            <a:r>
-              <a:rPr lang="en-GB" dirty="0"/>
-              <a:t>First name Surname (edit via “Insert” &gt; “Header &amp; Footer”)</a:t>
-            </a:r>
+            <a:endParaRPr lang="en-GB" dirty="0"/>
           </a:p>
         </p:txBody>
       </p:sp>
@@ -1563,9 +1542,10 @@
           <a:lstStyle/>
           <a:p>
             <a:r>
-              <a:rPr lang="en-GB" dirty="0"/>
-              <a:t>1.12.2014</a:t>
-            </a:r>
+              <a:rPr lang="en-US" smtClean="0"/>
+              <a:t>22.05.2019</a:t>
+            </a:r>
+            <a:endParaRPr lang="en-GB" dirty="0"/>
           </a:p>
         </p:txBody>
       </p:sp>
@@ -1584,10 +1564,7 @@
           <a:bodyPr/>
           <a:lstStyle/>
           <a:p>
-            <a:r>
-              <a:rPr lang="en-GB" dirty="0"/>
-              <a:t>First name Surname (edit via “Insert” &gt; “Header &amp; Footer”)</a:t>
-            </a:r>
+            <a:endParaRPr lang="en-GB" dirty="0"/>
           </a:p>
         </p:txBody>
       </p:sp>
@@ -1860,9 +1837,10 @@
           <a:lstStyle/>
           <a:p>
             <a:r>
-              <a:rPr lang="en-GB" dirty="0"/>
-              <a:t>1.12.2014</a:t>
-            </a:r>
+              <a:rPr lang="en-US" smtClean="0"/>
+              <a:t>22.05.2019</a:t>
+            </a:r>
+            <a:endParaRPr lang="en-GB" dirty="0"/>
           </a:p>
         </p:txBody>
       </p:sp>
@@ -1881,10 +1859,7 @@
           <a:bodyPr/>
           <a:lstStyle/>
           <a:p>
-            <a:r>
-              <a:rPr lang="en-GB" dirty="0"/>
-              <a:t>First name Surname (edit via “Insert” &gt; “Header &amp; Footer”)</a:t>
-            </a:r>
+            <a:endParaRPr lang="en-GB" dirty="0"/>
           </a:p>
         </p:txBody>
       </p:sp>
@@ -3147,9 +3122,10 @@
           <a:lstStyle/>
           <a:p>
             <a:r>
-              <a:rPr lang="en-GB" dirty="0"/>
-              <a:t>1.12.2014</a:t>
-            </a:r>
+              <a:rPr lang="en-US" smtClean="0"/>
+              <a:t>22.05.2019</a:t>
+            </a:r>
+            <a:endParaRPr lang="en-GB" dirty="0"/>
           </a:p>
         </p:txBody>
       </p:sp>
@@ -3168,10 +3144,7 @@
           <a:bodyPr/>
           <a:lstStyle/>
           <a:p>
-            <a:r>
-              <a:rPr lang="en-GB" dirty="0"/>
-              <a:t>First name Surname (edit via “Insert” &gt; “Header &amp; Footer”)</a:t>
-            </a:r>
+            <a:endParaRPr lang="en-GB" dirty="0"/>
           </a:p>
         </p:txBody>
       </p:sp>
@@ -3551,9 +3524,10 @@
           <a:lstStyle/>
           <a:p>
             <a:r>
-              <a:rPr lang="en-GB" dirty="0"/>
-              <a:t>1.12.2014</a:t>
-            </a:r>
+              <a:rPr lang="en-US" smtClean="0"/>
+              <a:t>22.05.2019</a:t>
+            </a:r>
+            <a:endParaRPr lang="en-GB" dirty="0"/>
           </a:p>
         </p:txBody>
       </p:sp>
@@ -3572,10 +3546,7 @@
           <a:bodyPr/>
           <a:lstStyle/>
           <a:p>
-            <a:r>
-              <a:rPr lang="en-GB" dirty="0"/>
-              <a:t>First name Surname (edit via “Insert” &gt; “Header &amp; Footer”)</a:t>
-            </a:r>
+            <a:endParaRPr lang="en-GB" dirty="0"/>
           </a:p>
         </p:txBody>
       </p:sp>
@@ -3681,9 +3652,10 @@
           <a:lstStyle/>
           <a:p>
             <a:r>
-              <a:rPr lang="en-GB" dirty="0"/>
-              <a:t>1.12.2014</a:t>
-            </a:r>
+              <a:rPr lang="en-US" smtClean="0"/>
+              <a:t>22.05.2019</a:t>
+            </a:r>
+            <a:endParaRPr lang="en-GB" dirty="0"/>
           </a:p>
         </p:txBody>
       </p:sp>
@@ -3702,10 +3674,7 @@
           <a:bodyPr/>
           <a:lstStyle/>
           <a:p>
-            <a:r>
-              <a:rPr lang="en-GB" dirty="0"/>
-              <a:t>First name Surname (edit via “Insert” &gt; “Header &amp; Footer”)</a:t>
-            </a:r>
+            <a:endParaRPr lang="en-GB" dirty="0"/>
           </a:p>
         </p:txBody>
       </p:sp>
@@ -3807,9 +3776,10 @@
           <a:lstStyle/>
           <a:p>
             <a:r>
-              <a:rPr lang="en-GB" dirty="0"/>
-              <a:t>1.12.2014</a:t>
-            </a:r>
+              <a:rPr lang="en-US" smtClean="0"/>
+              <a:t>22.05.2019</a:t>
+            </a:r>
+            <a:endParaRPr lang="en-GB" dirty="0"/>
           </a:p>
         </p:txBody>
       </p:sp>
@@ -3828,10 +3798,7 @@
           <a:bodyPr/>
           <a:lstStyle/>
           <a:p>
-            <a:r>
-              <a:rPr lang="en-GB" dirty="0"/>
-              <a:t>First name Surname (edit via “Insert” &gt; “Header &amp; Footer”)</a:t>
-            </a:r>
+            <a:endParaRPr lang="en-GB" dirty="0"/>
           </a:p>
         </p:txBody>
       </p:sp>
@@ -3986,9 +3953,10 @@
           <a:lstStyle/>
           <a:p>
             <a:r>
-              <a:rPr lang="en-GB" dirty="0"/>
-              <a:t>1.12.2014</a:t>
-            </a:r>
+              <a:rPr lang="en-US" smtClean="0"/>
+              <a:t>22.05.2019</a:t>
+            </a:r>
+            <a:endParaRPr lang="en-GB" dirty="0"/>
           </a:p>
         </p:txBody>
       </p:sp>
@@ -4007,10 +3975,7 @@
           <a:bodyPr/>
           <a:lstStyle/>
           <a:p>
-            <a:r>
-              <a:rPr lang="en-GB" dirty="0"/>
-              <a:t>First name Surname (edit via “Insert” &gt; “Header &amp; Footer”)</a:t>
-            </a:r>
+            <a:endParaRPr lang="en-GB" dirty="0"/>
           </a:p>
         </p:txBody>
       </p:sp>
@@ -4238,9 +4203,10 @@
           <a:lstStyle/>
           <a:p>
             <a:r>
-              <a:rPr lang="en-GB" dirty="0"/>
-              <a:t>1.12.2014</a:t>
-            </a:r>
+              <a:rPr lang="en-US" smtClean="0"/>
+              <a:t>22.05.2019</a:t>
+            </a:r>
+            <a:endParaRPr lang="en-GB" dirty="0"/>
           </a:p>
         </p:txBody>
       </p:sp>
@@ -4259,10 +4225,7 @@
           <a:bodyPr/>
           <a:lstStyle/>
           <a:p>
-            <a:r>
-              <a:rPr lang="en-GB" dirty="0"/>
-              <a:t>First name Surname (edit via “Insert” &gt; “Header &amp; Footer”)</a:t>
-            </a:r>
+            <a:endParaRPr lang="en-GB" dirty="0"/>
           </a:p>
         </p:txBody>
       </p:sp>
@@ -4590,31 +4553,10 @@
           <a:lstStyle/>
           <a:p>
             <a:r>
-              <a:rPr lang="en-GB" dirty="0"/>
-              <a:t>1.12.2014</a:t>
-            </a:r>
-          </a:p>
-        </p:txBody>
-      </p:sp>
-      <p:sp>
-        <p:nvSpPr>
-          <p:cNvPr id="5" name="Fußzeilenplatzhalter 4"/>
-          <p:cNvSpPr>
-            <a:spLocks noGrp="1"/>
-          </p:cNvSpPr>
-          <p:nvPr>
-            <p:ph type="ftr" sz="quarter" idx="11"/>
-          </p:nvPr>
-        </p:nvSpPr>
-        <p:spPr/>
-        <p:txBody>
-          <a:bodyPr/>
-          <a:lstStyle/>
-          <a:p>
-            <a:r>
-              <a:rPr lang="en-GB" dirty="0"/>
-              <a:t>First name Surname (edit via “Insert” &gt; “Header &amp; Footer”)</a:t>
-            </a:r>
+              <a:rPr lang="en-US" smtClean="0"/>
+              <a:t>22.05.2019</a:t>
+            </a:r>
+            <a:endParaRPr lang="en-GB" dirty="0"/>
           </a:p>
         </p:txBody>
       </p:sp>
@@ -4891,9 +4833,10 @@
           <a:lstStyle/>
           <a:p>
             <a:r>
-              <a:rPr lang="en-GB" dirty="0"/>
-              <a:t>1.12.2014</a:t>
-            </a:r>
+              <a:rPr lang="en-US" smtClean="0"/>
+              <a:t>22.05.2019</a:t>
+            </a:r>
+            <a:endParaRPr lang="en-GB" dirty="0"/>
           </a:p>
         </p:txBody>
       </p:sp>
@@ -4912,10 +4855,7 @@
           <a:bodyPr/>
           <a:lstStyle/>
           <a:p>
-            <a:r>
-              <a:rPr lang="en-GB" dirty="0"/>
-              <a:t>First name Surname (edit via “Insert” &gt; “Header &amp; Footer”)</a:t>
-            </a:r>
+            <a:endParaRPr lang="en-GB" dirty="0"/>
           </a:p>
         </p:txBody>
       </p:sp>
@@ -5188,9 +5128,10 @@
           <a:lstStyle/>
           <a:p>
             <a:r>
-              <a:rPr lang="en-GB" dirty="0"/>
-              <a:t>1.12.2014</a:t>
-            </a:r>
+              <a:rPr lang="en-US" smtClean="0"/>
+              <a:t>22.05.2019</a:t>
+            </a:r>
+            <a:endParaRPr lang="en-GB" dirty="0"/>
           </a:p>
         </p:txBody>
       </p:sp>
@@ -5209,10 +5150,7 @@
           <a:bodyPr/>
           <a:lstStyle/>
           <a:p>
-            <a:r>
-              <a:rPr lang="en-GB" dirty="0"/>
-              <a:t>First name Surname (edit via “Insert” &gt; “Header &amp; Footer”)</a:t>
-            </a:r>
+            <a:endParaRPr lang="en-GB" dirty="0"/>
           </a:p>
         </p:txBody>
       </p:sp>
@@ -6475,9 +6413,10 @@
           <a:lstStyle/>
           <a:p>
             <a:r>
-              <a:rPr lang="en-GB" dirty="0"/>
-              <a:t>1.12.2014</a:t>
-            </a:r>
+              <a:rPr lang="en-US" smtClean="0"/>
+              <a:t>22.05.2019</a:t>
+            </a:r>
+            <a:endParaRPr lang="en-GB" dirty="0"/>
           </a:p>
         </p:txBody>
       </p:sp>
@@ -6496,10 +6435,7 @@
           <a:bodyPr/>
           <a:lstStyle/>
           <a:p>
-            <a:r>
-              <a:rPr lang="en-GB" dirty="0"/>
-              <a:t>First name Surname (edit via “Insert” &gt; “Header &amp; Footer”)</a:t>
-            </a:r>
+            <a:endParaRPr lang="en-GB" dirty="0"/>
           </a:p>
         </p:txBody>
       </p:sp>
@@ -6879,9 +6815,10 @@
           <a:lstStyle/>
           <a:p>
             <a:r>
-              <a:rPr lang="en-GB" dirty="0"/>
-              <a:t>1.12.2014</a:t>
-            </a:r>
+              <a:rPr lang="en-US" smtClean="0"/>
+              <a:t>22.05.2019</a:t>
+            </a:r>
+            <a:endParaRPr lang="en-GB" dirty="0"/>
           </a:p>
         </p:txBody>
       </p:sp>
@@ -6900,10 +6837,7 @@
           <a:bodyPr/>
           <a:lstStyle/>
           <a:p>
-            <a:r>
-              <a:rPr lang="en-GB" dirty="0"/>
-              <a:t>First name Surname (edit via “Insert” &gt; “Header &amp; Footer”)</a:t>
-            </a:r>
+            <a:endParaRPr lang="en-GB" dirty="0"/>
           </a:p>
         </p:txBody>
       </p:sp>
@@ -7009,9 +6943,10 @@
           <a:lstStyle/>
           <a:p>
             <a:r>
-              <a:rPr lang="en-GB" dirty="0"/>
-              <a:t>1.12.2014</a:t>
-            </a:r>
+              <a:rPr lang="en-US" smtClean="0"/>
+              <a:t>22.05.2019</a:t>
+            </a:r>
+            <a:endParaRPr lang="en-GB" dirty="0"/>
           </a:p>
         </p:txBody>
       </p:sp>
@@ -7030,10 +6965,7 @@
           <a:bodyPr/>
           <a:lstStyle/>
           <a:p>
-            <a:r>
-              <a:rPr lang="en-GB" dirty="0"/>
-              <a:t>First name Surname (edit via “Insert” &gt; “Header &amp; Footer”)</a:t>
-            </a:r>
+            <a:endParaRPr lang="en-GB" dirty="0"/>
           </a:p>
         </p:txBody>
       </p:sp>
@@ -7135,9 +7067,10 @@
           <a:lstStyle/>
           <a:p>
             <a:r>
-              <a:rPr lang="en-GB" dirty="0"/>
-              <a:t>1.12.2014</a:t>
-            </a:r>
+              <a:rPr lang="en-US" smtClean="0"/>
+              <a:t>22.05.2019</a:t>
+            </a:r>
+            <a:endParaRPr lang="en-GB" dirty="0"/>
           </a:p>
         </p:txBody>
       </p:sp>
@@ -7156,10 +7089,7 @@
           <a:bodyPr/>
           <a:lstStyle/>
           <a:p>
-            <a:r>
-              <a:rPr lang="en-GB" dirty="0"/>
-              <a:t>First name Surname (edit via “Insert” &gt; “Header &amp; Footer”)</a:t>
-            </a:r>
+            <a:endParaRPr lang="en-GB" dirty="0"/>
           </a:p>
         </p:txBody>
       </p:sp>
@@ -7314,9 +7244,10 @@
           <a:lstStyle/>
           <a:p>
             <a:r>
-              <a:rPr lang="en-GB" dirty="0"/>
-              <a:t>1.12.2014</a:t>
-            </a:r>
+              <a:rPr lang="en-US" smtClean="0"/>
+              <a:t>22.05.2019</a:t>
+            </a:r>
+            <a:endParaRPr lang="en-GB" dirty="0"/>
           </a:p>
         </p:txBody>
       </p:sp>
@@ -7335,10 +7266,7 @@
           <a:bodyPr/>
           <a:lstStyle/>
           <a:p>
-            <a:r>
-              <a:rPr lang="en-GB" dirty="0"/>
-              <a:t>First name Surname (edit via “Insert” &gt; “Header &amp; Footer”)</a:t>
-            </a:r>
+            <a:endParaRPr lang="en-GB" dirty="0"/>
           </a:p>
         </p:txBody>
       </p:sp>
@@ -7566,9 +7494,10 @@
           <a:lstStyle/>
           <a:p>
             <a:r>
-              <a:rPr lang="en-GB" dirty="0"/>
-              <a:t>1.12.2014</a:t>
-            </a:r>
+              <a:rPr lang="en-US" smtClean="0"/>
+              <a:t>22.05.2019</a:t>
+            </a:r>
+            <a:endParaRPr lang="en-GB" dirty="0"/>
           </a:p>
         </p:txBody>
       </p:sp>
@@ -7587,10 +7516,7 @@
           <a:bodyPr/>
           <a:lstStyle/>
           <a:p>
-            <a:r>
-              <a:rPr lang="en-GB" dirty="0"/>
-              <a:t>First name Surname (edit via “Insert” &gt; “Header &amp; Footer”)</a:t>
-            </a:r>
+            <a:endParaRPr lang="en-GB" dirty="0"/>
           </a:p>
         </p:txBody>
       </p:sp>
@@ -7918,9 +7844,10 @@
           <a:lstStyle/>
           <a:p>
             <a:r>
-              <a:rPr lang="en-GB" dirty="0"/>
-              <a:t>1.12.2014</a:t>
-            </a:r>
+              <a:rPr lang="en-US" smtClean="0"/>
+              <a:t>22.05.2019</a:t>
+            </a:r>
+            <a:endParaRPr lang="en-GB" dirty="0"/>
           </a:p>
         </p:txBody>
       </p:sp>
@@ -7939,10 +7866,7 @@
           <a:bodyPr/>
           <a:lstStyle/>
           <a:p>
-            <a:r>
-              <a:rPr lang="en-GB" dirty="0"/>
-              <a:t>First name Surname (edit via “Insert” &gt; “Header &amp; Footer”)</a:t>
-            </a:r>
+            <a:endParaRPr lang="en-GB" dirty="0"/>
           </a:p>
         </p:txBody>
       </p:sp>
@@ -8215,31 +8139,10 @@
           <a:lstStyle/>
           <a:p>
             <a:r>
-              <a:rPr lang="en-GB" dirty="0"/>
-              <a:t>1.12.2014</a:t>
-            </a:r>
-          </a:p>
-        </p:txBody>
-      </p:sp>
-      <p:sp>
-        <p:nvSpPr>
-          <p:cNvPr id="5" name="Fußzeilenplatzhalter 4"/>
-          <p:cNvSpPr>
-            <a:spLocks noGrp="1"/>
-          </p:cNvSpPr>
-          <p:nvPr>
-            <p:ph type="ftr" sz="quarter" idx="11"/>
-          </p:nvPr>
-        </p:nvSpPr>
-        <p:spPr/>
-        <p:txBody>
-          <a:bodyPr/>
-          <a:lstStyle/>
-          <a:p>
-            <a:r>
-              <a:rPr lang="en-GB" dirty="0"/>
-              <a:t>First name Surname (edit via “Insert” &gt; “Header &amp; Footer”)</a:t>
-            </a:r>
+              <a:rPr lang="en-US" smtClean="0"/>
+              <a:t>22.05.2019</a:t>
+            </a:r>
+            <a:endParaRPr lang="en-GB" dirty="0"/>
           </a:p>
         </p:txBody>
       </p:sp>
@@ -8512,9 +8415,10 @@
           <a:lstStyle/>
           <a:p>
             <a:r>
-              <a:rPr lang="en-GB" dirty="0"/>
-              <a:t>1.12.2014</a:t>
-            </a:r>
+              <a:rPr lang="en-US" smtClean="0"/>
+              <a:t>22.05.2019</a:t>
+            </a:r>
+            <a:endParaRPr lang="en-GB" dirty="0"/>
           </a:p>
         </p:txBody>
       </p:sp>
@@ -8533,10 +8437,7 @@
           <a:bodyPr/>
           <a:lstStyle/>
           <a:p>
-            <a:r>
-              <a:rPr lang="en-GB" dirty="0"/>
-              <a:t>First name Surname (edit via “Insert” &gt; “Header &amp; Footer”)</a:t>
-            </a:r>
+            <a:endParaRPr lang="en-GB" dirty="0"/>
           </a:p>
         </p:txBody>
       </p:sp>
@@ -9799,9 +9700,10 @@
           <a:lstStyle/>
           <a:p>
             <a:r>
-              <a:rPr lang="en-GB" dirty="0"/>
-              <a:t>1.12.2014</a:t>
-            </a:r>
+              <a:rPr lang="en-US" smtClean="0"/>
+              <a:t>22.05.2019</a:t>
+            </a:r>
+            <a:endParaRPr lang="en-GB" dirty="0"/>
           </a:p>
         </p:txBody>
       </p:sp>
@@ -9820,10 +9722,7 @@
           <a:bodyPr/>
           <a:lstStyle/>
           <a:p>
-            <a:r>
-              <a:rPr lang="en-GB" dirty="0"/>
-              <a:t>First name Surname (edit via “Insert” &gt; “Header &amp; Footer”)</a:t>
-            </a:r>
+            <a:endParaRPr lang="en-GB" dirty="0"/>
           </a:p>
         </p:txBody>
       </p:sp>
@@ -10203,9 +10102,10 @@
           <a:lstStyle/>
           <a:p>
             <a:r>
-              <a:rPr lang="en-GB" dirty="0"/>
-              <a:t>1.12.2014</a:t>
-            </a:r>
+              <a:rPr lang="en-US" smtClean="0"/>
+              <a:t>22.05.2019</a:t>
+            </a:r>
+            <a:endParaRPr lang="en-GB" dirty="0"/>
           </a:p>
         </p:txBody>
       </p:sp>
@@ -10224,10 +10124,7 @@
           <a:bodyPr/>
           <a:lstStyle/>
           <a:p>
-            <a:r>
-              <a:rPr lang="en-GB" dirty="0"/>
-              <a:t>First name Surname (edit via “Insert” &gt; “Header &amp; Footer”)</a:t>
-            </a:r>
+            <a:endParaRPr lang="en-GB" dirty="0"/>
           </a:p>
         </p:txBody>
       </p:sp>
@@ -10333,9 +10230,10 @@
           <a:lstStyle/>
           <a:p>
             <a:r>
-              <a:rPr lang="en-GB" dirty="0"/>
-              <a:t>1.12.2014</a:t>
-            </a:r>
+              <a:rPr lang="en-US" smtClean="0"/>
+              <a:t>22.05.2019</a:t>
+            </a:r>
+            <a:endParaRPr lang="en-GB" dirty="0"/>
           </a:p>
         </p:txBody>
       </p:sp>
@@ -10354,10 +10252,7 @@
           <a:bodyPr/>
           <a:lstStyle/>
           <a:p>
-            <a:r>
-              <a:rPr lang="en-GB" dirty="0"/>
-              <a:t>First name Surname (edit via “Insert” &gt; “Header &amp; Footer”)</a:t>
-            </a:r>
+            <a:endParaRPr lang="en-GB" dirty="0"/>
           </a:p>
         </p:txBody>
       </p:sp>
@@ -10459,9 +10354,10 @@
           <a:lstStyle/>
           <a:p>
             <a:r>
-              <a:rPr lang="en-GB" dirty="0"/>
-              <a:t>1.12.2014</a:t>
-            </a:r>
+              <a:rPr lang="en-US" smtClean="0"/>
+              <a:t>22.05.2019</a:t>
+            </a:r>
+            <a:endParaRPr lang="en-GB" dirty="0"/>
           </a:p>
         </p:txBody>
       </p:sp>
@@ -10480,10 +10376,7 @@
           <a:bodyPr/>
           <a:lstStyle/>
           <a:p>
-            <a:r>
-              <a:rPr lang="en-GB" dirty="0"/>
-              <a:t>First name Surname (edit via “Insert” &gt; “Header &amp; Footer”)</a:t>
-            </a:r>
+            <a:endParaRPr lang="en-GB" dirty="0"/>
           </a:p>
         </p:txBody>
       </p:sp>
@@ -10638,9 +10531,10 @@
           <a:lstStyle/>
           <a:p>
             <a:r>
-              <a:rPr lang="en-GB" dirty="0"/>
-              <a:t>1.12.2014</a:t>
-            </a:r>
+              <a:rPr lang="en-US" smtClean="0"/>
+              <a:t>22.05.2019</a:t>
+            </a:r>
+            <a:endParaRPr lang="en-GB" dirty="0"/>
           </a:p>
         </p:txBody>
       </p:sp>
@@ -10659,10 +10553,7 @@
           <a:bodyPr/>
           <a:lstStyle/>
           <a:p>
-            <a:r>
-              <a:rPr lang="en-GB" dirty="0"/>
-              <a:t>First name Surname (edit via “Insert” &gt; “Header &amp; Footer”)</a:t>
-            </a:r>
+            <a:endParaRPr lang="en-GB" dirty="0"/>
           </a:p>
         </p:txBody>
       </p:sp>
@@ -10890,9 +10781,10 @@
           <a:lstStyle/>
           <a:p>
             <a:r>
-              <a:rPr lang="en-GB" dirty="0"/>
-              <a:t>1.12.2014</a:t>
-            </a:r>
+              <a:rPr lang="en-US" smtClean="0"/>
+              <a:t>22.05.2019</a:t>
+            </a:r>
+            <a:endParaRPr lang="en-GB" dirty="0"/>
           </a:p>
         </p:txBody>
       </p:sp>
@@ -10911,10 +10803,7 @@
           <a:bodyPr/>
           <a:lstStyle/>
           <a:p>
-            <a:r>
-              <a:rPr lang="en-GB" dirty="0"/>
-              <a:t>First name Surname (edit via “Insert” &gt; “Header &amp; Footer”)</a:t>
-            </a:r>
+            <a:endParaRPr lang="en-GB" dirty="0"/>
           </a:p>
         </p:txBody>
       </p:sp>
@@ -11242,9 +11131,10 @@
           <a:lstStyle/>
           <a:p>
             <a:r>
-              <a:rPr lang="en-GB" dirty="0"/>
-              <a:t>1.12.2014</a:t>
-            </a:r>
+              <a:rPr lang="en-US" smtClean="0"/>
+              <a:t>22.05.2019</a:t>
+            </a:r>
+            <a:endParaRPr lang="en-GB" dirty="0"/>
           </a:p>
         </p:txBody>
       </p:sp>
@@ -11263,10 +11153,7 @@
           <a:bodyPr/>
           <a:lstStyle/>
           <a:p>
-            <a:r>
-              <a:rPr lang="en-GB" dirty="0"/>
-              <a:t>First name Surname (edit via “Insert” &gt; “Header &amp; Footer”)</a:t>
-            </a:r>
+            <a:endParaRPr lang="en-GB" dirty="0"/>
           </a:p>
         </p:txBody>
       </p:sp>
@@ -11539,9 +11426,10 @@
           <a:lstStyle/>
           <a:p>
             <a:r>
-              <a:rPr lang="en-GB" dirty="0"/>
-              <a:t>1.12.2014</a:t>
-            </a:r>
+              <a:rPr lang="en-US" smtClean="0"/>
+              <a:t>22.05.2019</a:t>
+            </a:r>
+            <a:endParaRPr lang="en-GB" dirty="0"/>
           </a:p>
         </p:txBody>
       </p:sp>
@@ -11560,10 +11448,7 @@
           <a:bodyPr/>
           <a:lstStyle/>
           <a:p>
-            <a:r>
-              <a:rPr lang="en-GB" dirty="0"/>
-              <a:t>First name Surname (edit via “Insert” &gt; “Header &amp; Footer”)</a:t>
-            </a:r>
+            <a:endParaRPr lang="en-GB" dirty="0"/>
           </a:p>
         </p:txBody>
       </p:sp>
@@ -13867,9 +13752,10 @@
           <a:lstStyle/>
           <a:p>
             <a:r>
-              <a:rPr lang="en-GB" dirty="0"/>
-              <a:t>1.12.2014</a:t>
-            </a:r>
+              <a:rPr lang="en-US" smtClean="0"/>
+              <a:t>22.05.2019</a:t>
+            </a:r>
+            <a:endParaRPr lang="en-GB" dirty="0"/>
           </a:p>
         </p:txBody>
       </p:sp>
@@ -13888,10 +13774,7 @@
           <a:bodyPr/>
           <a:lstStyle/>
           <a:p>
-            <a:r>
-              <a:rPr lang="en-GB" dirty="0"/>
-              <a:t>First name Surname (edit via “Insert” &gt; “Header &amp; Footer”)</a:t>
-            </a:r>
+            <a:endParaRPr lang="en-GB" dirty="0"/>
           </a:p>
         </p:txBody>
       </p:sp>
@@ -14271,9 +14154,10 @@
           <a:lstStyle/>
           <a:p>
             <a:r>
-              <a:rPr lang="en-GB" dirty="0"/>
-              <a:t>1.12.2014</a:t>
-            </a:r>
+              <a:rPr lang="en-US" smtClean="0"/>
+              <a:t>22.05.2019</a:t>
+            </a:r>
+            <a:endParaRPr lang="en-GB" dirty="0"/>
           </a:p>
         </p:txBody>
       </p:sp>
@@ -14292,10 +14176,7 @@
           <a:bodyPr/>
           <a:lstStyle/>
           <a:p>
-            <a:r>
-              <a:rPr lang="en-GB" dirty="0"/>
-              <a:t>First name Surname (edit via “Insert” &gt; “Header &amp; Footer”)</a:t>
-            </a:r>
+            <a:endParaRPr lang="en-GB" dirty="0"/>
           </a:p>
         </p:txBody>
       </p:sp>
@@ -14401,9 +14282,10 @@
           <a:lstStyle/>
           <a:p>
             <a:r>
-              <a:rPr lang="en-GB" dirty="0"/>
-              <a:t>1.12.2014</a:t>
-            </a:r>
+              <a:rPr lang="en-US" smtClean="0"/>
+              <a:t>22.05.2019</a:t>
+            </a:r>
+            <a:endParaRPr lang="en-GB" dirty="0"/>
           </a:p>
         </p:txBody>
       </p:sp>
@@ -14422,10 +14304,7 @@
           <a:bodyPr/>
           <a:lstStyle/>
           <a:p>
-            <a:r>
-              <a:rPr lang="en-GB" dirty="0"/>
-              <a:t>First name Surname (edit via “Insert” &gt; “Header &amp; Footer”)</a:t>
-            </a:r>
+            <a:endParaRPr lang="en-GB" dirty="0"/>
           </a:p>
         </p:txBody>
       </p:sp>
@@ -14527,9 +14406,10 @@
           <a:lstStyle/>
           <a:p>
             <a:r>
-              <a:rPr lang="en-GB" dirty="0"/>
-              <a:t>1.12.2014</a:t>
-            </a:r>
+              <a:rPr lang="en-US" smtClean="0"/>
+              <a:t>22.05.2019</a:t>
+            </a:r>
+            <a:endParaRPr lang="en-GB" dirty="0"/>
           </a:p>
         </p:txBody>
       </p:sp>
@@ -14548,10 +14428,7 @@
           <a:bodyPr/>
           <a:lstStyle/>
           <a:p>
-            <a:r>
-              <a:rPr lang="en-GB" dirty="0"/>
-              <a:t>First name Surname (edit via “Insert” &gt; “Header &amp; Footer”)</a:t>
-            </a:r>
+            <a:endParaRPr lang="en-GB" dirty="0"/>
           </a:p>
         </p:txBody>
       </p:sp>
@@ -14706,9 +14583,10 @@
           <a:lstStyle/>
           <a:p>
             <a:r>
-              <a:rPr lang="en-GB" dirty="0"/>
-              <a:t>1.12.2014</a:t>
-            </a:r>
+              <a:rPr lang="en-US" smtClean="0"/>
+              <a:t>22.05.2019</a:t>
+            </a:r>
+            <a:endParaRPr lang="en-GB" dirty="0"/>
           </a:p>
         </p:txBody>
       </p:sp>
@@ -14727,10 +14605,7 @@
           <a:bodyPr/>
           <a:lstStyle/>
           <a:p>
-            <a:r>
-              <a:rPr lang="en-GB" dirty="0"/>
-              <a:t>First name Surname (edit via “Insert” &gt; “Header &amp; Footer”)</a:t>
-            </a:r>
+            <a:endParaRPr lang="en-GB" dirty="0"/>
           </a:p>
         </p:txBody>
       </p:sp>
@@ -14958,9 +14833,10 @@
           <a:lstStyle/>
           <a:p>
             <a:r>
-              <a:rPr lang="en-GB" dirty="0"/>
-              <a:t>1.12.2014</a:t>
-            </a:r>
+              <a:rPr lang="en-US" smtClean="0"/>
+              <a:t>22.05.2019</a:t>
+            </a:r>
+            <a:endParaRPr lang="en-GB" dirty="0"/>
           </a:p>
         </p:txBody>
       </p:sp>
@@ -14979,10 +14855,7 @@
           <a:bodyPr/>
           <a:lstStyle/>
           <a:p>
-            <a:r>
-              <a:rPr lang="en-GB" dirty="0"/>
-              <a:t>First name Surname (edit via “Insert” &gt; “Header &amp; Footer”)</a:t>
-            </a:r>
+            <a:endParaRPr lang="en-GB" dirty="0"/>
           </a:p>
         </p:txBody>
       </p:sp>
@@ -15310,9 +15183,10 @@
           <a:lstStyle/>
           <a:p>
             <a:r>
-              <a:rPr lang="en-GB" dirty="0"/>
-              <a:t>1.12.2014</a:t>
-            </a:r>
+              <a:rPr lang="en-US" smtClean="0"/>
+              <a:t>22.05.2019</a:t>
+            </a:r>
+            <a:endParaRPr lang="en-GB" dirty="0"/>
           </a:p>
         </p:txBody>
       </p:sp>
@@ -15331,10 +15205,7 @@
           <a:bodyPr/>
           <a:lstStyle/>
           <a:p>
-            <a:r>
-              <a:rPr lang="en-GB" dirty="0"/>
-              <a:t>First name Surname (edit via “Insert” &gt; “Header &amp; Footer”)</a:t>
-            </a:r>
+            <a:endParaRPr lang="en-GB" dirty="0"/>
           </a:p>
         </p:txBody>
       </p:sp>
@@ -15607,9 +15478,10 @@
           <a:lstStyle/>
           <a:p>
             <a:r>
-              <a:rPr lang="en-GB" dirty="0"/>
-              <a:t>1.12.2014</a:t>
-            </a:r>
+              <a:rPr lang="en-US" smtClean="0"/>
+              <a:t>22.05.2019</a:t>
+            </a:r>
+            <a:endParaRPr lang="en-GB" dirty="0"/>
           </a:p>
         </p:txBody>
       </p:sp>
@@ -15628,10 +15500,7 @@
           <a:bodyPr/>
           <a:lstStyle/>
           <a:p>
-            <a:r>
-              <a:rPr lang="en-GB" dirty="0"/>
-              <a:t>First name Surname (edit via “Insert” &gt; “Header &amp; Footer”)</a:t>
-            </a:r>
+            <a:endParaRPr lang="en-GB" dirty="0"/>
           </a:p>
         </p:txBody>
       </p:sp>
@@ -16894,31 +16763,10 @@
           <a:lstStyle/>
           <a:p>
             <a:r>
-              <a:rPr lang="en-GB" dirty="0"/>
-              <a:t>1.12.2014</a:t>
-            </a:r>
-          </a:p>
-        </p:txBody>
-      </p:sp>
-      <p:sp>
-        <p:nvSpPr>
-          <p:cNvPr id="5" name="Fußzeilenplatzhalter 4"/>
-          <p:cNvSpPr>
-            <a:spLocks noGrp="1"/>
-          </p:cNvSpPr>
-          <p:nvPr>
-            <p:ph type="ftr" sz="quarter" idx="11"/>
-          </p:nvPr>
-        </p:nvSpPr>
-        <p:spPr/>
-        <p:txBody>
-          <a:bodyPr/>
-          <a:lstStyle/>
-          <a:p>
-            <a:r>
-              <a:rPr lang="en-GB" dirty="0"/>
-              <a:t>First name Surname (edit via “Insert” &gt; “Header &amp; Footer”)</a:t>
-            </a:r>
+              <a:rPr lang="en-US" smtClean="0"/>
+              <a:t>22.05.2019</a:t>
+            </a:r>
+            <a:endParaRPr lang="en-GB" dirty="0"/>
           </a:p>
         </p:txBody>
       </p:sp>
@@ -17124,9 +16972,10 @@
           <a:lstStyle/>
           <a:p>
             <a:r>
-              <a:rPr lang="en-GB" dirty="0"/>
-              <a:t>1.12.2014</a:t>
-            </a:r>
+              <a:rPr lang="en-US" smtClean="0"/>
+              <a:t>22.05.2019</a:t>
+            </a:r>
+            <a:endParaRPr lang="en-GB" dirty="0"/>
           </a:p>
         </p:txBody>
       </p:sp>
@@ -17145,10 +16994,7 @@
           <a:bodyPr/>
           <a:lstStyle/>
           <a:p>
-            <a:r>
-              <a:rPr lang="en-GB" dirty="0"/>
-              <a:t>First name Surname (edit via “Insert” &gt; “Header &amp; Footer”)</a:t>
-            </a:r>
+            <a:endParaRPr lang="en-GB" dirty="0"/>
           </a:p>
         </p:txBody>
       </p:sp>
@@ -17528,9 +17374,10 @@
           <a:lstStyle/>
           <a:p>
             <a:r>
-              <a:rPr lang="en-GB" dirty="0"/>
-              <a:t>1.12.2014</a:t>
-            </a:r>
+              <a:rPr lang="en-US" smtClean="0"/>
+              <a:t>22.05.2019</a:t>
+            </a:r>
+            <a:endParaRPr lang="en-GB" dirty="0"/>
           </a:p>
         </p:txBody>
       </p:sp>
@@ -17549,10 +17396,7 @@
           <a:bodyPr/>
           <a:lstStyle/>
           <a:p>
-            <a:r>
-              <a:rPr lang="en-GB" dirty="0"/>
-              <a:t>First name Surname (edit via “Insert” &gt; “Header &amp; Footer”)</a:t>
-            </a:r>
+            <a:endParaRPr lang="en-GB" dirty="0"/>
           </a:p>
         </p:txBody>
       </p:sp>
@@ -17658,9 +17502,10 @@
           <a:lstStyle/>
           <a:p>
             <a:r>
-              <a:rPr lang="en-GB" dirty="0"/>
-              <a:t>1.12.2014</a:t>
-            </a:r>
+              <a:rPr lang="en-US" smtClean="0"/>
+              <a:t>22.05.2019</a:t>
+            </a:r>
+            <a:endParaRPr lang="en-GB" dirty="0"/>
           </a:p>
         </p:txBody>
       </p:sp>
@@ -17679,10 +17524,7 @@
           <a:bodyPr/>
           <a:lstStyle/>
           <a:p>
-            <a:r>
-              <a:rPr lang="en-GB" dirty="0"/>
-              <a:t>First name Surname (edit via “Insert” &gt; “Header &amp; Footer”)</a:t>
-            </a:r>
+            <a:endParaRPr lang="en-GB" dirty="0"/>
           </a:p>
         </p:txBody>
       </p:sp>
@@ -17784,9 +17626,10 @@
           <a:lstStyle/>
           <a:p>
             <a:r>
-              <a:rPr lang="en-GB" dirty="0"/>
-              <a:t>1.12.2014</a:t>
-            </a:r>
+              <a:rPr lang="en-US" smtClean="0"/>
+              <a:t>22.05.2019</a:t>
+            </a:r>
+            <a:endParaRPr lang="en-GB" dirty="0"/>
           </a:p>
         </p:txBody>
       </p:sp>
@@ -17805,10 +17648,7 @@
           <a:bodyPr/>
           <a:lstStyle/>
           <a:p>
-            <a:r>
-              <a:rPr lang="en-GB" dirty="0"/>
-              <a:t>First name Surname (edit via “Insert” &gt; “Header &amp; Footer”)</a:t>
-            </a:r>
+            <a:endParaRPr lang="en-GB" dirty="0"/>
           </a:p>
         </p:txBody>
       </p:sp>
@@ -17963,9 +17803,10 @@
           <a:lstStyle/>
           <a:p>
             <a:r>
-              <a:rPr lang="en-GB" dirty="0"/>
-              <a:t>1.12.2014</a:t>
-            </a:r>
+              <a:rPr lang="en-US" smtClean="0"/>
+              <a:t>22.05.2019</a:t>
+            </a:r>
+            <a:endParaRPr lang="en-GB" dirty="0"/>
           </a:p>
         </p:txBody>
       </p:sp>
@@ -17984,10 +17825,7 @@
           <a:bodyPr/>
           <a:lstStyle/>
           <a:p>
-            <a:r>
-              <a:rPr lang="en-GB" dirty="0"/>
-              <a:t>First name Surname (edit via “Insert” &gt; “Header &amp; Footer”)</a:t>
-            </a:r>
+            <a:endParaRPr lang="en-GB" dirty="0"/>
           </a:p>
         </p:txBody>
       </p:sp>
@@ -18215,9 +18053,10 @@
           <a:lstStyle/>
           <a:p>
             <a:r>
-              <a:rPr lang="en-GB" dirty="0"/>
-              <a:t>1.12.2014</a:t>
-            </a:r>
+              <a:rPr lang="en-US" smtClean="0"/>
+              <a:t>22.05.2019</a:t>
+            </a:r>
+            <a:endParaRPr lang="en-GB" dirty="0"/>
           </a:p>
         </p:txBody>
       </p:sp>
@@ -18236,10 +18075,7 @@
           <a:bodyPr/>
           <a:lstStyle/>
           <a:p>
-            <a:r>
-              <a:rPr lang="en-GB" dirty="0"/>
-              <a:t>First name Surname (edit via “Insert” &gt; “Header &amp; Footer”)</a:t>
-            </a:r>
+            <a:endParaRPr lang="en-GB" dirty="0"/>
           </a:p>
         </p:txBody>
       </p:sp>
@@ -18567,9 +18403,10 @@
           <a:lstStyle/>
           <a:p>
             <a:r>
-              <a:rPr lang="en-GB" dirty="0"/>
-              <a:t>1.12.2014</a:t>
-            </a:r>
+              <a:rPr lang="en-US" smtClean="0"/>
+              <a:t>22.05.2019</a:t>
+            </a:r>
+            <a:endParaRPr lang="en-GB" dirty="0"/>
           </a:p>
         </p:txBody>
       </p:sp>
@@ -18588,10 +18425,7 @@
           <a:bodyPr/>
           <a:lstStyle/>
           <a:p>
-            <a:r>
-              <a:rPr lang="en-GB" dirty="0"/>
-              <a:t>First name Surname (edit via “Insert” &gt; “Header &amp; Footer”)</a:t>
-            </a:r>
+            <a:endParaRPr lang="en-GB" dirty="0"/>
           </a:p>
         </p:txBody>
       </p:sp>
@@ -18864,9 +18698,10 @@
           <a:lstStyle/>
           <a:p>
             <a:r>
-              <a:rPr lang="en-GB" dirty="0"/>
-              <a:t>1.12.2014</a:t>
-            </a:r>
+              <a:rPr lang="en-US" smtClean="0"/>
+              <a:t>22.05.2019</a:t>
+            </a:r>
+            <a:endParaRPr lang="en-GB" dirty="0"/>
           </a:p>
         </p:txBody>
       </p:sp>
@@ -18885,10 +18720,7 @@
           <a:bodyPr/>
           <a:lstStyle/>
           <a:p>
-            <a:r>
-              <a:rPr lang="en-GB" dirty="0"/>
-              <a:t>First name Surname (edit via “Insert” &gt; “Header &amp; Footer”)</a:t>
-            </a:r>
+            <a:endParaRPr lang="en-GB" dirty="0"/>
           </a:p>
         </p:txBody>
       </p:sp>
@@ -20151,9 +19983,10 @@
           <a:lstStyle/>
           <a:p>
             <a:r>
-              <a:rPr lang="en-GB" dirty="0"/>
-              <a:t>1.12.2014</a:t>
-            </a:r>
+              <a:rPr lang="en-US" smtClean="0"/>
+              <a:t>22.05.2019</a:t>
+            </a:r>
+            <a:endParaRPr lang="en-GB" dirty="0"/>
           </a:p>
         </p:txBody>
       </p:sp>
@@ -20172,10 +20005,7 @@
           <a:bodyPr/>
           <a:lstStyle/>
           <a:p>
-            <a:r>
-              <a:rPr lang="en-GB" dirty="0"/>
-              <a:t>First name Surname (edit via “Insert” &gt; “Header &amp; Footer”)</a:t>
-            </a:r>
+            <a:endParaRPr lang="en-GB" dirty="0"/>
           </a:p>
         </p:txBody>
       </p:sp>
@@ -20555,31 +20385,10 @@
           <a:lstStyle/>
           <a:p>
             <a:r>
-              <a:rPr lang="en-GB" dirty="0"/>
-              <a:t>1.12.2014</a:t>
-            </a:r>
-          </a:p>
-        </p:txBody>
-      </p:sp>
-      <p:sp>
-        <p:nvSpPr>
-          <p:cNvPr id="6" name="Fußzeilenplatzhalter 5"/>
-          <p:cNvSpPr>
-            <a:spLocks noGrp="1"/>
-          </p:cNvSpPr>
-          <p:nvPr>
-            <p:ph type="ftr" sz="quarter" idx="11"/>
-          </p:nvPr>
-        </p:nvSpPr>
-        <p:spPr/>
-        <p:txBody>
-          <a:bodyPr/>
-          <a:lstStyle/>
-          <a:p>
-            <a:r>
-              <a:rPr lang="en-GB" dirty="0"/>
-              <a:t>First name Surname (edit via “Insert” &gt; “Header &amp; Footer”)</a:t>
-            </a:r>
+              <a:rPr lang="en-US" smtClean="0"/>
+              <a:t>22.05.2019</a:t>
+            </a:r>
+            <a:endParaRPr lang="en-GB" dirty="0"/>
           </a:p>
         </p:txBody>
       </p:sp>
@@ -20954,9 +20763,10 @@
           <a:lstStyle/>
           <a:p>
             <a:r>
-              <a:rPr lang="en-GB" dirty="0"/>
-              <a:t>1.12.2014</a:t>
-            </a:r>
+              <a:rPr lang="en-US" smtClean="0"/>
+              <a:t>22.05.2019</a:t>
+            </a:r>
+            <a:endParaRPr lang="en-GB" dirty="0"/>
           </a:p>
         </p:txBody>
       </p:sp>
@@ -20975,10 +20785,7 @@
           <a:bodyPr/>
           <a:lstStyle/>
           <a:p>
-            <a:r>
-              <a:rPr lang="en-GB" dirty="0"/>
-              <a:t>First name Surname (edit via “Insert” &gt; “Header &amp; Footer”)</a:t>
-            </a:r>
+            <a:endParaRPr lang="en-GB" dirty="0"/>
           </a:p>
         </p:txBody>
       </p:sp>
@@ -21084,9 +20891,10 @@
           <a:lstStyle/>
           <a:p>
             <a:r>
-              <a:rPr lang="en-GB" dirty="0"/>
-              <a:t>1.12.2014</a:t>
-            </a:r>
+              <a:rPr lang="en-US" smtClean="0"/>
+              <a:t>22.05.2019</a:t>
+            </a:r>
+            <a:endParaRPr lang="en-GB" dirty="0"/>
           </a:p>
         </p:txBody>
       </p:sp>
@@ -21105,10 +20913,7 @@
           <a:bodyPr/>
           <a:lstStyle/>
           <a:p>
-            <a:r>
-              <a:rPr lang="en-GB" dirty="0"/>
-              <a:t>First name Surname (edit via “Insert” &gt; “Header &amp; Footer”)</a:t>
-            </a:r>
+            <a:endParaRPr lang="en-GB" dirty="0"/>
           </a:p>
         </p:txBody>
       </p:sp>
@@ -21210,9 +21015,10 @@
           <a:lstStyle/>
           <a:p>
             <a:r>
-              <a:rPr lang="en-GB" dirty="0"/>
-              <a:t>1.12.2014</a:t>
-            </a:r>
+              <a:rPr lang="en-US" smtClean="0"/>
+              <a:t>22.05.2019</a:t>
+            </a:r>
+            <a:endParaRPr lang="en-GB" dirty="0"/>
           </a:p>
         </p:txBody>
       </p:sp>
@@ -21231,10 +21037,7 @@
           <a:bodyPr/>
           <a:lstStyle/>
           <a:p>
-            <a:r>
-              <a:rPr lang="en-GB" dirty="0"/>
-              <a:t>First name Surname (edit via “Insert” &gt; “Header &amp; Footer”)</a:t>
-            </a:r>
+            <a:endParaRPr lang="en-GB" dirty="0"/>
           </a:p>
         </p:txBody>
       </p:sp>
@@ -21389,9 +21192,10 @@
           <a:lstStyle/>
           <a:p>
             <a:r>
-              <a:rPr lang="en-GB" dirty="0"/>
-              <a:t>1.12.2014</a:t>
-            </a:r>
+              <a:rPr lang="en-US" smtClean="0"/>
+              <a:t>22.05.2019</a:t>
+            </a:r>
+            <a:endParaRPr lang="en-GB" dirty="0"/>
           </a:p>
         </p:txBody>
       </p:sp>
@@ -21410,10 +21214,7 @@
           <a:bodyPr/>
           <a:lstStyle/>
           <a:p>
-            <a:r>
-              <a:rPr lang="en-GB" dirty="0"/>
-              <a:t>First name Surname (edit via “Insert” &gt; “Header &amp; Footer”)</a:t>
-            </a:r>
+            <a:endParaRPr lang="en-GB" dirty="0"/>
           </a:p>
         </p:txBody>
       </p:sp>
@@ -21641,9 +21442,10 @@
           <a:lstStyle/>
           <a:p>
             <a:r>
-              <a:rPr lang="en-GB" dirty="0"/>
-              <a:t>1.12.2014</a:t>
-            </a:r>
+              <a:rPr lang="en-US" smtClean="0"/>
+              <a:t>22.05.2019</a:t>
+            </a:r>
+            <a:endParaRPr lang="en-GB" dirty="0"/>
           </a:p>
         </p:txBody>
       </p:sp>
@@ -21662,10 +21464,7 @@
           <a:bodyPr/>
           <a:lstStyle/>
           <a:p>
-            <a:r>
-              <a:rPr lang="en-GB" dirty="0"/>
-              <a:t>First name Surname (edit via “Insert” &gt; “Header &amp; Footer”)</a:t>
-            </a:r>
+            <a:endParaRPr lang="en-GB" dirty="0"/>
           </a:p>
         </p:txBody>
       </p:sp>
@@ -21993,9 +21792,10 @@
           <a:lstStyle/>
           <a:p>
             <a:r>
-              <a:rPr lang="en-GB" dirty="0"/>
-              <a:t>1.12.2014</a:t>
-            </a:r>
+              <a:rPr lang="en-US" smtClean="0"/>
+              <a:t>22.05.2019</a:t>
+            </a:r>
+            <a:endParaRPr lang="en-GB" dirty="0"/>
           </a:p>
         </p:txBody>
       </p:sp>
@@ -22014,10 +21814,7 @@
           <a:bodyPr/>
           <a:lstStyle/>
           <a:p>
-            <a:r>
-              <a:rPr lang="en-GB" dirty="0"/>
-              <a:t>First name Surname (edit via “Insert” &gt; “Header &amp; Footer”)</a:t>
-            </a:r>
+            <a:endParaRPr lang="en-GB" dirty="0"/>
           </a:p>
         </p:txBody>
       </p:sp>
@@ -22290,9 +22087,10 @@
           <a:lstStyle/>
           <a:p>
             <a:r>
-              <a:rPr lang="en-GB" dirty="0"/>
-              <a:t>1.12.2014</a:t>
-            </a:r>
+              <a:rPr lang="en-US" smtClean="0"/>
+              <a:t>22.05.2019</a:t>
+            </a:r>
+            <a:endParaRPr lang="en-GB" dirty="0"/>
           </a:p>
         </p:txBody>
       </p:sp>
@@ -22311,10 +22109,7 @@
           <a:bodyPr/>
           <a:lstStyle/>
           <a:p>
-            <a:r>
-              <a:rPr lang="en-GB" dirty="0"/>
-              <a:t>First name Surname (edit via “Insert” &gt; “Header &amp; Footer”)</a:t>
-            </a:r>
+            <a:endParaRPr lang="en-GB" dirty="0"/>
           </a:p>
         </p:txBody>
       </p:sp>
@@ -23577,9 +23372,10 @@
           <a:lstStyle/>
           <a:p>
             <a:r>
-              <a:rPr lang="en-GB" dirty="0"/>
-              <a:t>1.12.2014</a:t>
-            </a:r>
+              <a:rPr lang="en-US" smtClean="0"/>
+              <a:t>22.05.2019</a:t>
+            </a:r>
+            <a:endParaRPr lang="en-GB" dirty="0"/>
           </a:p>
         </p:txBody>
       </p:sp>
@@ -23598,10 +23394,7 @@
           <a:bodyPr/>
           <a:lstStyle/>
           <a:p>
-            <a:r>
-              <a:rPr lang="en-GB" dirty="0"/>
-              <a:t>First name Surname (edit via “Insert” &gt; “Header &amp; Footer”)</a:t>
-            </a:r>
+            <a:endParaRPr lang="en-GB" dirty="0"/>
           </a:p>
         </p:txBody>
       </p:sp>
@@ -23981,9 +23774,10 @@
           <a:lstStyle/>
           <a:p>
             <a:r>
-              <a:rPr lang="en-GB" dirty="0"/>
-              <a:t>1.12.2014</a:t>
-            </a:r>
+              <a:rPr lang="en-US" smtClean="0"/>
+              <a:t>22.05.2019</a:t>
+            </a:r>
+            <a:endParaRPr lang="en-GB" dirty="0"/>
           </a:p>
         </p:txBody>
       </p:sp>
@@ -24002,10 +23796,7 @@
           <a:bodyPr/>
           <a:lstStyle/>
           <a:p>
-            <a:r>
-              <a:rPr lang="en-GB" dirty="0"/>
-              <a:t>First name Surname (edit via “Insert” &gt; “Header &amp; Footer”)</a:t>
-            </a:r>
+            <a:endParaRPr lang="en-GB" dirty="0"/>
           </a:p>
         </p:txBody>
       </p:sp>
@@ -24111,31 +23902,10 @@
           <a:lstStyle/>
           <a:p>
             <a:r>
-              <a:rPr lang="en-GB" dirty="0"/>
-              <a:t>1.12.2014</a:t>
-            </a:r>
-          </a:p>
-        </p:txBody>
-      </p:sp>
-      <p:sp>
-        <p:nvSpPr>
-          <p:cNvPr id="3" name="Fußzeilenplatzhalter 2"/>
-          <p:cNvSpPr>
-            <a:spLocks noGrp="1"/>
-          </p:cNvSpPr>
-          <p:nvPr>
-            <p:ph type="ftr" sz="quarter" idx="11"/>
-          </p:nvPr>
-        </p:nvSpPr>
-        <p:spPr/>
-        <p:txBody>
-          <a:bodyPr/>
-          <a:lstStyle/>
-          <a:p>
-            <a:r>
-              <a:rPr lang="en-GB" dirty="0"/>
-              <a:t>First name Surname (edit via “Insert” &gt; “Header &amp; Footer”)</a:t>
-            </a:r>
+              <a:rPr lang="en-US" smtClean="0"/>
+              <a:t>22.05.2019</a:t>
+            </a:r>
+            <a:endParaRPr lang="en-GB" dirty="0"/>
           </a:p>
         </p:txBody>
       </p:sp>
@@ -24232,9 +24002,10 @@
           <a:lstStyle/>
           <a:p>
             <a:r>
-              <a:rPr lang="en-GB" dirty="0"/>
-              <a:t>1.12.2014</a:t>
-            </a:r>
+              <a:rPr lang="en-US" smtClean="0"/>
+              <a:t>22.05.2019</a:t>
+            </a:r>
+            <a:endParaRPr lang="en-GB" dirty="0"/>
           </a:p>
         </p:txBody>
       </p:sp>
@@ -24253,10 +24024,7 @@
           <a:bodyPr/>
           <a:lstStyle/>
           <a:p>
-            <a:r>
-              <a:rPr lang="en-GB" dirty="0"/>
-              <a:t>First name Surname (edit via “Insert” &gt; “Header &amp; Footer”)</a:t>
-            </a:r>
+            <a:endParaRPr lang="en-GB" dirty="0"/>
           </a:p>
         </p:txBody>
       </p:sp>
@@ -24358,9 +24126,10 @@
           <a:lstStyle/>
           <a:p>
             <a:r>
-              <a:rPr lang="en-GB" dirty="0"/>
-              <a:t>1.12.2014</a:t>
-            </a:r>
+              <a:rPr lang="en-US" smtClean="0"/>
+              <a:t>22.05.2019</a:t>
+            </a:r>
+            <a:endParaRPr lang="en-GB" dirty="0"/>
           </a:p>
         </p:txBody>
       </p:sp>
@@ -24379,10 +24148,7 @@
           <a:bodyPr/>
           <a:lstStyle/>
           <a:p>
-            <a:r>
-              <a:rPr lang="en-GB" dirty="0"/>
-              <a:t>First name Surname (edit via “Insert” &gt; “Header &amp; Footer”)</a:t>
-            </a:r>
+            <a:endParaRPr lang="en-GB" dirty="0"/>
           </a:p>
         </p:txBody>
       </p:sp>
@@ -24537,9 +24303,10 @@
           <a:lstStyle/>
           <a:p>
             <a:r>
-              <a:rPr lang="en-GB" dirty="0"/>
-              <a:t>1.12.2014</a:t>
-            </a:r>
+              <a:rPr lang="en-US" smtClean="0"/>
+              <a:t>22.05.2019</a:t>
+            </a:r>
+            <a:endParaRPr lang="en-GB" dirty="0"/>
           </a:p>
         </p:txBody>
       </p:sp>
@@ -24558,10 +24325,7 @@
           <a:bodyPr/>
           <a:lstStyle/>
           <a:p>
-            <a:r>
-              <a:rPr lang="en-GB" dirty="0"/>
-              <a:t>First name Surname (edit via “Insert” &gt; “Header &amp; Footer”)</a:t>
-            </a:r>
+            <a:endParaRPr lang="en-GB" dirty="0"/>
           </a:p>
         </p:txBody>
       </p:sp>
@@ -24789,9 +24553,10 @@
           <a:lstStyle/>
           <a:p>
             <a:r>
-              <a:rPr lang="en-GB" dirty="0"/>
-              <a:t>1.12.2014</a:t>
-            </a:r>
+              <a:rPr lang="en-US" smtClean="0"/>
+              <a:t>22.05.2019</a:t>
+            </a:r>
+            <a:endParaRPr lang="en-GB" dirty="0"/>
           </a:p>
         </p:txBody>
       </p:sp>
@@ -24810,10 +24575,7 @@
           <a:bodyPr/>
           <a:lstStyle/>
           <a:p>
-            <a:r>
-              <a:rPr lang="en-GB" dirty="0"/>
-              <a:t>First name Surname (edit via “Insert” &gt; “Header &amp; Footer”)</a:t>
-            </a:r>
+            <a:endParaRPr lang="en-GB" dirty="0"/>
           </a:p>
         </p:txBody>
       </p:sp>
@@ -25141,9 +24903,10 @@
           <a:lstStyle/>
           <a:p>
             <a:r>
-              <a:rPr lang="en-GB" dirty="0"/>
-              <a:t>1.12.2014</a:t>
-            </a:r>
+              <a:rPr lang="en-US" smtClean="0"/>
+              <a:t>22.05.2019</a:t>
+            </a:r>
+            <a:endParaRPr lang="en-GB" dirty="0"/>
           </a:p>
         </p:txBody>
       </p:sp>
@@ -25162,10 +24925,7 @@
           <a:bodyPr/>
           <a:lstStyle/>
           <a:p>
-            <a:r>
-              <a:rPr lang="en-GB" dirty="0"/>
-              <a:t>First name Surname (edit via “Insert” &gt; “Header &amp; Footer”)</a:t>
-            </a:r>
+            <a:endParaRPr lang="en-GB" dirty="0"/>
           </a:p>
         </p:txBody>
       </p:sp>
@@ -25438,9 +25198,10 @@
           <a:lstStyle/>
           <a:p>
             <a:r>
-              <a:rPr lang="en-GB" dirty="0"/>
-              <a:t>1.12.2014</a:t>
-            </a:r>
+              <a:rPr lang="en-US" smtClean="0"/>
+              <a:t>22.05.2019</a:t>
+            </a:r>
+            <a:endParaRPr lang="en-GB" dirty="0"/>
           </a:p>
         </p:txBody>
       </p:sp>
@@ -25459,10 +25220,7 @@
           <a:bodyPr/>
           <a:lstStyle/>
           <a:p>
-            <a:r>
-              <a:rPr lang="en-GB" dirty="0"/>
-              <a:t>First name Surname (edit via “Insert” &gt; “Header &amp; Footer”)</a:t>
-            </a:r>
+            <a:endParaRPr lang="en-GB" dirty="0"/>
           </a:p>
         </p:txBody>
       </p:sp>
@@ -26725,9 +26483,10 @@
           <a:lstStyle/>
           <a:p>
             <a:r>
-              <a:rPr lang="en-GB" dirty="0"/>
-              <a:t>1.12.2014</a:t>
-            </a:r>
+              <a:rPr lang="en-US" smtClean="0"/>
+              <a:t>22.05.2019</a:t>
+            </a:r>
+            <a:endParaRPr lang="en-GB" dirty="0"/>
           </a:p>
         </p:txBody>
       </p:sp>
@@ -26746,10 +26505,7 @@
           <a:bodyPr/>
           <a:lstStyle/>
           <a:p>
-            <a:r>
-              <a:rPr lang="en-GB" dirty="0"/>
-              <a:t>First name Surname (edit via “Insert” &gt; “Header &amp; Footer”)</a:t>
-            </a:r>
+            <a:endParaRPr lang="en-GB" dirty="0"/>
           </a:p>
         </p:txBody>
       </p:sp>
@@ -27129,9 +26885,10 @@
           <a:lstStyle/>
           <a:p>
             <a:r>
-              <a:rPr lang="en-GB" dirty="0"/>
-              <a:t>1.12.2014</a:t>
-            </a:r>
+              <a:rPr lang="en-US" smtClean="0"/>
+              <a:t>22.05.2019</a:t>
+            </a:r>
+            <a:endParaRPr lang="en-GB" dirty="0"/>
           </a:p>
         </p:txBody>
       </p:sp>
@@ -27150,10 +26907,7 @@
           <a:bodyPr/>
           <a:lstStyle/>
           <a:p>
-            <a:r>
-              <a:rPr lang="en-GB" dirty="0"/>
-              <a:t>First name Surname (edit via “Insert” &gt; “Header &amp; Footer”)</a:t>
-            </a:r>
+            <a:endParaRPr lang="en-GB" dirty="0"/>
           </a:p>
         </p:txBody>
       </p:sp>
@@ -27259,9 +27013,10 @@
           <a:lstStyle/>
           <a:p>
             <a:r>
-              <a:rPr lang="en-GB" dirty="0"/>
-              <a:t>1.12.2014</a:t>
-            </a:r>
+              <a:rPr lang="en-US" smtClean="0"/>
+              <a:t>22.05.2019</a:t>
+            </a:r>
+            <a:endParaRPr lang="en-GB" dirty="0"/>
           </a:p>
         </p:txBody>
       </p:sp>
@@ -27280,10 +27035,7 @@
           <a:bodyPr/>
           <a:lstStyle/>
           <a:p>
-            <a:r>
-              <a:rPr lang="en-GB" dirty="0"/>
-              <a:t>First name Surname (edit via “Insert” &gt; “Header &amp; Footer”)</a:t>
-            </a:r>
+            <a:endParaRPr lang="en-GB" dirty="0"/>
           </a:p>
         </p:txBody>
       </p:sp>
@@ -27385,31 +27137,10 @@
           <a:lstStyle/>
           <a:p>
             <a:r>
-              <a:rPr lang="en-GB" dirty="0"/>
-              <a:t>1.12.2014</a:t>
-            </a:r>
-          </a:p>
-        </p:txBody>
-      </p:sp>
-      <p:sp>
-        <p:nvSpPr>
-          <p:cNvPr id="5" name="Fußzeilenplatzhalter 4"/>
-          <p:cNvSpPr>
-            <a:spLocks noGrp="1"/>
-          </p:cNvSpPr>
-          <p:nvPr>
-            <p:ph type="ftr" sz="quarter" idx="11"/>
-          </p:nvPr>
-        </p:nvSpPr>
-        <p:spPr/>
-        <p:txBody>
-          <a:bodyPr/>
-          <a:lstStyle/>
-          <a:p>
-            <a:r>
-              <a:rPr lang="en-GB" dirty="0"/>
-              <a:t>First name Surname (edit via “Insert” &gt; “Header &amp; Footer”)</a:t>
-            </a:r>
+              <a:rPr lang="en-US" smtClean="0"/>
+              <a:t>22.05.2019</a:t>
+            </a:r>
+            <a:endParaRPr lang="en-GB" dirty="0"/>
           </a:p>
         </p:txBody>
       </p:sp>
@@ -27518,9 +27249,10 @@
           <a:lstStyle/>
           <a:p>
             <a:r>
-              <a:rPr lang="en-GB" dirty="0"/>
-              <a:t>1.12.2014</a:t>
-            </a:r>
+              <a:rPr lang="en-US" smtClean="0"/>
+              <a:t>22.05.2019</a:t>
+            </a:r>
+            <a:endParaRPr lang="en-GB" dirty="0"/>
           </a:p>
         </p:txBody>
       </p:sp>
@@ -27539,10 +27271,7 @@
           <a:bodyPr/>
           <a:lstStyle/>
           <a:p>
-            <a:r>
-              <a:rPr lang="en-GB" dirty="0"/>
-              <a:t>First name Surname (edit via “Insert” &gt; “Header &amp; Footer”)</a:t>
-            </a:r>
+            <a:endParaRPr lang="en-GB" dirty="0"/>
           </a:p>
         </p:txBody>
       </p:sp>
@@ -27697,9 +27426,10 @@
           <a:lstStyle/>
           <a:p>
             <a:r>
-              <a:rPr lang="en-GB" dirty="0"/>
-              <a:t>1.12.2014</a:t>
-            </a:r>
+              <a:rPr lang="en-US" smtClean="0"/>
+              <a:t>22.05.2019</a:t>
+            </a:r>
+            <a:endParaRPr lang="en-GB" dirty="0"/>
           </a:p>
         </p:txBody>
       </p:sp>
@@ -27718,10 +27448,7 @@
           <a:bodyPr/>
           <a:lstStyle/>
           <a:p>
-            <a:r>
-              <a:rPr lang="en-GB" dirty="0"/>
-              <a:t>First name Surname (edit via “Insert” &gt; “Header &amp; Footer”)</a:t>
-            </a:r>
+            <a:endParaRPr lang="en-GB" dirty="0"/>
           </a:p>
         </p:txBody>
       </p:sp>
@@ -27873,31 +27600,10 @@
           <a:lstStyle/>
           <a:p>
             <a:r>
-              <a:rPr lang="en-GB" dirty="0"/>
-              <a:t>1.12.2014</a:t>
-            </a:r>
-          </a:p>
-        </p:txBody>
-      </p:sp>
-      <p:sp>
-        <p:nvSpPr>
-          <p:cNvPr id="3" name="Fußzeilenplatzhalter 2"/>
-          <p:cNvSpPr>
-            <a:spLocks noGrp="1"/>
-          </p:cNvSpPr>
-          <p:nvPr>
-            <p:ph type="ftr" sz="quarter" idx="11"/>
-          </p:nvPr>
-        </p:nvSpPr>
-        <p:spPr/>
-        <p:txBody>
-          <a:bodyPr/>
-          <a:lstStyle/>
-          <a:p>
-            <a:r>
-              <a:rPr lang="en-GB" dirty="0"/>
-              <a:t>First name Surname (edit via “Insert” &gt; “Header &amp; Footer”)</a:t>
-            </a:r>
+              <a:rPr lang="en-US" smtClean="0"/>
+              <a:t>22.05.2019</a:t>
+            </a:r>
+            <a:endParaRPr lang="en-GB" dirty="0"/>
           </a:p>
         </p:txBody>
       </p:sp>
@@ -28740,47 +28446,10 @@
           </a:lstStyle>
           <a:p>
             <a:r>
-              <a:rPr lang="en-GB" dirty="0"/>
-              <a:t>1.12.2014</a:t>
-            </a:r>
-          </a:p>
-        </p:txBody>
-      </p:sp>
-      <p:sp>
-        <p:nvSpPr>
-          <p:cNvPr id="5" name="Fußzeilenplatzhalter 4"/>
-          <p:cNvSpPr>
-            <a:spLocks noGrp="1"/>
-          </p:cNvSpPr>
-          <p:nvPr userDrawn="1">
-            <p:ph type="ftr" sz="quarter" idx="3"/>
-          </p:nvPr>
-        </p:nvSpPr>
-        <p:spPr>
-          <a:xfrm>
-            <a:off x="4572000" y="6308726"/>
-            <a:ext cx="3208613" cy="468312"/>
-          </a:xfrm>
-          <a:prstGeom prst="rect">
-            <a:avLst/>
-          </a:prstGeom>
-        </p:spPr>
-        <p:txBody>
-          <a:bodyPr vert="horz" wrap="none" lIns="0" tIns="0" rIns="0" bIns="0" rtlCol="0" anchor="ctr"/>
-          <a:lstStyle>
-            <a:lvl1pPr algn="r">
-              <a:defRPr sz="800">
-                <a:solidFill>
-                  <a:schemeClr val="tx1"/>
-                </a:solidFill>
-              </a:defRPr>
-            </a:lvl1pPr>
-          </a:lstStyle>
-          <a:p>
-            <a:r>
-              <a:rPr lang="en-GB" dirty="0"/>
-              <a:t>First name Surname (edit via “Insert” &gt; “Header &amp; Footer”)</a:t>
-            </a:r>
+              <a:rPr lang="en-US" smtClean="0"/>
+              <a:t>22.05.2019</a:t>
+            </a:r>
+            <a:endParaRPr lang="en-GB" dirty="0"/>
           </a:p>
         </p:txBody>
       </p:sp>
@@ -29047,42 +28716,6 @@
               <a:t>bearbeiten</a:t>
             </a:r>
             <a:endParaRPr lang="en-GB" dirty="0"/>
-          </a:p>
-        </p:txBody>
-      </p:sp>
-      <p:sp>
-        <p:nvSpPr>
-          <p:cNvPr id="7" name="Textfeld 6"/>
-          <p:cNvSpPr txBox="1"/>
-          <p:nvPr userDrawn="1"/>
-        </p:nvSpPr>
-        <p:spPr>
-          <a:xfrm>
-            <a:off x="324000" y="6308725"/>
-            <a:ext cx="4248000" cy="459775"/>
-          </a:xfrm>
-          <a:prstGeom prst="rect">
-            <a:avLst/>
-          </a:prstGeom>
-          <a:noFill/>
-        </p:spPr>
-        <p:txBody>
-          <a:bodyPr wrap="square" lIns="0" rIns="0" rtlCol="0" anchor="ctr" anchorCtr="0">
-            <a:noAutofit/>
-          </a:bodyPr>
-          <a:lstStyle/>
-          <a:p>
-            <a:r>
-              <a:rPr lang="en-GB" sz="800" b="1" dirty="0"/>
-              <a:t>Placeholder for organisational unit name / logo</a:t>
-            </a:r>
-            <a:br>
-              <a:rPr lang="en-GB" sz="800" baseline="0" dirty="0"/>
-            </a:br>
-            <a:r>
-              <a:rPr lang="en-GB" sz="800" baseline="0" dirty="0"/>
-              <a:t>(edit in slide master via “View” &gt; “Slide Master”) </a:t>
-            </a:r>
           </a:p>
         </p:txBody>
       </p:sp>
@@ -29103,7 +28736,7 @@
   <p:transition>
     <p:fade/>
   </p:transition>
-  <p:hf hdr="0"/>
+  <p:hf hdr="0" ftr="0"/>
   <p:txStyles>
     <p:titleStyle>
       <a:lvl1pPr algn="l" defTabSz="914400" rtl="0" eaLnBrk="1" latinLnBrk="0" hangingPunct="1">
@@ -30216,9 +29849,10 @@
           </a:lstStyle>
           <a:p>
             <a:r>
-              <a:rPr lang="en-GB" dirty="0"/>
-              <a:t>1.12.2014</a:t>
-            </a:r>
+              <a:rPr lang="en-US" smtClean="0"/>
+              <a:t>22.05.2019</a:t>
+            </a:r>
+            <a:endParaRPr lang="en-GB" dirty="0"/>
           </a:p>
         </p:txBody>
       </p:sp>
@@ -30253,10 +29887,7 @@
             </a:lvl1pPr>
           </a:lstStyle>
           <a:p>
-            <a:r>
-              <a:rPr lang="en-GB" dirty="0"/>
-              <a:t>First name Surname (edit via “Insert” &gt; “Header &amp; Footer”)</a:t>
-            </a:r>
+            <a:endParaRPr lang="en-GB" dirty="0"/>
           </a:p>
         </p:txBody>
       </p:sp>
@@ -30551,6 +30182,10 @@
             <a:r>
               <a:rPr lang="en-GB" sz="800" b="1" dirty="0"/>
               <a:t>Placeholder for organisational unit name / logo</a:t>
+            </a:r>
+            <a:r>
+              <a:rPr lang="en-GB" sz="800" baseline="0" dirty="0"/>
+              <a:t/>
             </a:r>
             <a:br>
               <a:rPr lang="en-GB" sz="800" baseline="0" dirty="0"/>
@@ -30584,7 +30219,7 @@
   <p:transition>
     <p:fade/>
   </p:transition>
-  <p:hf hdr="0"/>
+  <p:hf hdr="0" ftr="0"/>
   <p:txStyles>
     <p:titleStyle>
       <a:lvl1pPr algn="l" defTabSz="914400" rtl="0" eaLnBrk="1" latinLnBrk="0" hangingPunct="1">
@@ -31697,9 +31332,10 @@
           </a:lstStyle>
           <a:p>
             <a:r>
-              <a:rPr lang="en-GB" dirty="0"/>
-              <a:t>1.12.2014</a:t>
-            </a:r>
+              <a:rPr lang="en-US" smtClean="0"/>
+              <a:t>22.05.2019</a:t>
+            </a:r>
+            <a:endParaRPr lang="en-GB" dirty="0"/>
           </a:p>
         </p:txBody>
       </p:sp>
@@ -31734,10 +31370,7 @@
             </a:lvl1pPr>
           </a:lstStyle>
           <a:p>
-            <a:r>
-              <a:rPr lang="en-GB" dirty="0"/>
-              <a:t>First name Surname (edit via “Insert” &gt; “Header &amp; Footer”)</a:t>
-            </a:r>
+            <a:endParaRPr lang="en-GB" dirty="0"/>
           </a:p>
         </p:txBody>
       </p:sp>
@@ -32032,6 +31665,10 @@
             <a:r>
               <a:rPr lang="en-GB" sz="800" b="1" dirty="0"/>
               <a:t>Placeholder for organisational unit name / logo</a:t>
+            </a:r>
+            <a:r>
+              <a:rPr lang="en-GB" sz="800" baseline="0" dirty="0"/>
+              <a:t/>
             </a:r>
             <a:br>
               <a:rPr lang="en-GB" sz="800" baseline="0" dirty="0"/>
@@ -32065,7 +31702,7 @@
   <p:transition>
     <p:fade/>
   </p:transition>
-  <p:hf hdr="0"/>
+  <p:hf hdr="0" ftr="0"/>
   <p:txStyles>
     <p:titleStyle>
       <a:lvl1pPr algn="l" defTabSz="914400" rtl="0" eaLnBrk="1" latinLnBrk="0" hangingPunct="1">
@@ -33178,9 +32815,10 @@
           </a:lstStyle>
           <a:p>
             <a:r>
-              <a:rPr lang="en-GB" dirty="0"/>
-              <a:t>1.12.2014</a:t>
-            </a:r>
+              <a:rPr lang="en-US" smtClean="0"/>
+              <a:t>22.05.2019</a:t>
+            </a:r>
+            <a:endParaRPr lang="en-GB" dirty="0"/>
           </a:p>
         </p:txBody>
       </p:sp>
@@ -33215,10 +32853,7 @@
             </a:lvl1pPr>
           </a:lstStyle>
           <a:p>
-            <a:r>
-              <a:rPr lang="en-GB" dirty="0"/>
-              <a:t>First name Surname (edit via “Insert” &gt; “Header &amp; Footer”)</a:t>
-            </a:r>
+            <a:endParaRPr lang="en-GB" dirty="0"/>
           </a:p>
         </p:txBody>
       </p:sp>
@@ -33513,6 +33148,10 @@
             <a:r>
               <a:rPr lang="en-GB" sz="800" b="1" dirty="0"/>
               <a:t>Placeholder for organisational unit name / logo</a:t>
+            </a:r>
+            <a:r>
+              <a:rPr lang="en-GB" sz="800" baseline="0" dirty="0"/>
+              <a:t/>
             </a:r>
             <a:br>
               <a:rPr lang="en-GB" sz="800" baseline="0" dirty="0"/>
@@ -33546,7 +33185,7 @@
   <p:transition>
     <p:fade/>
   </p:transition>
-  <p:hf hdr="0"/>
+  <p:hf hdr="0" ftr="0"/>
   <p:txStyles>
     <p:titleStyle>
       <a:lvl1pPr algn="l" defTabSz="914400" rtl="0" eaLnBrk="1" latinLnBrk="0" hangingPunct="1">
@@ -34659,9 +34298,10 @@
           </a:lstStyle>
           <a:p>
             <a:r>
-              <a:rPr lang="en-GB" dirty="0"/>
-              <a:t>1.12.2014</a:t>
-            </a:r>
+              <a:rPr lang="en-US" smtClean="0"/>
+              <a:t>22.05.2019</a:t>
+            </a:r>
+            <a:endParaRPr lang="en-GB" dirty="0"/>
           </a:p>
         </p:txBody>
       </p:sp>
@@ -34696,10 +34336,7 @@
             </a:lvl1pPr>
           </a:lstStyle>
           <a:p>
-            <a:r>
-              <a:rPr lang="en-GB" dirty="0"/>
-              <a:t>First name Surname (edit via “Insert” &gt; “Header &amp; Footer”)</a:t>
-            </a:r>
+            <a:endParaRPr lang="en-GB" dirty="0"/>
           </a:p>
         </p:txBody>
       </p:sp>
@@ -34994,6 +34631,10 @@
             <a:r>
               <a:rPr lang="en-GB" sz="800" b="1" dirty="0"/>
               <a:t>Placeholder for organisational unit name / logo</a:t>
+            </a:r>
+            <a:r>
+              <a:rPr lang="en-GB" sz="800" baseline="0" dirty="0"/>
+              <a:t/>
             </a:r>
             <a:br>
               <a:rPr lang="en-GB" sz="800" baseline="0" dirty="0"/>
@@ -35027,7 +34668,7 @@
   <p:transition>
     <p:fade/>
   </p:transition>
-  <p:hf hdr="0"/>
+  <p:hf hdr="0" ftr="0"/>
   <p:txStyles>
     <p:titleStyle>
       <a:lvl1pPr algn="l" defTabSz="914400" rtl="0" eaLnBrk="1" latinLnBrk="0" hangingPunct="1">
@@ -36140,9 +35781,10 @@
           </a:lstStyle>
           <a:p>
             <a:r>
-              <a:rPr lang="en-GB" dirty="0"/>
-              <a:t>1.12.2014</a:t>
-            </a:r>
+              <a:rPr lang="en-US" smtClean="0"/>
+              <a:t>22.05.2019</a:t>
+            </a:r>
+            <a:endParaRPr lang="en-GB" dirty="0"/>
           </a:p>
         </p:txBody>
       </p:sp>
@@ -36177,10 +35819,7 @@
             </a:lvl1pPr>
           </a:lstStyle>
           <a:p>
-            <a:r>
-              <a:rPr lang="en-GB" dirty="0"/>
-              <a:t>First name Surname (edit via “Insert” &gt; “Header &amp; Footer”)</a:t>
-            </a:r>
+            <a:endParaRPr lang="en-GB" dirty="0"/>
           </a:p>
         </p:txBody>
       </p:sp>
@@ -36475,6 +36114,10 @@
             <a:r>
               <a:rPr lang="en-GB" sz="800" b="1" dirty="0"/>
               <a:t>Placeholder for organisational unit name / logo</a:t>
+            </a:r>
+            <a:r>
+              <a:rPr lang="en-GB" sz="800" baseline="0" dirty="0"/>
+              <a:t/>
             </a:r>
             <a:br>
               <a:rPr lang="en-GB" sz="800" baseline="0" dirty="0"/>
@@ -36508,7 +36151,7 @@
   <p:transition>
     <p:fade/>
   </p:transition>
-  <p:hf hdr="0"/>
+  <p:hf hdr="0" ftr="0"/>
   <p:txStyles>
     <p:titleStyle>
       <a:lvl1pPr algn="l" defTabSz="914400" rtl="0" eaLnBrk="1" latinLnBrk="0" hangingPunct="1">
@@ -37621,9 +37264,10 @@
           </a:lstStyle>
           <a:p>
             <a:r>
-              <a:rPr lang="en-GB" dirty="0"/>
-              <a:t>1.12.2014</a:t>
-            </a:r>
+              <a:rPr lang="en-US" smtClean="0"/>
+              <a:t>22.05.2019</a:t>
+            </a:r>
+            <a:endParaRPr lang="en-GB" dirty="0"/>
           </a:p>
         </p:txBody>
       </p:sp>
@@ -37658,10 +37302,7 @@
             </a:lvl1pPr>
           </a:lstStyle>
           <a:p>
-            <a:r>
-              <a:rPr lang="en-GB" dirty="0"/>
-              <a:t>First name Surname (edit via “Insert” &gt; “Header &amp; Footer”)</a:t>
-            </a:r>
+            <a:endParaRPr lang="en-GB" dirty="0"/>
           </a:p>
         </p:txBody>
       </p:sp>
@@ -37956,6 +37597,10 @@
             <a:r>
               <a:rPr lang="en-GB" sz="800" b="1" dirty="0"/>
               <a:t>Placeholder for organisational unit name / logo</a:t>
+            </a:r>
+            <a:r>
+              <a:rPr lang="en-GB" sz="800" baseline="0" dirty="0"/>
+              <a:t/>
             </a:r>
             <a:br>
               <a:rPr lang="en-GB" sz="800" baseline="0" dirty="0"/>
@@ -37989,7 +37634,7 @@
   <p:transition>
     <p:fade/>
   </p:transition>
-  <p:hf hdr="0"/>
+  <p:hf hdr="0" ftr="0"/>
   <p:txStyles>
     <p:titleStyle>
       <a:lvl1pPr algn="l" defTabSz="914400" rtl="0" eaLnBrk="1" latinLnBrk="0" hangingPunct="1">
@@ -39102,9 +38747,10 @@
           </a:lstStyle>
           <a:p>
             <a:r>
-              <a:rPr lang="en-GB" dirty="0"/>
-              <a:t>1.12.2014</a:t>
-            </a:r>
+              <a:rPr lang="en-US" smtClean="0"/>
+              <a:t>22.05.2019</a:t>
+            </a:r>
+            <a:endParaRPr lang="en-GB" dirty="0"/>
           </a:p>
         </p:txBody>
       </p:sp>
@@ -39139,10 +38785,7 @@
             </a:lvl1pPr>
           </a:lstStyle>
           <a:p>
-            <a:r>
-              <a:rPr lang="en-GB" dirty="0"/>
-              <a:t>First name Surname (edit via “Insert” &gt; “Header &amp; Footer”)</a:t>
-            </a:r>
+            <a:endParaRPr lang="en-GB" dirty="0"/>
           </a:p>
         </p:txBody>
       </p:sp>
@@ -39437,6 +39080,10 @@
             <a:r>
               <a:rPr lang="en-GB" sz="800" b="1" dirty="0"/>
               <a:t>Placeholder for organisational unit name / logo</a:t>
+            </a:r>
+            <a:r>
+              <a:rPr lang="en-GB" sz="800" baseline="0" dirty="0"/>
+              <a:t/>
             </a:r>
             <a:br>
               <a:rPr lang="en-GB" sz="800" baseline="0" dirty="0"/>
@@ -39470,7 +39117,7 @@
   <p:transition>
     <p:fade/>
   </p:transition>
-  <p:hf hdr="0"/>
+  <p:hf hdr="0" ftr="0"/>
   <p:txStyles>
     <p:titleStyle>
       <a:lvl1pPr algn="l" defTabSz="914400" rtl="0" eaLnBrk="1" latinLnBrk="0" hangingPunct="1">
@@ -40583,9 +40230,10 @@
           </a:lstStyle>
           <a:p>
             <a:r>
-              <a:rPr lang="en-GB" dirty="0"/>
-              <a:t>1.12.2014</a:t>
-            </a:r>
+              <a:rPr lang="en-US" smtClean="0"/>
+              <a:t>22.05.2019</a:t>
+            </a:r>
+            <a:endParaRPr lang="en-GB" dirty="0"/>
           </a:p>
         </p:txBody>
       </p:sp>
@@ -40620,10 +40268,7 @@
             </a:lvl1pPr>
           </a:lstStyle>
           <a:p>
-            <a:r>
-              <a:rPr lang="en-GB" dirty="0"/>
-              <a:t>First name Surname (edit via “Insert” &gt; “Header &amp; Footer”)</a:t>
-            </a:r>
+            <a:endParaRPr lang="en-GB" dirty="0"/>
           </a:p>
         </p:txBody>
       </p:sp>
@@ -40918,6 +40563,10 @@
             <a:r>
               <a:rPr lang="en-GB" sz="800" b="1" dirty="0"/>
               <a:t>Placeholder for organisational unit name / logo</a:t>
+            </a:r>
+            <a:r>
+              <a:rPr lang="en-GB" sz="800" baseline="0" dirty="0"/>
+              <a:t/>
             </a:r>
             <a:br>
               <a:rPr lang="en-GB" sz="800" baseline="0" dirty="0"/>
@@ -40951,7 +40600,7 @@
   <p:transition>
     <p:fade/>
   </p:transition>
-  <p:hf hdr="0"/>
+  <p:hf hdr="0" ftr="0"/>
   <p:txStyles>
     <p:titleStyle>
       <a:lvl1pPr algn="l" defTabSz="914400" rtl="0" eaLnBrk="1" latinLnBrk="0" hangingPunct="1">
@@ -41330,12 +40979,15 @@
               <a:rPr lang="en-GB" dirty="0"/>
               <a:t>	</a:t>
             </a:r>
-          </a:p>
-          <a:p>
-            <a:r>
-              <a:rPr lang="en-GB" dirty="0"/>
-              <a:t>			presenters : Qian Ding</a:t>
-            </a:r>
+            <a:endParaRPr lang="en-GB" dirty="0"/>
+          </a:p>
+          <a:p>
+            <a:pPr algn="ctr"/>
+            <a:r>
+              <a:rPr lang="en-GB" dirty="0" smtClean="0"/>
+              <a:t>presenters : Qian Ding, Sissi Wang</a:t>
+            </a:r>
+            <a:endParaRPr lang="en-GB" dirty="0"/>
           </a:p>
         </p:txBody>
       </p:sp>
@@ -41355,31 +41007,10 @@
           <a:lstStyle/>
           <a:p>
             <a:r>
-              <a:rPr lang="en-GB" dirty="0"/>
-              <a:t>1.12.2014</a:t>
-            </a:r>
-          </a:p>
-        </p:txBody>
-      </p:sp>
-      <p:sp>
-        <p:nvSpPr>
-          <p:cNvPr id="4" name="Fußzeilenplatzhalter 3"/>
-          <p:cNvSpPr>
-            <a:spLocks noGrp="1"/>
-          </p:cNvSpPr>
-          <p:nvPr>
-            <p:ph type="ftr" sz="quarter" idx="11"/>
-          </p:nvPr>
-        </p:nvSpPr>
-        <p:spPr/>
-        <p:txBody>
-          <a:bodyPr/>
-          <a:lstStyle/>
-          <a:p>
-            <a:r>
-              <a:rPr lang="en-GB" dirty="0"/>
-              <a:t>First name Surname (edit via “Insert” &gt; “Header &amp; Footer”)</a:t>
-            </a:r>
+              <a:rPr lang="en-US" smtClean="0"/>
+              <a:t>22.05.2019</a:t>
+            </a:r>
+            <a:endParaRPr lang="en-GB" dirty="0"/>
           </a:p>
         </p:txBody>
       </p:sp>
@@ -41422,38 +41053,58 @@
           <a:bodyPr/>
           <a:lstStyle/>
           <a:p>
-            <a:r>
-              <a:rPr lang="en-GB" dirty="0"/>
-              <a:t>Observation of the dynamical Casmir effect on a superconducting circuit</a:t>
-            </a:r>
+            <a:pPr algn="ctr"/>
+            <a:r>
+              <a:rPr lang="en-GB" dirty="0" smtClean="0"/>
+              <a:t/>
+            </a:r>
+            <a:br>
+              <a:rPr lang="en-GB" dirty="0" smtClean="0"/>
+            </a:br>
+            <a:r>
+              <a:rPr lang="en-GB" dirty="0" smtClean="0"/>
+              <a:t>Journal club 2019/05/22</a:t>
+            </a:r>
+            <a:endParaRPr lang="en-GB" dirty="0"/>
           </a:p>
         </p:txBody>
       </p:sp>
       <p:pic>
         <p:nvPicPr>
-          <p:cNvPr id="6" name="Bildplatzhalter 5"/>
+          <p:cNvPr id="2" name="Picture 1"/>
           <p:cNvPicPr>
-            <a:picLocks noGrp="1" noChangeAspect="1"/>
+            <a:picLocks noChangeAspect="1"/>
           </p:cNvPicPr>
-          <p:nvPr>
-            <p:ph type="pic" sz="quarter" idx="13"/>
-          </p:nvPr>
+          <p:nvPr/>
         </p:nvPicPr>
         <p:blipFill>
-          <a:blip r:embed="rId2">
-            <a:extLst>
-              <a:ext uri="{28A0092B-C50C-407E-A947-70E740481C1C}">
-                <a14:useLocalDpi xmlns:a14="http://schemas.microsoft.com/office/drawing/2010/main" val="0"/>
-              </a:ext>
-            </a:extLst>
-          </a:blip>
-          <a:srcRect t="34" b="34"/>
+          <a:blip r:embed="rId2"/>
           <a:stretch>
             <a:fillRect/>
           </a:stretch>
         </p:blipFill>
+        <p:spPr>
+          <a:xfrm>
+            <a:off x="341463" y="769199"/>
+            <a:ext cx="8478687" cy="2513257"/>
+          </a:xfrm>
+          <a:prstGeom prst="rect">
+            <a:avLst/>
+          </a:prstGeom>
+        </p:spPr>
+      </p:pic>
+      <p:sp>
+        <p:nvSpPr>
+          <p:cNvPr id="7" name="Picture Placeholder 6"/>
+          <p:cNvSpPr>
+            <a:spLocks noGrp="1"/>
+          </p:cNvSpPr>
+          <p:nvPr>
+            <p:ph type="pic" sz="quarter" idx="13"/>
+          </p:nvPr>
+        </p:nvSpPr>
         <p:spPr/>
-      </p:pic>
+      </p:sp>
     </p:spTree>
     <p:extLst>
       <p:ext uri="{BB962C8B-B14F-4D97-AF65-F5344CB8AC3E}">
@@ -41467,6 +41118,13 @@
   <p:transition>
     <p:fade/>
   </p:transition>
+  <p:timing>
+    <p:tnLst>
+      <p:par>
+        <p:cTn id="1" dur="indefinite" restart="never" nodeType="tmRoot"/>
+      </p:par>
+    </p:tnLst>
+  </p:timing>
 </p:sld>
 </file>
 
@@ -41514,7 +41172,7 @@
             </a:pPr>
             <a:r>
               <a:rPr lang="en-GB" dirty="0"/>
-              <a:t>Two-mode Squeezing   </a:t>
+              <a:t>Broadband Photon Generation   </a:t>
             </a:r>
           </a:p>
           <a:p>
@@ -41525,8 +41183,36 @@
             </a:pPr>
             <a:r>
               <a:rPr lang="en-GB" dirty="0"/>
-              <a:t> two-mode and single mode field squeezing </a:t>
-            </a:r>
+              <a:t>symmetric detuning averaged over frequency at fixed drive power </a:t>
+            </a:r>
+          </a:p>
+          <a:p>
+            <a:pPr marL="361950" lvl="1" indent="0">
+              <a:lnSpc>
+                <a:spcPct val="200000"/>
+              </a:lnSpc>
+              <a:buNone/>
+            </a:pPr>
+            <a:endParaRPr lang="en-GB" dirty="0"/>
+          </a:p>
+          <a:p>
+            <a:pPr lvl="1">
+              <a:lnSpc>
+                <a:spcPct val="200000"/>
+              </a:lnSpc>
+            </a:pPr>
+            <a:endParaRPr lang="en-GB" dirty="0"/>
+          </a:p>
+          <a:p>
+            <a:pPr marL="439737" indent="-342900"/>
+            <a:endParaRPr lang="en-GB" dirty="0"/>
+          </a:p>
+          <a:p>
+            <a:pPr lvl="1"/>
+            <a:endParaRPr lang="en-GB" dirty="0"/>
+          </a:p>
+          <a:p>
+            <a:endParaRPr lang="en-GB" dirty="0"/>
           </a:p>
         </p:txBody>
       </p:sp>
@@ -41546,31 +41232,10 @@
           <a:lstStyle/>
           <a:p>
             <a:r>
-              <a:rPr lang="en-GB" dirty="0"/>
-              <a:t>1.12.2014</a:t>
-            </a:r>
-          </a:p>
-        </p:txBody>
-      </p:sp>
-      <p:sp>
-        <p:nvSpPr>
-          <p:cNvPr id="4" name="Fußzeilenplatzhalter 3"/>
-          <p:cNvSpPr>
-            <a:spLocks noGrp="1"/>
-          </p:cNvSpPr>
-          <p:nvPr>
-            <p:ph type="ftr" sz="quarter" idx="11"/>
-          </p:nvPr>
-        </p:nvSpPr>
-        <p:spPr/>
-        <p:txBody>
-          <a:bodyPr/>
-          <a:lstStyle/>
-          <a:p>
-            <a:r>
-              <a:rPr lang="en-GB" dirty="0"/>
-              <a:t>First name Surname (edit via “Insert” &gt; “Header &amp; Footer”)</a:t>
-            </a:r>
+              <a:rPr lang="en-US" smtClean="0"/>
+              <a:t>22.05.2019</a:t>
+            </a:r>
+            <a:endParaRPr lang="en-GB" dirty="0"/>
           </a:p>
         </p:txBody>
       </p:sp>
@@ -41593,6 +41258,393 @@
               <a:rPr lang="en-GB" smtClean="0"/>
               <a:pPr/>
               <a:t>10</a:t>
+            </a:fld>
+            <a:endParaRPr lang="en-GB" dirty="0"/>
+          </a:p>
+        </p:txBody>
+      </p:sp>
+      <p:sp>
+        <p:nvSpPr>
+          <p:cNvPr id="10" name="Titel 9"/>
+          <p:cNvSpPr>
+            <a:spLocks noGrp="1"/>
+          </p:cNvSpPr>
+          <p:nvPr>
+            <p:ph type="title"/>
+          </p:nvPr>
+        </p:nvSpPr>
+        <p:spPr>
+          <a:xfrm>
+            <a:off x="323850" y="620714"/>
+            <a:ext cx="8496300" cy="647986"/>
+          </a:xfrm>
+        </p:spPr>
+        <p:txBody>
+          <a:bodyPr/>
+          <a:lstStyle/>
+          <a:p>
+            <a:r>
+              <a:rPr lang="en-GB" dirty="0"/>
+              <a:t>Measurements and Observations</a:t>
+            </a:r>
+          </a:p>
+        </p:txBody>
+      </p:sp>
+      <p:pic>
+        <p:nvPicPr>
+          <p:cNvPr id="2" name="Picture 1"/>
+          <p:cNvPicPr>
+            <a:picLocks noChangeAspect="1"/>
+          </p:cNvPicPr>
+          <p:nvPr/>
+        </p:nvPicPr>
+        <p:blipFill rotWithShape="1">
+          <a:blip r:embed="rId2"/>
+          <a:srcRect t="249" r="34022" b="-249"/>
+          <a:stretch/>
+        </p:blipFill>
+        <p:spPr>
+          <a:xfrm>
+            <a:off x="611450" y="3004069"/>
+            <a:ext cx="7680460" cy="2859076"/>
+          </a:xfrm>
+          <a:prstGeom prst="rect">
+            <a:avLst/>
+          </a:prstGeom>
+        </p:spPr>
+      </p:pic>
+    </p:spTree>
+    <p:extLst>
+      <p:ext uri="{BB962C8B-B14F-4D97-AF65-F5344CB8AC3E}">
+        <p14:creationId xmlns:p14="http://schemas.microsoft.com/office/powerpoint/2010/main" val="2044226909"/>
+      </p:ext>
+    </p:extLst>
+  </p:cSld>
+  <p:clrMapOvr>
+    <a:masterClrMapping/>
+  </p:clrMapOvr>
+  <p:transition>
+    <p:fade/>
+  </p:transition>
+</p:sld>
+</file>
+
+<file path=ppt/slides/slide11.xml><?xml version="1.0" encoding="utf-8"?>
+<p:sld xmlns:a="http://schemas.openxmlformats.org/drawingml/2006/main" xmlns:r="http://schemas.openxmlformats.org/officeDocument/2006/relationships" xmlns:p="http://schemas.openxmlformats.org/presentationml/2006/main">
+  <p:cSld>
+    <p:spTree>
+      <p:nvGrpSpPr>
+        <p:cNvPr id="1" name=""/>
+        <p:cNvGrpSpPr/>
+        <p:nvPr/>
+      </p:nvGrpSpPr>
+      <p:grpSpPr>
+        <a:xfrm>
+          <a:off x="0" y="0"/>
+          <a:ext cx="0" cy="0"/>
+          <a:chOff x="0" y="0"/>
+          <a:chExt cx="0" cy="0"/>
+        </a:xfrm>
+      </p:grpSpPr>
+      <p:sp>
+        <p:nvSpPr>
+          <p:cNvPr id="11" name="Inhaltsplatzhalter 10"/>
+          <p:cNvSpPr>
+            <a:spLocks noGrp="1"/>
+          </p:cNvSpPr>
+          <p:nvPr>
+            <p:ph idx="1"/>
+          </p:nvPr>
+        </p:nvSpPr>
+        <p:spPr>
+          <a:xfrm>
+            <a:off x="412624" y="1625648"/>
+            <a:ext cx="8496300" cy="3888539"/>
+          </a:xfrm>
+        </p:spPr>
+        <p:txBody>
+          <a:bodyPr/>
+          <a:lstStyle/>
+          <a:p>
+            <a:pPr>
+              <a:lnSpc>
+                <a:spcPct val="150000"/>
+              </a:lnSpc>
+            </a:pPr>
+            <a:r>
+              <a:rPr lang="en-GB" dirty="0"/>
+              <a:t>Two-mode Squeezing   </a:t>
+            </a:r>
+          </a:p>
+          <a:p>
+            <a:pPr lvl="1">
+              <a:lnSpc>
+                <a:spcPct val="150000"/>
+              </a:lnSpc>
+            </a:pPr>
+            <a:r>
+              <a:rPr lang="en-GB" dirty="0"/>
+              <a:t> observe clear cross-correlations </a:t>
+            </a:r>
+          </a:p>
+          <a:p>
+            <a:pPr marL="361950" lvl="1" indent="0">
+              <a:lnSpc>
+                <a:spcPct val="200000"/>
+              </a:lnSpc>
+              <a:buNone/>
+            </a:pPr>
+            <a:endParaRPr lang="en-GB" dirty="0"/>
+          </a:p>
+          <a:p>
+            <a:pPr lvl="1">
+              <a:lnSpc>
+                <a:spcPct val="200000"/>
+              </a:lnSpc>
+            </a:pPr>
+            <a:endParaRPr lang="en-GB" dirty="0"/>
+          </a:p>
+          <a:p>
+            <a:pPr marL="439737" indent="-342900"/>
+            <a:endParaRPr lang="en-GB" dirty="0"/>
+          </a:p>
+          <a:p>
+            <a:pPr lvl="1"/>
+            <a:endParaRPr lang="en-GB" dirty="0"/>
+          </a:p>
+          <a:p>
+            <a:endParaRPr lang="en-GB" dirty="0"/>
+          </a:p>
+        </p:txBody>
+      </p:sp>
+      <p:sp>
+        <p:nvSpPr>
+          <p:cNvPr id="3" name="Datumsplatzhalter 2"/>
+          <p:cNvSpPr>
+            <a:spLocks noGrp="1"/>
+          </p:cNvSpPr>
+          <p:nvPr>
+            <p:ph type="dt" sz="half" idx="10"/>
+          </p:nvPr>
+        </p:nvSpPr>
+        <p:spPr/>
+        <p:txBody>
+          <a:bodyPr/>
+          <a:lstStyle/>
+          <a:p>
+            <a:r>
+              <a:rPr lang="en-US" smtClean="0"/>
+              <a:t>22.05.2019</a:t>
+            </a:r>
+            <a:endParaRPr lang="en-GB" dirty="0"/>
+          </a:p>
+        </p:txBody>
+      </p:sp>
+      <p:sp>
+        <p:nvSpPr>
+          <p:cNvPr id="5" name="Foliennummernplatzhalter 4"/>
+          <p:cNvSpPr>
+            <a:spLocks noGrp="1"/>
+          </p:cNvSpPr>
+          <p:nvPr>
+            <p:ph type="sldNum" sz="quarter" idx="12"/>
+          </p:nvPr>
+        </p:nvSpPr>
+        <p:spPr/>
+        <p:txBody>
+          <a:bodyPr/>
+          <a:lstStyle/>
+          <a:p>
+            <a:fld id="{6C6AE60A-B69C-4790-82F7-3882EDF23186}" type="slidenum">
+              <a:rPr lang="en-GB" smtClean="0"/>
+              <a:pPr/>
+              <a:t>11</a:t>
+            </a:fld>
+            <a:endParaRPr lang="en-GB" dirty="0"/>
+          </a:p>
+        </p:txBody>
+      </p:sp>
+      <p:sp>
+        <p:nvSpPr>
+          <p:cNvPr id="10" name="Titel 9"/>
+          <p:cNvSpPr>
+            <a:spLocks noGrp="1"/>
+          </p:cNvSpPr>
+          <p:nvPr>
+            <p:ph type="title"/>
+          </p:nvPr>
+        </p:nvSpPr>
+        <p:spPr>
+          <a:xfrm>
+            <a:off x="323850" y="620714"/>
+            <a:ext cx="8496300" cy="647986"/>
+          </a:xfrm>
+        </p:spPr>
+        <p:txBody>
+          <a:bodyPr/>
+          <a:lstStyle/>
+          <a:p>
+            <a:r>
+              <a:rPr lang="en-GB" dirty="0"/>
+              <a:t>Measurements and Observations</a:t>
+            </a:r>
+          </a:p>
+        </p:txBody>
+      </p:sp>
+      <p:pic>
+        <p:nvPicPr>
+          <p:cNvPr id="9" name="Picture 8" descr="A screenshot of a video game&#10;&#10;Description automatically generated">
+            <a:extLst>
+              <a:ext uri="{FF2B5EF4-FFF2-40B4-BE49-F238E27FC236}">
+                <a16:creationId xmlns:a16="http://schemas.microsoft.com/office/drawing/2014/main" id="{AA1F27ED-ED0A-4F35-BB07-A14A2B644225}"/>
+              </a:ext>
+            </a:extLst>
+          </p:cNvPr>
+          <p:cNvPicPr>
+            <a:picLocks noChangeAspect="1"/>
+          </p:cNvPicPr>
+          <p:nvPr/>
+        </p:nvPicPr>
+        <p:blipFill>
+          <a:blip r:embed="rId2">
+            <a:extLst>
+              <a:ext uri="{28A0092B-C50C-407E-A947-70E740481C1C}">
+                <a14:useLocalDpi xmlns:a14="http://schemas.microsoft.com/office/drawing/2010/main" val="0"/>
+              </a:ext>
+            </a:extLst>
+          </a:blip>
+          <a:stretch>
+            <a:fillRect/>
+          </a:stretch>
+        </p:blipFill>
+        <p:spPr>
+          <a:xfrm>
+            <a:off x="1541110" y="2654343"/>
+            <a:ext cx="5911290" cy="3652285"/>
+          </a:xfrm>
+          <a:prstGeom prst="rect">
+            <a:avLst/>
+          </a:prstGeom>
+        </p:spPr>
+      </p:pic>
+    </p:spTree>
+    <p:extLst>
+      <p:ext uri="{BB962C8B-B14F-4D97-AF65-F5344CB8AC3E}">
+        <p14:creationId xmlns:p14="http://schemas.microsoft.com/office/powerpoint/2010/main" val="1335358526"/>
+      </p:ext>
+    </p:extLst>
+  </p:cSld>
+  <p:clrMapOvr>
+    <a:masterClrMapping/>
+  </p:clrMapOvr>
+  <p:transition>
+    <p:fade/>
+  </p:transition>
+</p:sld>
+</file>
+
+<file path=ppt/slides/slide12.xml><?xml version="1.0" encoding="utf-8"?>
+<p:sld xmlns:a="http://schemas.openxmlformats.org/drawingml/2006/main" xmlns:r="http://schemas.openxmlformats.org/officeDocument/2006/relationships" xmlns:p="http://schemas.openxmlformats.org/presentationml/2006/main">
+  <p:cSld>
+    <p:spTree>
+      <p:nvGrpSpPr>
+        <p:cNvPr id="1" name=""/>
+        <p:cNvGrpSpPr/>
+        <p:nvPr/>
+      </p:nvGrpSpPr>
+      <p:grpSpPr>
+        <a:xfrm>
+          <a:off x="0" y="0"/>
+          <a:ext cx="0" cy="0"/>
+          <a:chOff x="0" y="0"/>
+          <a:chExt cx="0" cy="0"/>
+        </a:xfrm>
+      </p:grpSpPr>
+      <p:sp>
+        <p:nvSpPr>
+          <p:cNvPr id="11" name="Inhaltsplatzhalter 10"/>
+          <p:cNvSpPr>
+            <a:spLocks noGrp="1"/>
+          </p:cNvSpPr>
+          <p:nvPr>
+            <p:ph idx="1"/>
+          </p:nvPr>
+        </p:nvSpPr>
+        <p:spPr>
+          <a:xfrm>
+            <a:off x="412624" y="1625648"/>
+            <a:ext cx="8496300" cy="3888539"/>
+          </a:xfrm>
+        </p:spPr>
+        <p:txBody>
+          <a:bodyPr/>
+          <a:lstStyle/>
+          <a:p>
+            <a:pPr>
+              <a:lnSpc>
+                <a:spcPct val="150000"/>
+              </a:lnSpc>
+            </a:pPr>
+            <a:r>
+              <a:rPr lang="en-GB" dirty="0"/>
+              <a:t>Two-mode Squeezing   </a:t>
+            </a:r>
+          </a:p>
+          <a:p>
+            <a:pPr lvl="1">
+              <a:lnSpc>
+                <a:spcPct val="150000"/>
+              </a:lnSpc>
+            </a:pPr>
+            <a:r>
+              <a:rPr lang="en-GB" dirty="0"/>
+              <a:t> two-mode and single mode field squeezing </a:t>
+            </a:r>
+          </a:p>
+        </p:txBody>
+      </p:sp>
+      <p:sp>
+        <p:nvSpPr>
+          <p:cNvPr id="3" name="Datumsplatzhalter 2"/>
+          <p:cNvSpPr>
+            <a:spLocks noGrp="1"/>
+          </p:cNvSpPr>
+          <p:nvPr>
+            <p:ph type="dt" sz="half" idx="10"/>
+          </p:nvPr>
+        </p:nvSpPr>
+        <p:spPr/>
+        <p:txBody>
+          <a:bodyPr/>
+          <a:lstStyle/>
+          <a:p>
+            <a:r>
+              <a:rPr lang="en-US" smtClean="0"/>
+              <a:t>22.05.2019</a:t>
+            </a:r>
+            <a:endParaRPr lang="en-GB" dirty="0"/>
+          </a:p>
+        </p:txBody>
+      </p:sp>
+      <p:sp>
+        <p:nvSpPr>
+          <p:cNvPr id="5" name="Foliennummernplatzhalter 4"/>
+          <p:cNvSpPr>
+            <a:spLocks noGrp="1"/>
+          </p:cNvSpPr>
+          <p:nvPr>
+            <p:ph type="sldNum" sz="quarter" idx="12"/>
+          </p:nvPr>
+        </p:nvSpPr>
+        <p:spPr/>
+        <p:txBody>
+          <a:bodyPr/>
+          <a:lstStyle/>
+          <a:p>
+            <a:fld id="{6C6AE60A-B69C-4790-82F7-3882EDF23186}" type="slidenum">
+              <a:rPr lang="en-GB" smtClean="0"/>
+              <a:pPr/>
+              <a:t>12</a:t>
             </a:fld>
             <a:endParaRPr lang="en-GB" dirty="0"/>
           </a:p>
@@ -41677,7 +41729,7 @@
 </p:sld>
 </file>
 
-<file path=ppt/slides/slide11.xml><?xml version="1.0" encoding="utf-8"?>
+<file path=ppt/slides/slide13.xml><?xml version="1.0" encoding="utf-8"?>
 <p:sld xmlns:a="http://schemas.openxmlformats.org/drawingml/2006/main" xmlns:r="http://schemas.openxmlformats.org/officeDocument/2006/relationships" xmlns:p="http://schemas.openxmlformats.org/presentationml/2006/main">
   <p:cSld>
     <p:spTree>
@@ -41742,31 +41794,10 @@
           <a:lstStyle/>
           <a:p>
             <a:r>
-              <a:rPr lang="en-GB" dirty="0"/>
-              <a:t>1.12.2014</a:t>
-            </a:r>
-          </a:p>
-        </p:txBody>
-      </p:sp>
-      <p:sp>
-        <p:nvSpPr>
-          <p:cNvPr id="4" name="Fußzeilenplatzhalter 3"/>
-          <p:cNvSpPr>
-            <a:spLocks noGrp="1"/>
-          </p:cNvSpPr>
-          <p:nvPr>
-            <p:ph type="ftr" sz="quarter" idx="11"/>
-          </p:nvPr>
-        </p:nvSpPr>
-        <p:spPr/>
-        <p:txBody>
-          <a:bodyPr/>
-          <a:lstStyle/>
-          <a:p>
-            <a:r>
-              <a:rPr lang="en-GB" dirty="0"/>
-              <a:t>First name Surname (edit via “Insert” &gt; “Header &amp; Footer”)</a:t>
-            </a:r>
+              <a:rPr lang="en-US" smtClean="0"/>
+              <a:t>22.05.2019</a:t>
+            </a:r>
+            <a:endParaRPr lang="en-GB" dirty="0"/>
           </a:p>
         </p:txBody>
       </p:sp>
@@ -41788,7 +41819,7 @@
             <a:fld id="{6C6AE60A-B69C-4790-82F7-3882EDF23186}" type="slidenum">
               <a:rPr lang="en-GB" smtClean="0"/>
               <a:pPr/>
-              <a:t>11</a:t>
+              <a:t>13</a:t>
             </a:fld>
             <a:endParaRPr lang="en-GB" dirty="0"/>
           </a:p>
@@ -41837,7 +41868,7 @@
 </p:sld>
 </file>
 
-<file path=ppt/slides/slide12.xml><?xml version="1.0" encoding="utf-8"?>
+<file path=ppt/slides/slide14.xml><?xml version="1.0" encoding="utf-8"?>
 <p:sld xmlns:a="http://schemas.openxmlformats.org/drawingml/2006/main" xmlns:r="http://schemas.openxmlformats.org/officeDocument/2006/relationships" xmlns:p="http://schemas.openxmlformats.org/presentationml/2006/main">
   <p:cSld>
     <p:spTree>
@@ -41870,31 +41901,10 @@
           <a:lstStyle/>
           <a:p>
             <a:r>
-              <a:rPr lang="en-GB" dirty="0"/>
-              <a:t>1.12.2014</a:t>
-            </a:r>
-          </a:p>
-        </p:txBody>
-      </p:sp>
-      <p:sp>
-        <p:nvSpPr>
-          <p:cNvPr id="3" name="Fußzeilenplatzhalter 2"/>
-          <p:cNvSpPr>
-            <a:spLocks noGrp="1"/>
-          </p:cNvSpPr>
-          <p:nvPr>
-            <p:ph type="ftr" sz="quarter" idx="11"/>
-          </p:nvPr>
-        </p:nvSpPr>
-        <p:spPr/>
-        <p:txBody>
-          <a:bodyPr/>
-          <a:lstStyle/>
-          <a:p>
-            <a:r>
-              <a:rPr lang="en-GB" dirty="0"/>
-              <a:t>First name Surname (edit via “Insert” &gt; “Header &amp; Footer”)</a:t>
-            </a:r>
+              <a:rPr lang="en-US" smtClean="0"/>
+              <a:t>22.05.2019</a:t>
+            </a:r>
+            <a:endParaRPr lang="en-GB" dirty="0"/>
           </a:p>
         </p:txBody>
       </p:sp>
@@ -41916,7 +41926,7 @@
             <a:fld id="{6C6AE60A-B69C-4790-82F7-3882EDF23186}" type="slidenum">
               <a:rPr lang="en-GB" smtClean="0"/>
               <a:pPr/>
-              <a:t>12</a:t>
+              <a:t>14</a:t>
             </a:fld>
             <a:endParaRPr lang="en-GB" dirty="0"/>
           </a:p>
@@ -42170,31 +42180,10 @@
           <a:lstStyle/>
           <a:p>
             <a:r>
-              <a:rPr lang="en-GB" dirty="0"/>
-              <a:t>1.12.2014</a:t>
-            </a:r>
-          </a:p>
-        </p:txBody>
-      </p:sp>
-      <p:sp>
-        <p:nvSpPr>
-          <p:cNvPr id="4" name="Fußzeilenplatzhalter 3"/>
-          <p:cNvSpPr>
-            <a:spLocks noGrp="1"/>
-          </p:cNvSpPr>
-          <p:nvPr>
-            <p:ph type="ftr" sz="quarter" idx="11"/>
-          </p:nvPr>
-        </p:nvSpPr>
-        <p:spPr/>
-        <p:txBody>
-          <a:bodyPr/>
-          <a:lstStyle/>
-          <a:p>
-            <a:r>
-              <a:rPr lang="en-GB" dirty="0"/>
-              <a:t>First name Surname (edit via “Insert” &gt; “Header &amp; Footer”)</a:t>
-            </a:r>
+              <a:rPr lang="en-US" smtClean="0"/>
+              <a:t>22.05.2019</a:t>
+            </a:r>
+            <a:endParaRPr lang="en-GB" dirty="0"/>
           </a:p>
         </p:txBody>
       </p:sp>
@@ -42262,6 +42251,13 @@
   <p:transition>
     <p:fade/>
   </p:transition>
+  <p:timing>
+    <p:tnLst>
+      <p:par>
+        <p:cTn id="1" dur="indefinite" restart="never" nodeType="tmRoot"/>
+      </p:par>
+    </p:tnLst>
+  </p:timing>
 </p:sld>
 </file>
 
@@ -42402,31 +42398,10 @@
           <a:lstStyle/>
           <a:p>
             <a:r>
-              <a:rPr lang="en-GB" dirty="0"/>
-              <a:t>1.12.2014</a:t>
-            </a:r>
-          </a:p>
-        </p:txBody>
-      </p:sp>
-      <p:sp>
-        <p:nvSpPr>
-          <p:cNvPr id="4" name="Fußzeilenplatzhalter 3"/>
-          <p:cNvSpPr>
-            <a:spLocks noGrp="1"/>
-          </p:cNvSpPr>
-          <p:nvPr>
-            <p:ph type="ftr" sz="quarter" idx="11"/>
-          </p:nvPr>
-        </p:nvSpPr>
-        <p:spPr/>
-        <p:txBody>
-          <a:bodyPr/>
-          <a:lstStyle/>
-          <a:p>
-            <a:r>
-              <a:rPr lang="en-GB" dirty="0"/>
-              <a:t>First name Surname (edit via “Insert” &gt; “Header &amp; Footer”)</a:t>
-            </a:r>
+              <a:rPr lang="en-US" smtClean="0"/>
+              <a:t>22.05.2019</a:t>
+            </a:r>
+            <a:endParaRPr lang="en-GB" dirty="0"/>
           </a:p>
         </p:txBody>
       </p:sp>
@@ -42609,7 +42584,7 @@
           </a:p>
           <a:p>
             <a:pPr marL="439737" indent="-342900"/>
-            <a:endParaRPr lang="en-GB" dirty="0"/>
+            <a:endParaRPr lang="en-GB" dirty="0" smtClean="0"/>
           </a:p>
           <a:p>
             <a:pPr lvl="1"/>
@@ -42636,31 +42611,10 @@
           <a:lstStyle/>
           <a:p>
             <a:r>
-              <a:rPr lang="en-GB" dirty="0"/>
-              <a:t>1.12.2014</a:t>
-            </a:r>
-          </a:p>
-        </p:txBody>
-      </p:sp>
-      <p:sp>
-        <p:nvSpPr>
-          <p:cNvPr id="4" name="Fußzeilenplatzhalter 3"/>
-          <p:cNvSpPr>
-            <a:spLocks noGrp="1"/>
-          </p:cNvSpPr>
-          <p:nvPr>
-            <p:ph type="ftr" sz="quarter" idx="11"/>
-          </p:nvPr>
-        </p:nvSpPr>
-        <p:spPr/>
-        <p:txBody>
-          <a:bodyPr/>
-          <a:lstStyle/>
-          <a:p>
-            <a:r>
-              <a:rPr lang="en-GB" dirty="0"/>
-              <a:t>First name Surname (edit via “Insert” &gt; “Header &amp; Footer”)</a:t>
-            </a:r>
+              <a:rPr lang="en-US" smtClean="0"/>
+              <a:t>22.05.2019</a:t>
+            </a:r>
+            <a:endParaRPr lang="en-GB" dirty="0"/>
           </a:p>
         </p:txBody>
       </p:sp>
@@ -42860,31 +42814,10 @@
           <a:lstStyle/>
           <a:p>
             <a:r>
-              <a:rPr lang="en-GB" dirty="0"/>
-              <a:t>1.12.2014</a:t>
-            </a:r>
-          </a:p>
-        </p:txBody>
-      </p:sp>
-      <p:sp>
-        <p:nvSpPr>
-          <p:cNvPr id="5" name="Fußzeilenplatzhalter 4"/>
-          <p:cNvSpPr>
-            <a:spLocks noGrp="1"/>
-          </p:cNvSpPr>
-          <p:nvPr>
-            <p:ph type="ftr" sz="quarter" idx="11"/>
-          </p:nvPr>
-        </p:nvSpPr>
-        <p:spPr/>
-        <p:txBody>
-          <a:bodyPr/>
-          <a:lstStyle/>
-          <a:p>
-            <a:r>
-              <a:rPr lang="en-GB" dirty="0"/>
-              <a:t>First name Surname (edit via “Insert” &gt; “Header &amp; Footer”)</a:t>
-            </a:r>
+              <a:rPr lang="en-US" smtClean="0"/>
+              <a:t>22.05.2019</a:t>
+            </a:r>
+            <a:endParaRPr lang="en-GB" dirty="0"/>
           </a:p>
         </p:txBody>
       </p:sp>
@@ -42982,6 +42915,13 @@
   <p:transition>
     <p:fade/>
   </p:transition>
+  <p:timing>
+    <p:tnLst>
+      <p:par>
+        <p:cTn id="1" dur="indefinite" restart="never" nodeType="tmRoot"/>
+      </p:par>
+    </p:tnLst>
+  </p:timing>
 </p:sld>
 </file>
 
@@ -43051,31 +42991,10 @@
           <a:lstStyle/>
           <a:p>
             <a:r>
-              <a:rPr lang="en-GB" dirty="0"/>
-              <a:t>1.12.2014</a:t>
-            </a:r>
-          </a:p>
-        </p:txBody>
-      </p:sp>
-      <p:sp>
-        <p:nvSpPr>
-          <p:cNvPr id="5" name="Fußzeilenplatzhalter 4"/>
-          <p:cNvSpPr>
-            <a:spLocks noGrp="1"/>
-          </p:cNvSpPr>
-          <p:nvPr>
-            <p:ph type="ftr" sz="quarter" idx="11"/>
-          </p:nvPr>
-        </p:nvSpPr>
-        <p:spPr/>
-        <p:txBody>
-          <a:bodyPr/>
-          <a:lstStyle/>
-          <a:p>
-            <a:r>
-              <a:rPr lang="en-GB" dirty="0"/>
-              <a:t>First name Surname (edit via “Insert” &gt; “Header &amp; Footer”)</a:t>
-            </a:r>
+              <a:rPr lang="en-US" smtClean="0"/>
+              <a:t>22.05.2019</a:t>
+            </a:r>
+            <a:endParaRPr lang="en-GB" dirty="0"/>
           </a:p>
         </p:txBody>
       </p:sp>
@@ -43168,6 +43087,13 @@
   <p:transition>
     <p:fade/>
   </p:transition>
+  <p:timing>
+    <p:tnLst>
+      <p:par>
+        <p:cTn id="1" dur="indefinite" restart="never" nodeType="tmRoot"/>
+      </p:par>
+    </p:tnLst>
+  </p:timing>
 </p:sld>
 </file>
 
@@ -43225,9 +43151,10 @@
               </a:lnSpc>
             </a:pPr>
             <a:r>
-              <a:rPr lang="en-GB" dirty="0"/>
-              <a:t>symmetric detuning at fixed drive frequency </a:t>
-            </a:r>
+              <a:rPr lang="en-GB" dirty="0" smtClean="0"/>
+              <a:t>Measure at half the pump frequency</a:t>
+            </a:r>
+            <a:endParaRPr lang="en-GB" dirty="0"/>
           </a:p>
           <a:p>
             <a:pPr marL="361950" lvl="1" indent="0">
@@ -43275,31 +43202,10 @@
           <a:lstStyle/>
           <a:p>
             <a:r>
-              <a:rPr lang="en-GB" dirty="0"/>
-              <a:t>1.12.2014</a:t>
-            </a:r>
-          </a:p>
-        </p:txBody>
-      </p:sp>
-      <p:sp>
-        <p:nvSpPr>
-          <p:cNvPr id="4" name="Fußzeilenplatzhalter 3"/>
-          <p:cNvSpPr>
-            <a:spLocks noGrp="1"/>
-          </p:cNvSpPr>
-          <p:nvPr>
-            <p:ph type="ftr" sz="quarter" idx="11"/>
-          </p:nvPr>
-        </p:nvSpPr>
-        <p:spPr/>
-        <p:txBody>
-          <a:bodyPr/>
-          <a:lstStyle/>
-          <a:p>
-            <a:r>
-              <a:rPr lang="en-GB" dirty="0"/>
-              <a:t>First name Surname (edit via “Insert” &gt; “Header &amp; Footer”)</a:t>
-            </a:r>
+              <a:rPr lang="en-US" smtClean="0"/>
+              <a:t>22.05.2019</a:t>
+            </a:r>
+            <a:endParaRPr lang="en-GB" dirty="0"/>
           </a:p>
         </p:txBody>
       </p:sp>
@@ -43322,6 +43228,275 @@
               <a:rPr lang="en-GB" smtClean="0"/>
               <a:pPr/>
               <a:t>7</a:t>
+            </a:fld>
+            <a:endParaRPr lang="en-GB" dirty="0"/>
+          </a:p>
+        </p:txBody>
+      </p:sp>
+      <p:sp>
+        <p:nvSpPr>
+          <p:cNvPr id="10" name="Titel 9"/>
+          <p:cNvSpPr>
+            <a:spLocks noGrp="1"/>
+          </p:cNvSpPr>
+          <p:nvPr>
+            <p:ph type="title"/>
+          </p:nvPr>
+        </p:nvSpPr>
+        <p:spPr>
+          <a:xfrm>
+            <a:off x="323850" y="620714"/>
+            <a:ext cx="8496300" cy="647986"/>
+          </a:xfrm>
+        </p:spPr>
+        <p:txBody>
+          <a:bodyPr/>
+          <a:lstStyle/>
+          <a:p>
+            <a:r>
+              <a:rPr lang="en-GB" dirty="0"/>
+              <a:t>Measurements and Observations</a:t>
+            </a:r>
+          </a:p>
+        </p:txBody>
+      </p:sp>
+      <p:pic>
+        <p:nvPicPr>
+          <p:cNvPr id="2" name="Picture 1"/>
+          <p:cNvPicPr>
+            <a:picLocks noChangeAspect="1"/>
+          </p:cNvPicPr>
+          <p:nvPr/>
+        </p:nvPicPr>
+        <p:blipFill>
+          <a:blip r:embed="rId2"/>
+          <a:stretch>
+            <a:fillRect/>
+          </a:stretch>
+        </p:blipFill>
+        <p:spPr>
+          <a:xfrm>
+            <a:off x="819880" y="2674000"/>
+            <a:ext cx="7633060" cy="3414790"/>
+          </a:xfrm>
+          <a:prstGeom prst="rect">
+            <a:avLst/>
+          </a:prstGeom>
+        </p:spPr>
+      </p:pic>
+      <p:sp>
+        <p:nvSpPr>
+          <p:cNvPr id="7" name="TextBox 6"/>
+          <p:cNvSpPr txBox="1"/>
+          <p:nvPr/>
+        </p:nvSpPr>
+        <p:spPr>
+          <a:xfrm>
+            <a:off x="1979640" y="6014092"/>
+            <a:ext cx="1563248" cy="369332"/>
+          </a:xfrm>
+          <a:prstGeom prst="rect">
+            <a:avLst/>
+          </a:prstGeom>
+          <a:noFill/>
+        </p:spPr>
+        <p:txBody>
+          <a:bodyPr wrap="none" rtlCol="0">
+            <a:spAutoFit/>
+          </a:bodyPr>
+          <a:lstStyle/>
+          <a:p>
+            <a:r>
+              <a:rPr lang="en-GB" dirty="0" smtClean="0"/>
+              <a:t>~43mm CPW</a:t>
+            </a:r>
+            <a:endParaRPr lang="en-GB" dirty="0"/>
+          </a:p>
+        </p:txBody>
+      </p:sp>
+      <p:sp>
+        <p:nvSpPr>
+          <p:cNvPr id="12" name="TextBox 11"/>
+          <p:cNvSpPr txBox="1"/>
+          <p:nvPr/>
+        </p:nvSpPr>
+        <p:spPr>
+          <a:xfrm>
+            <a:off x="5564313" y="6014092"/>
+            <a:ext cx="1627369" cy="369332"/>
+          </a:xfrm>
+          <a:prstGeom prst="rect">
+            <a:avLst/>
+          </a:prstGeom>
+          <a:noFill/>
+        </p:spPr>
+        <p:txBody>
+          <a:bodyPr wrap="none" rtlCol="0">
+            <a:spAutoFit/>
+          </a:bodyPr>
+          <a:lstStyle/>
+          <a:p>
+            <a:r>
+              <a:rPr lang="en-GB" dirty="0" smtClean="0"/>
+              <a:t>~0.1mm CPW</a:t>
+            </a:r>
+            <a:endParaRPr lang="en-GB" dirty="0"/>
+          </a:p>
+        </p:txBody>
+      </p:sp>
+    </p:spTree>
+    <p:extLst>
+      <p:ext uri="{BB962C8B-B14F-4D97-AF65-F5344CB8AC3E}">
+        <p14:creationId xmlns:p14="http://schemas.microsoft.com/office/powerpoint/2010/main" val="545705041"/>
+      </p:ext>
+    </p:extLst>
+  </p:cSld>
+  <p:clrMapOvr>
+    <a:masterClrMapping/>
+  </p:clrMapOvr>
+  <p:transition>
+    <p:fade/>
+  </p:transition>
+  <p:timing>
+    <p:tnLst>
+      <p:par>
+        <p:cTn id="1" dur="indefinite" restart="never" nodeType="tmRoot"/>
+      </p:par>
+    </p:tnLst>
+  </p:timing>
+</p:sld>
+</file>
+
+<file path=ppt/slides/slide8.xml><?xml version="1.0" encoding="utf-8"?>
+<p:sld xmlns:a="http://schemas.openxmlformats.org/drawingml/2006/main" xmlns:r="http://schemas.openxmlformats.org/officeDocument/2006/relationships" xmlns:p="http://schemas.openxmlformats.org/presentationml/2006/main">
+  <p:cSld>
+    <p:spTree>
+      <p:nvGrpSpPr>
+        <p:cNvPr id="1" name=""/>
+        <p:cNvGrpSpPr/>
+        <p:nvPr/>
+      </p:nvGrpSpPr>
+      <p:grpSpPr>
+        <a:xfrm>
+          <a:off x="0" y="0"/>
+          <a:ext cx="0" cy="0"/>
+          <a:chOff x="0" y="0"/>
+          <a:chExt cx="0" cy="0"/>
+        </a:xfrm>
+      </p:grpSpPr>
+      <p:sp>
+        <p:nvSpPr>
+          <p:cNvPr id="11" name="Inhaltsplatzhalter 10"/>
+          <p:cNvSpPr>
+            <a:spLocks noGrp="1"/>
+          </p:cNvSpPr>
+          <p:nvPr>
+            <p:ph idx="1"/>
+          </p:nvPr>
+        </p:nvSpPr>
+        <p:spPr>
+          <a:xfrm>
+            <a:off x="412624" y="1625648"/>
+            <a:ext cx="8496300" cy="3888539"/>
+          </a:xfrm>
+        </p:spPr>
+        <p:txBody>
+          <a:bodyPr/>
+          <a:lstStyle/>
+          <a:p>
+            <a:pPr>
+              <a:lnSpc>
+                <a:spcPct val="150000"/>
+              </a:lnSpc>
+            </a:pPr>
+            <a:r>
+              <a:rPr lang="en-GB" dirty="0"/>
+              <a:t>Broadband Photon Generation   </a:t>
+            </a:r>
+          </a:p>
+          <a:p>
+            <a:pPr lvl="1">
+              <a:lnSpc>
+                <a:spcPct val="150000"/>
+              </a:lnSpc>
+            </a:pPr>
+            <a:r>
+              <a:rPr lang="en-GB" dirty="0"/>
+              <a:t>symmetric detuning at fixed drive frequency </a:t>
+            </a:r>
+          </a:p>
+          <a:p>
+            <a:pPr marL="361950" lvl="1" indent="0">
+              <a:lnSpc>
+                <a:spcPct val="200000"/>
+              </a:lnSpc>
+              <a:buNone/>
+            </a:pPr>
+            <a:endParaRPr lang="en-GB" dirty="0"/>
+          </a:p>
+          <a:p>
+            <a:pPr lvl="1">
+              <a:lnSpc>
+                <a:spcPct val="200000"/>
+              </a:lnSpc>
+            </a:pPr>
+            <a:endParaRPr lang="en-GB" dirty="0"/>
+          </a:p>
+          <a:p>
+            <a:pPr marL="439737" indent="-342900"/>
+            <a:endParaRPr lang="en-GB" dirty="0"/>
+          </a:p>
+          <a:p>
+            <a:pPr lvl="1"/>
+            <a:endParaRPr lang="en-GB" dirty="0"/>
+          </a:p>
+          <a:p>
+            <a:endParaRPr lang="en-GB" dirty="0"/>
+          </a:p>
+        </p:txBody>
+      </p:sp>
+      <p:sp>
+        <p:nvSpPr>
+          <p:cNvPr id="3" name="Datumsplatzhalter 2"/>
+          <p:cNvSpPr>
+            <a:spLocks noGrp="1"/>
+          </p:cNvSpPr>
+          <p:nvPr>
+            <p:ph type="dt" sz="half" idx="10"/>
+          </p:nvPr>
+        </p:nvSpPr>
+        <p:spPr/>
+        <p:txBody>
+          <a:bodyPr/>
+          <a:lstStyle/>
+          <a:p>
+            <a:r>
+              <a:rPr lang="en-US" smtClean="0"/>
+              <a:t>22.05.2019</a:t>
+            </a:r>
+            <a:endParaRPr lang="en-GB" dirty="0"/>
+          </a:p>
+        </p:txBody>
+      </p:sp>
+      <p:sp>
+        <p:nvSpPr>
+          <p:cNvPr id="5" name="Foliennummernplatzhalter 4"/>
+          <p:cNvSpPr>
+            <a:spLocks noGrp="1"/>
+          </p:cNvSpPr>
+          <p:nvPr>
+            <p:ph type="sldNum" sz="quarter" idx="12"/>
+          </p:nvPr>
+        </p:nvSpPr>
+        <p:spPr/>
+        <p:txBody>
+          <a:bodyPr/>
+          <a:lstStyle/>
+          <a:p>
+            <a:fld id="{6C6AE60A-B69C-4790-82F7-3882EDF23186}" type="slidenum">
+              <a:rPr lang="en-GB" smtClean="0"/>
+              <a:pPr/>
+              <a:t>8</a:t>
             </a:fld>
             <a:endParaRPr lang="en-GB" dirty="0"/>
           </a:p>
@@ -43393,242 +43568,7 @@
     </p:spTree>
     <p:extLst>
       <p:ext uri="{BB962C8B-B14F-4D97-AF65-F5344CB8AC3E}">
-        <p14:creationId xmlns:p14="http://schemas.microsoft.com/office/powerpoint/2010/main" val="545705041"/>
-      </p:ext>
-    </p:extLst>
-  </p:cSld>
-  <p:clrMapOvr>
-    <a:masterClrMapping/>
-  </p:clrMapOvr>
-  <p:transition>
-    <p:fade/>
-  </p:transition>
-</p:sld>
-</file>
-
-<file path=ppt/slides/slide8.xml><?xml version="1.0" encoding="utf-8"?>
-<p:sld xmlns:a="http://schemas.openxmlformats.org/drawingml/2006/main" xmlns:r="http://schemas.openxmlformats.org/officeDocument/2006/relationships" xmlns:p="http://schemas.openxmlformats.org/presentationml/2006/main">
-  <p:cSld>
-    <p:spTree>
-      <p:nvGrpSpPr>
-        <p:cNvPr id="1" name=""/>
-        <p:cNvGrpSpPr/>
-        <p:nvPr/>
-      </p:nvGrpSpPr>
-      <p:grpSpPr>
-        <a:xfrm>
-          <a:off x="0" y="0"/>
-          <a:ext cx="0" cy="0"/>
-          <a:chOff x="0" y="0"/>
-          <a:chExt cx="0" cy="0"/>
-        </a:xfrm>
-      </p:grpSpPr>
-      <p:sp>
-        <p:nvSpPr>
-          <p:cNvPr id="11" name="Inhaltsplatzhalter 10"/>
-          <p:cNvSpPr>
-            <a:spLocks noGrp="1"/>
-          </p:cNvSpPr>
-          <p:nvPr>
-            <p:ph idx="1"/>
-          </p:nvPr>
-        </p:nvSpPr>
-        <p:spPr>
-          <a:xfrm>
-            <a:off x="412624" y="1625648"/>
-            <a:ext cx="8496300" cy="3888539"/>
-          </a:xfrm>
-        </p:spPr>
-        <p:txBody>
-          <a:bodyPr/>
-          <a:lstStyle/>
-          <a:p>
-            <a:pPr>
-              <a:lnSpc>
-                <a:spcPct val="150000"/>
-              </a:lnSpc>
-            </a:pPr>
-            <a:r>
-              <a:rPr lang="en-GB" dirty="0"/>
-              <a:t>Broadband Photon Generation   </a:t>
-            </a:r>
-          </a:p>
-          <a:p>
-            <a:pPr lvl="1">
-              <a:lnSpc>
-                <a:spcPct val="150000"/>
-              </a:lnSpc>
-            </a:pPr>
-            <a:r>
-              <a:rPr lang="en-GB" dirty="0"/>
-              <a:t>symmetric detuning averaged over frequency at fixed drive power </a:t>
-            </a:r>
-          </a:p>
-          <a:p>
-            <a:pPr marL="361950" lvl="1" indent="0">
-              <a:lnSpc>
-                <a:spcPct val="200000"/>
-              </a:lnSpc>
-              <a:buNone/>
-            </a:pPr>
-            <a:endParaRPr lang="en-GB" dirty="0"/>
-          </a:p>
-          <a:p>
-            <a:pPr lvl="1">
-              <a:lnSpc>
-                <a:spcPct val="200000"/>
-              </a:lnSpc>
-            </a:pPr>
-            <a:endParaRPr lang="en-GB" dirty="0"/>
-          </a:p>
-          <a:p>
-            <a:pPr marL="439737" indent="-342900"/>
-            <a:endParaRPr lang="en-GB" dirty="0"/>
-          </a:p>
-          <a:p>
-            <a:pPr lvl="1"/>
-            <a:endParaRPr lang="en-GB" dirty="0"/>
-          </a:p>
-          <a:p>
-            <a:endParaRPr lang="en-GB" dirty="0"/>
-          </a:p>
-        </p:txBody>
-      </p:sp>
-      <p:sp>
-        <p:nvSpPr>
-          <p:cNvPr id="3" name="Datumsplatzhalter 2"/>
-          <p:cNvSpPr>
-            <a:spLocks noGrp="1"/>
-          </p:cNvSpPr>
-          <p:nvPr>
-            <p:ph type="dt" sz="half" idx="10"/>
-          </p:nvPr>
-        </p:nvSpPr>
-        <p:spPr/>
-        <p:txBody>
-          <a:bodyPr/>
-          <a:lstStyle/>
-          <a:p>
-            <a:r>
-              <a:rPr lang="en-GB" dirty="0"/>
-              <a:t>1.12.2014</a:t>
-            </a:r>
-          </a:p>
-        </p:txBody>
-      </p:sp>
-      <p:sp>
-        <p:nvSpPr>
-          <p:cNvPr id="4" name="Fußzeilenplatzhalter 3"/>
-          <p:cNvSpPr>
-            <a:spLocks noGrp="1"/>
-          </p:cNvSpPr>
-          <p:nvPr>
-            <p:ph type="ftr" sz="quarter" idx="11"/>
-          </p:nvPr>
-        </p:nvSpPr>
-        <p:spPr/>
-        <p:txBody>
-          <a:bodyPr/>
-          <a:lstStyle/>
-          <a:p>
-            <a:r>
-              <a:rPr lang="en-GB" dirty="0"/>
-              <a:t>First name Surname (edit via “Insert” &gt; “Header &amp; Footer”)</a:t>
-            </a:r>
-          </a:p>
-        </p:txBody>
-      </p:sp>
-      <p:sp>
-        <p:nvSpPr>
-          <p:cNvPr id="5" name="Foliennummernplatzhalter 4"/>
-          <p:cNvSpPr>
-            <a:spLocks noGrp="1"/>
-          </p:cNvSpPr>
-          <p:nvPr>
-            <p:ph type="sldNum" sz="quarter" idx="12"/>
-          </p:nvPr>
-        </p:nvSpPr>
-        <p:spPr/>
-        <p:txBody>
-          <a:bodyPr/>
-          <a:lstStyle/>
-          <a:p>
-            <a:fld id="{6C6AE60A-B69C-4790-82F7-3882EDF23186}" type="slidenum">
-              <a:rPr lang="en-GB" smtClean="0"/>
-              <a:pPr/>
-              <a:t>8</a:t>
-            </a:fld>
-            <a:endParaRPr lang="en-GB" dirty="0"/>
-          </a:p>
-        </p:txBody>
-      </p:sp>
-      <p:sp>
-        <p:nvSpPr>
-          <p:cNvPr id="10" name="Titel 9"/>
-          <p:cNvSpPr>
-            <a:spLocks noGrp="1"/>
-          </p:cNvSpPr>
-          <p:nvPr>
-            <p:ph type="title"/>
-          </p:nvPr>
-        </p:nvSpPr>
-        <p:spPr>
-          <a:xfrm>
-            <a:off x="323850" y="620714"/>
-            <a:ext cx="8496300" cy="647986"/>
-          </a:xfrm>
-        </p:spPr>
-        <p:txBody>
-          <a:bodyPr/>
-          <a:lstStyle/>
-          <a:p>
-            <a:r>
-              <a:rPr lang="en-GB" dirty="0"/>
-              <a:t>Measurements and Observations</a:t>
-            </a:r>
-          </a:p>
-        </p:txBody>
-      </p:sp>
-      <p:pic>
-        <p:nvPicPr>
-          <p:cNvPr id="8" name="Picture 7" descr="A screenshot of a cell phone&#10;&#10;Description automatically generated">
-            <a:extLst>
-              <a:ext uri="{FF2B5EF4-FFF2-40B4-BE49-F238E27FC236}">
-                <a16:creationId xmlns:a16="http://schemas.microsoft.com/office/drawing/2014/main" id="{12A3E209-7CB4-46D3-8FBA-4DA616C6E644}"/>
-              </a:ext>
-            </a:extLst>
-          </p:cNvPr>
-          <p:cNvPicPr>
-            <a:picLocks noChangeAspect="1"/>
-          </p:cNvPicPr>
-          <p:nvPr/>
-        </p:nvPicPr>
-        <p:blipFill>
-          <a:blip r:embed="rId2">
-            <a:extLst>
-              <a:ext uri="{28A0092B-C50C-407E-A947-70E740481C1C}">
-                <a14:useLocalDpi xmlns:a14="http://schemas.microsoft.com/office/drawing/2010/main" val="0"/>
-              </a:ext>
-            </a:extLst>
-          </a:blip>
-          <a:stretch>
-            <a:fillRect/>
-          </a:stretch>
-        </p:blipFill>
-        <p:spPr>
-          <a:xfrm>
-            <a:off x="837561" y="3140960"/>
-            <a:ext cx="7468877" cy="2871654"/>
-          </a:xfrm>
-          <a:prstGeom prst="rect">
-            <a:avLst/>
-          </a:prstGeom>
-        </p:spPr>
-      </p:pic>
-    </p:spTree>
-    <p:extLst>
-      <p:ext uri="{BB962C8B-B14F-4D97-AF65-F5344CB8AC3E}">
-        <p14:creationId xmlns:p14="http://schemas.microsoft.com/office/powerpoint/2010/main" val="1536775088"/>
+        <p14:creationId xmlns:p14="http://schemas.microsoft.com/office/powerpoint/2010/main" val="764411184"/>
       </p:ext>
     </p:extLst>
   </p:cSld>
@@ -43685,7 +43625,7 @@
             </a:pPr>
             <a:r>
               <a:rPr lang="en-GB" dirty="0"/>
-              <a:t>Two-mode Squeezing   </a:t>
+              <a:t>Broadband Photon Generation   </a:t>
             </a:r>
           </a:p>
           <a:p>
@@ -43696,7 +43636,7 @@
             </a:pPr>
             <a:r>
               <a:rPr lang="en-GB" dirty="0"/>
-              <a:t> observe clear cross-correlations </a:t>
+              <a:t>symmetric detuning averaged over frequency at fixed drive power </a:t>
             </a:r>
           </a:p>
           <a:p>
@@ -43745,31 +43685,10 @@
           <a:lstStyle/>
           <a:p>
             <a:r>
-              <a:rPr lang="en-GB" dirty="0"/>
-              <a:t>1.12.2014</a:t>
-            </a:r>
-          </a:p>
-        </p:txBody>
-      </p:sp>
-      <p:sp>
-        <p:nvSpPr>
-          <p:cNvPr id="4" name="Fußzeilenplatzhalter 3"/>
-          <p:cNvSpPr>
-            <a:spLocks noGrp="1"/>
-          </p:cNvSpPr>
-          <p:nvPr>
-            <p:ph type="ftr" sz="quarter" idx="11"/>
-          </p:nvPr>
-        </p:nvSpPr>
-        <p:spPr/>
-        <p:txBody>
-          <a:bodyPr/>
-          <a:lstStyle/>
-          <a:p>
-            <a:r>
-              <a:rPr lang="en-GB" dirty="0"/>
-              <a:t>First name Surname (edit via “Insert” &gt; “Header &amp; Footer”)</a:t>
-            </a:r>
+              <a:rPr lang="en-US" smtClean="0"/>
+              <a:t>22.05.2019</a:t>
+            </a:r>
+            <a:endParaRPr lang="en-GB" dirty="0"/>
           </a:p>
         </p:txBody>
       </p:sp>
@@ -43826,34 +43745,21 @@
       </p:sp>
       <p:pic>
         <p:nvPicPr>
-          <p:cNvPr id="9" name="Picture 8" descr="A screenshot of a video game&#10;&#10;Description automatically generated">
-            <a:extLst>
-              <a:ext uri="{FF2B5EF4-FFF2-40B4-BE49-F238E27FC236}">
-                <a16:creationId xmlns:a16="http://schemas.microsoft.com/office/drawing/2014/main" id="{AA1F27ED-ED0A-4F35-BB07-A14A2B644225}"/>
-              </a:ext>
-            </a:extLst>
-          </p:cNvPr>
+          <p:cNvPr id="2" name="Picture 1"/>
           <p:cNvPicPr>
             <a:picLocks noChangeAspect="1"/>
           </p:cNvPicPr>
           <p:nvPr/>
         </p:nvPicPr>
-        <p:blipFill>
-          <a:blip r:embed="rId2">
-            <a:extLst>
-              <a:ext uri="{28A0092B-C50C-407E-A947-70E740481C1C}">
-                <a14:useLocalDpi xmlns:a14="http://schemas.microsoft.com/office/drawing/2010/main" val="0"/>
-              </a:ext>
-            </a:extLst>
-          </a:blip>
-          <a:stretch>
-            <a:fillRect/>
-          </a:stretch>
+        <p:blipFill rotWithShape="1">
+          <a:blip r:embed="rId2"/>
+          <a:srcRect l="34022"/>
+          <a:stretch/>
         </p:blipFill>
         <p:spPr>
           <a:xfrm>
-            <a:off x="1541110" y="2654343"/>
-            <a:ext cx="5911290" cy="3652285"/>
+            <a:off x="611450" y="3004069"/>
+            <a:ext cx="7680460" cy="2859076"/>
           </a:xfrm>
           <a:prstGeom prst="rect">
             <a:avLst/>
@@ -43863,7 +43769,7 @@
     </p:spTree>
     <p:extLst>
       <p:ext uri="{BB962C8B-B14F-4D97-AF65-F5344CB8AC3E}">
-        <p14:creationId xmlns:p14="http://schemas.microsoft.com/office/powerpoint/2010/main" val="1335358526"/>
+        <p14:creationId xmlns:p14="http://schemas.microsoft.com/office/powerpoint/2010/main" val="1536775088"/>
       </p:ext>
     </p:extLst>
   </p:cSld>

</xml_diff>

<commit_message>
updated experimental TMS bit
</commit_message>
<xml_diff>
--- a/QMO_2019_prepsentation_draft1.pptx
+++ b/QMO_2019_prepsentation_draft1.pptx
@@ -41384,16 +41384,20 @@
             </a:pPr>
             <a:r>
               <a:rPr lang="en-GB" dirty="0"/>
-              <a:t> observe clear cross-correlations </a:t>
-            </a:r>
-          </a:p>
-          <a:p>
-            <a:pPr marL="361950" lvl="1" indent="0">
-              <a:lnSpc>
-                <a:spcPct val="200000"/>
-              </a:lnSpc>
-              <a:buNone/>
-            </a:pPr>
+              <a:t> observe </a:t>
+            </a:r>
+            <a:r>
+              <a:rPr lang="en-GB" dirty="0" smtClean="0"/>
+              <a:t>25% </a:t>
+            </a:r>
+            <a:r>
+              <a:rPr lang="en-GB" dirty="0"/>
+              <a:t>cross-correlations </a:t>
+            </a:r>
+            <a:r>
+              <a:rPr lang="en-GB" dirty="0" smtClean="0"/>
+              <a:t>(~1000x parasitic amplifier corr.)</a:t>
+            </a:r>
             <a:endParaRPr lang="en-GB" dirty="0"/>
           </a:p>
           <a:p>
@@ -41519,14 +41523,731 @@
         </p:blipFill>
         <p:spPr>
           <a:xfrm>
-            <a:off x="1541110" y="2654343"/>
-            <a:ext cx="5911290" cy="3652285"/>
+            <a:off x="539440" y="2976499"/>
+            <a:ext cx="5277812" cy="3260891"/>
           </a:xfrm>
           <a:prstGeom prst="rect">
             <a:avLst/>
           </a:prstGeom>
         </p:spPr>
       </p:pic>
+      <mc:AlternateContent xmlns:mc="http://schemas.openxmlformats.org/markup-compatibility/2006">
+        <mc:Choice xmlns:a14="http://schemas.microsoft.com/office/drawing/2010/main" Requires="a14">
+          <p:sp>
+            <p:nvSpPr>
+              <p:cNvPr id="6" name="TextBox 5"/>
+              <p:cNvSpPr txBox="1"/>
+              <p:nvPr/>
+            </p:nvSpPr>
+            <p:spPr>
+              <a:xfrm>
+                <a:off x="5715209" y="3784109"/>
+                <a:ext cx="2528449" cy="369332"/>
+              </a:xfrm>
+              <a:prstGeom prst="rect">
+                <a:avLst/>
+              </a:prstGeom>
+              <a:noFill/>
+            </p:spPr>
+            <p:txBody>
+              <a:bodyPr wrap="none" rtlCol="0">
+                <a:spAutoFit/>
+              </a:bodyPr>
+              <a:lstStyle/>
+              <a:p>
+                <a14:m>
+                  <m:oMathPara xmlns:m="http://schemas.openxmlformats.org/officeDocument/2006/math">
+                    <m:oMathParaPr>
+                      <m:jc m:val="centerGroup"/>
+                    </m:oMathParaPr>
+                    <m:oMath xmlns:m="http://schemas.openxmlformats.org/officeDocument/2006/math">
+                      <m:sSub>
+                        <m:sSubPr>
+                          <m:ctrlPr>
+                            <a:rPr lang="en-GB" i="1" smtClean="0">
+                              <a:latin typeface="Cambria Math" panose="02040503050406030204" pitchFamily="18" charset="0"/>
+                            </a:rPr>
+                          </m:ctrlPr>
+                        </m:sSubPr>
+                        <m:e>
+                          <m:r>
+                            <a:rPr lang="en-GB" i="1" smtClean="0">
+                              <a:latin typeface="Cambria Math" panose="02040503050406030204" pitchFamily="18" charset="0"/>
+                              <a:ea typeface="Cambria Math" panose="02040503050406030204" pitchFamily="18" charset="0"/>
+                            </a:rPr>
+                            <m:t>𝜎</m:t>
+                          </m:r>
+                        </m:e>
+                        <m:sub>
+                          <m:r>
+                            <a:rPr lang="en-GB" b="0" i="1" smtClean="0">
+                              <a:latin typeface="Cambria Math" panose="02040503050406030204" pitchFamily="18" charset="0"/>
+                            </a:rPr>
+                            <m:t>2</m:t>
+                          </m:r>
+                        </m:sub>
+                      </m:sSub>
+                      <m:r>
+                        <a:rPr lang="en-GB" i="1">
+                          <a:latin typeface="Cambria Math" panose="02040503050406030204" pitchFamily="18" charset="0"/>
+                          <a:ea typeface="Cambria Math" panose="02040503050406030204" pitchFamily="18" charset="0"/>
+                        </a:rPr>
+                        <m:t>∝</m:t>
+                      </m:r>
+                      <m:r>
+                        <a:rPr lang="en-GB" b="0" i="1" smtClean="0">
+                          <a:latin typeface="Cambria Math" panose="02040503050406030204" pitchFamily="18" charset="0"/>
+                          <a:ea typeface="Cambria Math" panose="02040503050406030204" pitchFamily="18" charset="0"/>
+                        </a:rPr>
+                        <m:t> </m:t>
+                      </m:r>
+                      <m:d>
+                        <m:dPr>
+                          <m:begChr m:val="⟨"/>
+                          <m:endChr m:val="⟩"/>
+                          <m:ctrlPr>
+                            <a:rPr lang="en-GB" b="0" i="1" smtClean="0">
+                              <a:latin typeface="Cambria Math" panose="02040503050406030204" pitchFamily="18" charset="0"/>
+                              <a:ea typeface="Cambria Math" panose="02040503050406030204" pitchFamily="18" charset="0"/>
+                            </a:rPr>
+                          </m:ctrlPr>
+                        </m:dPr>
+                        <m:e>
+                          <m:sSub>
+                            <m:sSubPr>
+                              <m:ctrlPr>
+                                <a:rPr lang="en-GB" b="0" i="1" smtClean="0">
+                                  <a:latin typeface="Cambria Math" panose="02040503050406030204" pitchFamily="18" charset="0"/>
+                                  <a:ea typeface="Cambria Math" panose="02040503050406030204" pitchFamily="18" charset="0"/>
+                                </a:rPr>
+                              </m:ctrlPr>
+                            </m:sSubPr>
+                            <m:e>
+                              <m:r>
+                                <a:rPr lang="en-GB" b="0" i="1" smtClean="0">
+                                  <a:latin typeface="Cambria Math" panose="02040503050406030204" pitchFamily="18" charset="0"/>
+                                  <a:ea typeface="Cambria Math" panose="02040503050406030204" pitchFamily="18" charset="0"/>
+                                </a:rPr>
+                                <m:t>𝐼</m:t>
+                              </m:r>
+                            </m:e>
+                            <m:sub>
+                              <m:r>
+                                <a:rPr lang="en-GB" b="0" i="1" smtClean="0">
+                                  <a:latin typeface="Cambria Math" panose="02040503050406030204" pitchFamily="18" charset="0"/>
+                                  <a:ea typeface="Cambria Math" panose="02040503050406030204" pitchFamily="18" charset="0"/>
+                                </a:rPr>
+                                <m:t>+</m:t>
+                              </m:r>
+                            </m:sub>
+                          </m:sSub>
+                          <m:sSub>
+                            <m:sSubPr>
+                              <m:ctrlPr>
+                                <a:rPr lang="en-GB" i="1">
+                                  <a:latin typeface="Cambria Math" panose="02040503050406030204" pitchFamily="18" charset="0"/>
+                                  <a:ea typeface="Cambria Math" panose="02040503050406030204" pitchFamily="18" charset="0"/>
+                                </a:rPr>
+                              </m:ctrlPr>
+                            </m:sSubPr>
+                            <m:e>
+                              <m:r>
+                                <a:rPr lang="en-GB" i="1">
+                                  <a:latin typeface="Cambria Math" panose="02040503050406030204" pitchFamily="18" charset="0"/>
+                                  <a:ea typeface="Cambria Math" panose="02040503050406030204" pitchFamily="18" charset="0"/>
+                                </a:rPr>
+                                <m:t>𝐼</m:t>
+                              </m:r>
+                            </m:e>
+                            <m:sub>
+                              <m:r>
+                                <a:rPr lang="en-GB" b="0" i="1" smtClean="0">
+                                  <a:latin typeface="Cambria Math" panose="02040503050406030204" pitchFamily="18" charset="0"/>
+                                  <a:ea typeface="Cambria Math" panose="02040503050406030204" pitchFamily="18" charset="0"/>
+                                </a:rPr>
+                                <m:t>−</m:t>
+                              </m:r>
+                            </m:sub>
+                          </m:sSub>
+                        </m:e>
+                      </m:d>
+                      <m:r>
+                        <a:rPr lang="en-GB" b="0" i="0" smtClean="0">
+                          <a:latin typeface="Cambria Math" panose="02040503050406030204" pitchFamily="18" charset="0"/>
+                          <a:ea typeface="Cambria Math" panose="02040503050406030204" pitchFamily="18" charset="0"/>
+                        </a:rPr>
+                        <m:t> −</m:t>
+                      </m:r>
+                      <m:d>
+                        <m:dPr>
+                          <m:begChr m:val="⟨"/>
+                          <m:endChr m:val="⟩"/>
+                          <m:ctrlPr>
+                            <a:rPr lang="en-GB" i="1">
+                              <a:latin typeface="Cambria Math" panose="02040503050406030204" pitchFamily="18" charset="0"/>
+                              <a:ea typeface="Cambria Math" panose="02040503050406030204" pitchFamily="18" charset="0"/>
+                            </a:rPr>
+                          </m:ctrlPr>
+                        </m:dPr>
+                        <m:e>
+                          <m:sSub>
+                            <m:sSubPr>
+                              <m:ctrlPr>
+                                <a:rPr lang="en-GB" i="1">
+                                  <a:latin typeface="Cambria Math" panose="02040503050406030204" pitchFamily="18" charset="0"/>
+                                  <a:ea typeface="Cambria Math" panose="02040503050406030204" pitchFamily="18" charset="0"/>
+                                </a:rPr>
+                              </m:ctrlPr>
+                            </m:sSubPr>
+                            <m:e>
+                              <m:r>
+                                <a:rPr lang="en-GB" b="0" i="1" smtClean="0">
+                                  <a:latin typeface="Cambria Math" panose="02040503050406030204" pitchFamily="18" charset="0"/>
+                                  <a:ea typeface="Cambria Math" panose="02040503050406030204" pitchFamily="18" charset="0"/>
+                                </a:rPr>
+                                <m:t>𝑄</m:t>
+                              </m:r>
+                            </m:e>
+                            <m:sub>
+                              <m:r>
+                                <a:rPr lang="en-GB" i="1">
+                                  <a:latin typeface="Cambria Math" panose="02040503050406030204" pitchFamily="18" charset="0"/>
+                                  <a:ea typeface="Cambria Math" panose="02040503050406030204" pitchFamily="18" charset="0"/>
+                                </a:rPr>
+                                <m:t>+</m:t>
+                              </m:r>
+                            </m:sub>
+                          </m:sSub>
+                          <m:sSub>
+                            <m:sSubPr>
+                              <m:ctrlPr>
+                                <a:rPr lang="en-GB" i="1" smtClean="0">
+                                  <a:latin typeface="Cambria Math" panose="02040503050406030204" pitchFamily="18" charset="0"/>
+                                  <a:ea typeface="Cambria Math" panose="02040503050406030204" pitchFamily="18" charset="0"/>
+                                </a:rPr>
+                              </m:ctrlPr>
+                            </m:sSubPr>
+                            <m:e>
+                              <m:r>
+                                <a:rPr lang="en-GB" b="0" i="1" smtClean="0">
+                                  <a:latin typeface="Cambria Math" panose="02040503050406030204" pitchFamily="18" charset="0"/>
+                                  <a:ea typeface="Cambria Math" panose="02040503050406030204" pitchFamily="18" charset="0"/>
+                                </a:rPr>
+                                <m:t>𝑄</m:t>
+                              </m:r>
+                            </m:e>
+                            <m:sub>
+                              <m:r>
+                                <a:rPr lang="en-GB" i="1">
+                                  <a:latin typeface="Cambria Math" panose="02040503050406030204" pitchFamily="18" charset="0"/>
+                                  <a:ea typeface="Cambria Math" panose="02040503050406030204" pitchFamily="18" charset="0"/>
+                                </a:rPr>
+                                <m:t>−</m:t>
+                              </m:r>
+                            </m:sub>
+                          </m:sSub>
+                        </m:e>
+                      </m:d>
+                    </m:oMath>
+                  </m:oMathPara>
+                </a14:m>
+                <a:endParaRPr lang="en-GB" dirty="0"/>
+              </a:p>
+            </p:txBody>
+          </p:sp>
+        </mc:Choice>
+        <mc:Fallback>
+          <p:sp>
+            <p:nvSpPr>
+              <p:cNvPr id="6" name="TextBox 5"/>
+              <p:cNvSpPr txBox="1">
+                <a:spLocks noRot="1" noChangeAspect="1" noMove="1" noResize="1" noEditPoints="1" noAdjustHandles="1" noChangeArrowheads="1" noChangeShapeType="1" noTextEdit="1"/>
+              </p:cNvSpPr>
+              <p:nvPr/>
+            </p:nvSpPr>
+            <p:spPr>
+              <a:xfrm>
+                <a:off x="5715209" y="3784109"/>
+                <a:ext cx="2528449" cy="369332"/>
+              </a:xfrm>
+              <a:prstGeom prst="rect">
+                <a:avLst/>
+              </a:prstGeom>
+              <a:blipFill>
+                <a:blip r:embed="rId3"/>
+                <a:stretch>
+                  <a:fillRect b="-11667"/>
+                </a:stretch>
+              </a:blipFill>
+            </p:spPr>
+            <p:txBody>
+              <a:bodyPr/>
+              <a:lstStyle/>
+              <a:p>
+                <a:r>
+                  <a:rPr lang="en-GB">
+                    <a:noFill/>
+                  </a:rPr>
+                  <a:t> </a:t>
+                </a:r>
+              </a:p>
+            </p:txBody>
+          </p:sp>
+        </mc:Fallback>
+      </mc:AlternateContent>
+      <mc:AlternateContent xmlns:mc="http://schemas.openxmlformats.org/markup-compatibility/2006">
+        <mc:Choice xmlns:a14="http://schemas.microsoft.com/office/drawing/2010/main" Requires="a14">
+          <p:sp>
+            <p:nvSpPr>
+              <p:cNvPr id="12" name="TextBox 11"/>
+              <p:cNvSpPr txBox="1"/>
+              <p:nvPr/>
+            </p:nvSpPr>
+            <p:spPr>
+              <a:xfrm>
+                <a:off x="5793932" y="4950789"/>
+                <a:ext cx="2890535" cy="646331"/>
+              </a:xfrm>
+              <a:prstGeom prst="rect">
+                <a:avLst/>
+              </a:prstGeom>
+              <a:noFill/>
+            </p:spPr>
+            <p:txBody>
+              <a:bodyPr wrap="none" rtlCol="0">
+                <a:spAutoFit/>
+              </a:bodyPr>
+              <a:lstStyle/>
+              <a:p>
+                <a14:m>
+                  <m:oMath xmlns:m="http://schemas.openxmlformats.org/officeDocument/2006/math">
+                    <m:d>
+                      <m:dPr>
+                        <m:begChr m:val="⟨"/>
+                        <m:endChr m:val="⟩"/>
+                        <m:ctrlPr>
+                          <a:rPr lang="en-GB" b="0" i="1" smtClean="0">
+                            <a:latin typeface="Cambria Math" panose="02040503050406030204" pitchFamily="18" charset="0"/>
+                            <a:ea typeface="Cambria Math" panose="02040503050406030204" pitchFamily="18" charset="0"/>
+                          </a:rPr>
+                        </m:ctrlPr>
+                      </m:dPr>
+                      <m:e>
+                        <m:sSub>
+                          <m:sSubPr>
+                            <m:ctrlPr>
+                              <a:rPr lang="en-GB" b="0" i="1" smtClean="0">
+                                <a:latin typeface="Cambria Math" panose="02040503050406030204" pitchFamily="18" charset="0"/>
+                                <a:ea typeface="Cambria Math" panose="02040503050406030204" pitchFamily="18" charset="0"/>
+                              </a:rPr>
+                            </m:ctrlPr>
+                          </m:sSubPr>
+                          <m:e>
+                            <m:r>
+                              <a:rPr lang="en-GB" b="0" i="1" smtClean="0">
+                                <a:latin typeface="Cambria Math" panose="02040503050406030204" pitchFamily="18" charset="0"/>
+                                <a:ea typeface="Cambria Math" panose="02040503050406030204" pitchFamily="18" charset="0"/>
+                              </a:rPr>
+                              <m:t>𝐼</m:t>
+                            </m:r>
+                          </m:e>
+                          <m:sub>
+                            <m:r>
+                              <a:rPr lang="en-GB" b="0" i="1" smtClean="0">
+                                <a:latin typeface="Cambria Math" panose="02040503050406030204" pitchFamily="18" charset="0"/>
+                                <a:ea typeface="Cambria Math" panose="02040503050406030204" pitchFamily="18" charset="0"/>
+                              </a:rPr>
+                              <m:t>+</m:t>
+                            </m:r>
+                          </m:sub>
+                        </m:sSub>
+                        <m:sSub>
+                          <m:sSubPr>
+                            <m:ctrlPr>
+                              <a:rPr lang="en-GB" i="1">
+                                <a:latin typeface="Cambria Math" panose="02040503050406030204" pitchFamily="18" charset="0"/>
+                                <a:ea typeface="Cambria Math" panose="02040503050406030204" pitchFamily="18" charset="0"/>
+                              </a:rPr>
+                            </m:ctrlPr>
+                          </m:sSubPr>
+                          <m:e>
+                            <m:r>
+                              <a:rPr lang="en-GB" b="0" i="1" smtClean="0">
+                                <a:latin typeface="Cambria Math" panose="02040503050406030204" pitchFamily="18" charset="0"/>
+                                <a:ea typeface="Cambria Math" panose="02040503050406030204" pitchFamily="18" charset="0"/>
+                              </a:rPr>
+                              <m:t>𝑄</m:t>
+                            </m:r>
+                          </m:e>
+                          <m:sub>
+                            <m:r>
+                              <a:rPr lang="en-GB" b="0" i="1" smtClean="0">
+                                <a:latin typeface="Cambria Math" panose="02040503050406030204" pitchFamily="18" charset="0"/>
+                                <a:ea typeface="Cambria Math" panose="02040503050406030204" pitchFamily="18" charset="0"/>
+                              </a:rPr>
+                              <m:t>−</m:t>
+                            </m:r>
+                          </m:sub>
+                        </m:sSub>
+                      </m:e>
+                    </m:d>
+                    <m:r>
+                      <a:rPr lang="en-GB" b="0" i="1" smtClean="0">
+                        <a:latin typeface="Cambria Math" panose="02040503050406030204" pitchFamily="18" charset="0"/>
+                        <a:ea typeface="Cambria Math" panose="02040503050406030204" pitchFamily="18" charset="0"/>
+                      </a:rPr>
+                      <m:t>=</m:t>
+                    </m:r>
+                    <m:d>
+                      <m:dPr>
+                        <m:begChr m:val="⟨"/>
+                        <m:endChr m:val="⟩"/>
+                        <m:ctrlPr>
+                          <a:rPr lang="en-GB" i="1">
+                            <a:latin typeface="Cambria Math" panose="02040503050406030204" pitchFamily="18" charset="0"/>
+                            <a:ea typeface="Cambria Math" panose="02040503050406030204" pitchFamily="18" charset="0"/>
+                          </a:rPr>
+                        </m:ctrlPr>
+                      </m:dPr>
+                      <m:e>
+                        <m:sSub>
+                          <m:sSubPr>
+                            <m:ctrlPr>
+                              <a:rPr lang="en-GB" i="1">
+                                <a:latin typeface="Cambria Math" panose="02040503050406030204" pitchFamily="18" charset="0"/>
+                                <a:ea typeface="Cambria Math" panose="02040503050406030204" pitchFamily="18" charset="0"/>
+                              </a:rPr>
+                            </m:ctrlPr>
+                          </m:sSubPr>
+                          <m:e>
+                            <m:r>
+                              <a:rPr lang="en-GB" b="0" i="1" smtClean="0">
+                                <a:latin typeface="Cambria Math" panose="02040503050406030204" pitchFamily="18" charset="0"/>
+                                <a:ea typeface="Cambria Math" panose="02040503050406030204" pitchFamily="18" charset="0"/>
+                              </a:rPr>
+                              <m:t>𝐼</m:t>
+                            </m:r>
+                          </m:e>
+                          <m:sub>
+                            <m:r>
+                              <a:rPr lang="en-GB" b="0" i="1" smtClean="0">
+                                <a:latin typeface="Cambria Math" panose="02040503050406030204" pitchFamily="18" charset="0"/>
+                                <a:ea typeface="Cambria Math" panose="02040503050406030204" pitchFamily="18" charset="0"/>
+                              </a:rPr>
+                              <m:t>−</m:t>
+                            </m:r>
+                          </m:sub>
+                        </m:sSub>
+                        <m:sSub>
+                          <m:sSubPr>
+                            <m:ctrlPr>
+                              <a:rPr lang="en-GB" i="1" smtClean="0">
+                                <a:latin typeface="Cambria Math" panose="02040503050406030204" pitchFamily="18" charset="0"/>
+                                <a:ea typeface="Cambria Math" panose="02040503050406030204" pitchFamily="18" charset="0"/>
+                              </a:rPr>
+                            </m:ctrlPr>
+                          </m:sSubPr>
+                          <m:e>
+                            <m:r>
+                              <a:rPr lang="en-GB" b="0" i="1" smtClean="0">
+                                <a:latin typeface="Cambria Math" panose="02040503050406030204" pitchFamily="18" charset="0"/>
+                                <a:ea typeface="Cambria Math" panose="02040503050406030204" pitchFamily="18" charset="0"/>
+                              </a:rPr>
+                              <m:t>𝑄</m:t>
+                            </m:r>
+                          </m:e>
+                          <m:sub>
+                            <m:r>
+                              <a:rPr lang="en-GB" b="0" i="1" smtClean="0">
+                                <a:latin typeface="Cambria Math" panose="02040503050406030204" pitchFamily="18" charset="0"/>
+                                <a:ea typeface="Cambria Math" panose="02040503050406030204" pitchFamily="18" charset="0"/>
+                              </a:rPr>
+                              <m:t>+</m:t>
+                            </m:r>
+                          </m:sub>
+                        </m:sSub>
+                      </m:e>
+                    </m:d>
+                  </m:oMath>
+                </a14:m>
+                <a:r>
+                  <a:rPr lang="en-GB" dirty="0" smtClean="0"/>
+                  <a:t> = 0</a:t>
+                </a:r>
+              </a:p>
+              <a:p>
+                <a:r>
+                  <a:rPr lang="en-GB" dirty="0" smtClean="0"/>
+                  <a:t>For selected global phase </a:t>
+                </a:r>
+                <a:endParaRPr lang="en-GB" dirty="0"/>
+              </a:p>
+            </p:txBody>
+          </p:sp>
+        </mc:Choice>
+        <mc:Fallback>
+          <p:sp>
+            <p:nvSpPr>
+              <p:cNvPr id="12" name="TextBox 11"/>
+              <p:cNvSpPr txBox="1">
+                <a:spLocks noRot="1" noChangeAspect="1" noMove="1" noResize="1" noEditPoints="1" noAdjustHandles="1" noChangeArrowheads="1" noChangeShapeType="1" noTextEdit="1"/>
+              </p:cNvSpPr>
+              <p:nvPr/>
+            </p:nvSpPr>
+            <p:spPr>
+              <a:xfrm>
+                <a:off x="5793932" y="4950789"/>
+                <a:ext cx="2890535" cy="646331"/>
+              </a:xfrm>
+              <a:prstGeom prst="rect">
+                <a:avLst/>
+              </a:prstGeom>
+              <a:blipFill>
+                <a:blip r:embed="rId4"/>
+                <a:stretch>
+                  <a:fillRect l="-1684" t="-4717" r="-842" b="-14151"/>
+                </a:stretch>
+              </a:blipFill>
+            </p:spPr>
+            <p:txBody>
+              <a:bodyPr/>
+              <a:lstStyle/>
+              <a:p>
+                <a:r>
+                  <a:rPr lang="en-GB">
+                    <a:noFill/>
+                  </a:rPr>
+                  <a:t> </a:t>
+                </a:r>
+              </a:p>
+            </p:txBody>
+          </p:sp>
+        </mc:Fallback>
+      </mc:AlternateContent>
+      <mc:AlternateContent xmlns:mc="http://schemas.openxmlformats.org/markup-compatibility/2006">
+        <mc:Choice xmlns:a14="http://schemas.microsoft.com/office/drawing/2010/main" Requires="a14">
+          <p:sp>
+            <p:nvSpPr>
+              <p:cNvPr id="13" name="TextBox 12"/>
+              <p:cNvSpPr txBox="1"/>
+              <p:nvPr/>
+            </p:nvSpPr>
+            <p:spPr>
+              <a:xfrm>
+                <a:off x="5715208" y="4366044"/>
+                <a:ext cx="2077620" cy="369332"/>
+              </a:xfrm>
+              <a:prstGeom prst="rect">
+                <a:avLst/>
+              </a:prstGeom>
+              <a:noFill/>
+            </p:spPr>
+            <p:txBody>
+              <a:bodyPr wrap="none" rtlCol="0">
+                <a:spAutoFit/>
+              </a:bodyPr>
+              <a:lstStyle/>
+              <a:p>
+                <a14:m>
+                  <m:oMathPara xmlns:m="http://schemas.openxmlformats.org/officeDocument/2006/math">
+                    <m:oMathParaPr>
+                      <m:jc m:val="centerGroup"/>
+                    </m:oMathParaPr>
+                    <m:oMath xmlns:m="http://schemas.openxmlformats.org/officeDocument/2006/math">
+                      <m:d>
+                        <m:dPr>
+                          <m:begChr m:val="⟨"/>
+                          <m:endChr m:val="⟩"/>
+                          <m:ctrlPr>
+                            <a:rPr lang="en-GB" b="0" i="1" smtClean="0">
+                              <a:latin typeface="Cambria Math" panose="02040503050406030204" pitchFamily="18" charset="0"/>
+                              <a:ea typeface="Cambria Math" panose="02040503050406030204" pitchFamily="18" charset="0"/>
+                            </a:rPr>
+                          </m:ctrlPr>
+                        </m:dPr>
+                        <m:e>
+                          <m:sSub>
+                            <m:sSubPr>
+                              <m:ctrlPr>
+                                <a:rPr lang="en-GB" b="0" i="1" smtClean="0">
+                                  <a:latin typeface="Cambria Math" panose="02040503050406030204" pitchFamily="18" charset="0"/>
+                                  <a:ea typeface="Cambria Math" panose="02040503050406030204" pitchFamily="18" charset="0"/>
+                                </a:rPr>
+                              </m:ctrlPr>
+                            </m:sSubPr>
+                            <m:e>
+                              <m:r>
+                                <a:rPr lang="en-GB" b="0" i="1" smtClean="0">
+                                  <a:latin typeface="Cambria Math" panose="02040503050406030204" pitchFamily="18" charset="0"/>
+                                  <a:ea typeface="Cambria Math" panose="02040503050406030204" pitchFamily="18" charset="0"/>
+                                </a:rPr>
+                                <m:t>𝐼</m:t>
+                              </m:r>
+                            </m:e>
+                            <m:sub>
+                              <m:r>
+                                <a:rPr lang="en-GB" b="0" i="1" smtClean="0">
+                                  <a:latin typeface="Cambria Math" panose="02040503050406030204" pitchFamily="18" charset="0"/>
+                                  <a:ea typeface="Cambria Math" panose="02040503050406030204" pitchFamily="18" charset="0"/>
+                                </a:rPr>
+                                <m:t>+</m:t>
+                              </m:r>
+                            </m:sub>
+                          </m:sSub>
+                          <m:sSub>
+                            <m:sSubPr>
+                              <m:ctrlPr>
+                                <a:rPr lang="en-GB" i="1">
+                                  <a:latin typeface="Cambria Math" panose="02040503050406030204" pitchFamily="18" charset="0"/>
+                                  <a:ea typeface="Cambria Math" panose="02040503050406030204" pitchFamily="18" charset="0"/>
+                                </a:rPr>
+                              </m:ctrlPr>
+                            </m:sSubPr>
+                            <m:e>
+                              <m:r>
+                                <a:rPr lang="en-GB" i="1">
+                                  <a:latin typeface="Cambria Math" panose="02040503050406030204" pitchFamily="18" charset="0"/>
+                                  <a:ea typeface="Cambria Math" panose="02040503050406030204" pitchFamily="18" charset="0"/>
+                                </a:rPr>
+                                <m:t>𝐼</m:t>
+                              </m:r>
+                            </m:e>
+                            <m:sub>
+                              <m:r>
+                                <a:rPr lang="en-GB" b="0" i="1" smtClean="0">
+                                  <a:latin typeface="Cambria Math" panose="02040503050406030204" pitchFamily="18" charset="0"/>
+                                  <a:ea typeface="Cambria Math" panose="02040503050406030204" pitchFamily="18" charset="0"/>
+                                </a:rPr>
+                                <m:t>−</m:t>
+                              </m:r>
+                            </m:sub>
+                          </m:sSub>
+                        </m:e>
+                      </m:d>
+                      <m:r>
+                        <a:rPr lang="en-GB" b="0" i="0" smtClean="0">
+                          <a:latin typeface="Cambria Math" panose="02040503050406030204" pitchFamily="18" charset="0"/>
+                          <a:ea typeface="Cambria Math" panose="02040503050406030204" pitchFamily="18" charset="0"/>
+                        </a:rPr>
+                        <m:t>= −</m:t>
+                      </m:r>
+                      <m:d>
+                        <m:dPr>
+                          <m:begChr m:val="⟨"/>
+                          <m:endChr m:val="⟩"/>
+                          <m:ctrlPr>
+                            <a:rPr lang="en-GB" i="1">
+                              <a:latin typeface="Cambria Math" panose="02040503050406030204" pitchFamily="18" charset="0"/>
+                              <a:ea typeface="Cambria Math" panose="02040503050406030204" pitchFamily="18" charset="0"/>
+                            </a:rPr>
+                          </m:ctrlPr>
+                        </m:dPr>
+                        <m:e>
+                          <m:sSub>
+                            <m:sSubPr>
+                              <m:ctrlPr>
+                                <a:rPr lang="en-GB" i="1">
+                                  <a:latin typeface="Cambria Math" panose="02040503050406030204" pitchFamily="18" charset="0"/>
+                                  <a:ea typeface="Cambria Math" panose="02040503050406030204" pitchFamily="18" charset="0"/>
+                                </a:rPr>
+                              </m:ctrlPr>
+                            </m:sSubPr>
+                            <m:e>
+                              <m:r>
+                                <a:rPr lang="en-GB" b="0" i="1" smtClean="0">
+                                  <a:latin typeface="Cambria Math" panose="02040503050406030204" pitchFamily="18" charset="0"/>
+                                  <a:ea typeface="Cambria Math" panose="02040503050406030204" pitchFamily="18" charset="0"/>
+                                </a:rPr>
+                                <m:t>𝑄</m:t>
+                              </m:r>
+                            </m:e>
+                            <m:sub>
+                              <m:r>
+                                <a:rPr lang="en-GB" i="1">
+                                  <a:latin typeface="Cambria Math" panose="02040503050406030204" pitchFamily="18" charset="0"/>
+                                  <a:ea typeface="Cambria Math" panose="02040503050406030204" pitchFamily="18" charset="0"/>
+                                </a:rPr>
+                                <m:t>+</m:t>
+                              </m:r>
+                            </m:sub>
+                          </m:sSub>
+                          <m:sSub>
+                            <m:sSubPr>
+                              <m:ctrlPr>
+                                <a:rPr lang="en-GB" i="1" smtClean="0">
+                                  <a:latin typeface="Cambria Math" panose="02040503050406030204" pitchFamily="18" charset="0"/>
+                                  <a:ea typeface="Cambria Math" panose="02040503050406030204" pitchFamily="18" charset="0"/>
+                                </a:rPr>
+                              </m:ctrlPr>
+                            </m:sSubPr>
+                            <m:e>
+                              <m:r>
+                                <a:rPr lang="en-GB" b="0" i="1" smtClean="0">
+                                  <a:latin typeface="Cambria Math" panose="02040503050406030204" pitchFamily="18" charset="0"/>
+                                  <a:ea typeface="Cambria Math" panose="02040503050406030204" pitchFamily="18" charset="0"/>
+                                </a:rPr>
+                                <m:t>𝑄</m:t>
+                              </m:r>
+                            </m:e>
+                            <m:sub>
+                              <m:r>
+                                <a:rPr lang="en-GB" i="1">
+                                  <a:latin typeface="Cambria Math" panose="02040503050406030204" pitchFamily="18" charset="0"/>
+                                  <a:ea typeface="Cambria Math" panose="02040503050406030204" pitchFamily="18" charset="0"/>
+                                </a:rPr>
+                                <m:t>−</m:t>
+                              </m:r>
+                            </m:sub>
+                          </m:sSub>
+                        </m:e>
+                      </m:d>
+                    </m:oMath>
+                  </m:oMathPara>
+                </a14:m>
+                <a:endParaRPr lang="en-GB" dirty="0"/>
+              </a:p>
+            </p:txBody>
+          </p:sp>
+        </mc:Choice>
+        <mc:Fallback>
+          <p:sp>
+            <p:nvSpPr>
+              <p:cNvPr id="13" name="TextBox 12"/>
+              <p:cNvSpPr txBox="1">
+                <a:spLocks noRot="1" noChangeAspect="1" noMove="1" noResize="1" noEditPoints="1" noAdjustHandles="1" noChangeArrowheads="1" noChangeShapeType="1" noTextEdit="1"/>
+              </p:cNvSpPr>
+              <p:nvPr/>
+            </p:nvSpPr>
+            <p:spPr>
+              <a:xfrm>
+                <a:off x="5715208" y="4366044"/>
+                <a:ext cx="2077620" cy="369332"/>
+              </a:xfrm>
+              <a:prstGeom prst="rect">
+                <a:avLst/>
+              </a:prstGeom>
+              <a:blipFill>
+                <a:blip r:embed="rId5"/>
+                <a:stretch>
+                  <a:fillRect b="-11475"/>
+                </a:stretch>
+              </a:blipFill>
+            </p:spPr>
+            <p:txBody>
+              <a:bodyPr/>
+              <a:lstStyle/>
+              <a:p>
+                <a:r>
+                  <a:rPr lang="en-GB">
+                    <a:noFill/>
+                  </a:rPr>
+                  <a:t> </a:t>
+                </a:r>
+              </a:p>
+            </p:txBody>
+          </p:sp>
+        </mc:Fallback>
+      </mc:AlternateContent>
     </p:spTree>
     <p:extLst>
       <p:ext uri="{BB962C8B-B14F-4D97-AF65-F5344CB8AC3E}">
@@ -41598,7 +42319,23 @@
             </a:pPr>
             <a:r>
               <a:rPr lang="en-GB" dirty="0"/>
-              <a:t> two-mode and single mode field squeezing </a:t>
+              <a:t> </a:t>
+            </a:r>
+            <a:r>
+              <a:rPr lang="en-GB"/>
+              <a:t>two-mode </a:t>
+            </a:r>
+            <a:r>
+              <a:rPr lang="en-GB" smtClean="0"/>
+              <a:t>vs.</a:t>
+            </a:r>
+            <a:r>
+              <a:rPr lang="en-GB" smtClean="0"/>
+              <a:t> </a:t>
+            </a:r>
+            <a:r>
+              <a:rPr lang="en-GB" dirty="0"/>
+              <a:t>single mode field squeezing </a:t>
             </a:r>
           </a:p>
         </p:txBody>
@@ -41705,7 +42442,7 @@
         </p:blipFill>
         <p:spPr>
           <a:xfrm>
-            <a:off x="2140338" y="2708900"/>
+            <a:off x="1187530" y="2780910"/>
             <a:ext cx="5040871" cy="3425061"/>
           </a:xfrm>
           <a:prstGeom prst="rect">
@@ -41713,6 +42450,310 @@
           </a:prstGeom>
         </p:spPr>
       </p:pic>
+      <mc:AlternateContent xmlns:mc="http://schemas.openxmlformats.org/markup-compatibility/2006">
+        <mc:Choice xmlns:a14="http://schemas.microsoft.com/office/drawing/2010/main" Requires="a14">
+          <p:sp>
+            <p:nvSpPr>
+              <p:cNvPr id="8" name="TextBox 7"/>
+              <p:cNvSpPr txBox="1"/>
+              <p:nvPr/>
+            </p:nvSpPr>
+            <p:spPr>
+              <a:xfrm>
+                <a:off x="6156220" y="4581160"/>
+                <a:ext cx="1902316" cy="689356"/>
+              </a:xfrm>
+              <a:prstGeom prst="rect">
+                <a:avLst/>
+              </a:prstGeom>
+              <a:noFill/>
+            </p:spPr>
+            <p:txBody>
+              <a:bodyPr wrap="none" rtlCol="0">
+                <a:spAutoFit/>
+              </a:bodyPr>
+              <a:lstStyle/>
+              <a:p>
+                <a14:m>
+                  <m:oMathPara xmlns:m="http://schemas.openxmlformats.org/officeDocument/2006/math">
+                    <m:oMathParaPr>
+                      <m:jc m:val="centerGroup"/>
+                    </m:oMathParaPr>
+                    <m:oMath xmlns:m="http://schemas.openxmlformats.org/officeDocument/2006/math">
+                      <m:sSub>
+                        <m:sSubPr>
+                          <m:ctrlPr>
+                            <a:rPr lang="en-GB" i="1" smtClean="0">
+                              <a:latin typeface="Cambria Math" panose="02040503050406030204" pitchFamily="18" charset="0"/>
+                            </a:rPr>
+                          </m:ctrlPr>
+                        </m:sSubPr>
+                        <m:e>
+                          <m:r>
+                            <a:rPr lang="en-GB" i="1" smtClean="0">
+                              <a:latin typeface="Cambria Math" panose="02040503050406030204" pitchFamily="18" charset="0"/>
+                              <a:ea typeface="Cambria Math" panose="02040503050406030204" pitchFamily="18" charset="0"/>
+                            </a:rPr>
+                            <m:t>𝜎</m:t>
+                          </m:r>
+                        </m:e>
+                        <m:sub>
+                          <m:r>
+                            <a:rPr lang="en-GB" b="0" i="1" smtClean="0">
+                              <a:latin typeface="Cambria Math" panose="02040503050406030204" pitchFamily="18" charset="0"/>
+                            </a:rPr>
+                            <m:t>1</m:t>
+                          </m:r>
+                        </m:sub>
+                      </m:sSub>
+                      <m:r>
+                        <a:rPr lang="en-GB" b="0" i="1" smtClean="0">
+                          <a:latin typeface="Cambria Math" panose="02040503050406030204" pitchFamily="18" charset="0"/>
+                        </a:rPr>
+                        <m:t>=</m:t>
+                      </m:r>
+                      <m:f>
+                        <m:fPr>
+                          <m:ctrlPr>
+                            <a:rPr lang="en-GB" b="0" i="1" smtClean="0">
+                              <a:latin typeface="Cambria Math" panose="02040503050406030204" pitchFamily="18" charset="0"/>
+                            </a:rPr>
+                          </m:ctrlPr>
+                        </m:fPr>
+                        <m:num>
+                          <m:d>
+                            <m:dPr>
+                              <m:begChr m:val="⟨"/>
+                              <m:endChr m:val="⟩"/>
+                              <m:ctrlPr>
+                                <a:rPr lang="en-GB" i="1">
+                                  <a:latin typeface="Cambria Math" panose="02040503050406030204" pitchFamily="18" charset="0"/>
+                                  <a:ea typeface="Cambria Math" panose="02040503050406030204" pitchFamily="18" charset="0"/>
+                                </a:rPr>
+                              </m:ctrlPr>
+                            </m:dPr>
+                            <m:e>
+                              <m:sSup>
+                                <m:sSupPr>
+                                  <m:ctrlPr>
+                                    <a:rPr lang="en-GB" i="1">
+                                      <a:latin typeface="Cambria Math" panose="02040503050406030204" pitchFamily="18" charset="0"/>
+                                      <a:ea typeface="Cambria Math" panose="02040503050406030204" pitchFamily="18" charset="0"/>
+                                    </a:rPr>
+                                  </m:ctrlPr>
+                                </m:sSupPr>
+                                <m:e>
+                                  <m:r>
+                                    <a:rPr lang="en-GB" i="1">
+                                      <a:latin typeface="Cambria Math" panose="02040503050406030204" pitchFamily="18" charset="0"/>
+                                      <a:ea typeface="Cambria Math" panose="02040503050406030204" pitchFamily="18" charset="0"/>
+                                    </a:rPr>
+                                    <m:t>𝐼</m:t>
+                                  </m:r>
+                                </m:e>
+                                <m:sup>
+                                  <m:r>
+                                    <a:rPr lang="en-GB" i="1">
+                                      <a:latin typeface="Cambria Math" panose="02040503050406030204" pitchFamily="18" charset="0"/>
+                                      <a:ea typeface="Cambria Math" panose="02040503050406030204" pitchFamily="18" charset="0"/>
+                                    </a:rPr>
+                                    <m:t>2</m:t>
+                                  </m:r>
+                                </m:sup>
+                              </m:sSup>
+                            </m:e>
+                          </m:d>
+                          <m:r>
+                            <a:rPr lang="en-GB">
+                              <a:latin typeface="Cambria Math" panose="02040503050406030204" pitchFamily="18" charset="0"/>
+                              <a:ea typeface="Cambria Math" panose="02040503050406030204" pitchFamily="18" charset="0"/>
+                            </a:rPr>
+                            <m:t> −</m:t>
+                          </m:r>
+                          <m:d>
+                            <m:dPr>
+                              <m:begChr m:val="⟨"/>
+                              <m:endChr m:val="⟩"/>
+                              <m:ctrlPr>
+                                <a:rPr lang="en-GB" i="1">
+                                  <a:latin typeface="Cambria Math" panose="02040503050406030204" pitchFamily="18" charset="0"/>
+                                  <a:ea typeface="Cambria Math" panose="02040503050406030204" pitchFamily="18" charset="0"/>
+                                </a:rPr>
+                              </m:ctrlPr>
+                            </m:dPr>
+                            <m:e>
+                              <m:sSup>
+                                <m:sSupPr>
+                                  <m:ctrlPr>
+                                    <a:rPr lang="en-GB" i="1">
+                                      <a:latin typeface="Cambria Math" panose="02040503050406030204" pitchFamily="18" charset="0"/>
+                                      <a:ea typeface="Cambria Math" panose="02040503050406030204" pitchFamily="18" charset="0"/>
+                                    </a:rPr>
+                                  </m:ctrlPr>
+                                </m:sSupPr>
+                                <m:e>
+                                  <m:r>
+                                    <a:rPr lang="en-GB" i="1">
+                                      <a:latin typeface="Cambria Math" panose="02040503050406030204" pitchFamily="18" charset="0"/>
+                                      <a:ea typeface="Cambria Math" panose="02040503050406030204" pitchFamily="18" charset="0"/>
+                                    </a:rPr>
+                                    <m:t>𝑄</m:t>
+                                  </m:r>
+                                </m:e>
+                                <m:sup>
+                                  <m:r>
+                                    <a:rPr lang="en-GB" i="1">
+                                      <a:latin typeface="Cambria Math" panose="02040503050406030204" pitchFamily="18" charset="0"/>
+                                      <a:ea typeface="Cambria Math" panose="02040503050406030204" pitchFamily="18" charset="0"/>
+                                    </a:rPr>
+                                    <m:t>2</m:t>
+                                  </m:r>
+                                </m:sup>
+                              </m:sSup>
+                            </m:e>
+                          </m:d>
+                        </m:num>
+                        <m:den>
+                          <m:d>
+                            <m:dPr>
+                              <m:begChr m:val="⟨"/>
+                              <m:endChr m:val="⟩"/>
+                              <m:ctrlPr>
+                                <a:rPr lang="en-GB" i="1">
+                                  <a:latin typeface="Cambria Math" panose="02040503050406030204" pitchFamily="18" charset="0"/>
+                                  <a:ea typeface="Cambria Math" panose="02040503050406030204" pitchFamily="18" charset="0"/>
+                                </a:rPr>
+                              </m:ctrlPr>
+                            </m:dPr>
+                            <m:e>
+                              <m:sSup>
+                                <m:sSupPr>
+                                  <m:ctrlPr>
+                                    <a:rPr lang="en-GB" i="1">
+                                      <a:latin typeface="Cambria Math" panose="02040503050406030204" pitchFamily="18" charset="0"/>
+                                      <a:ea typeface="Cambria Math" panose="02040503050406030204" pitchFamily="18" charset="0"/>
+                                    </a:rPr>
+                                  </m:ctrlPr>
+                                </m:sSupPr>
+                                <m:e>
+                                  <m:r>
+                                    <a:rPr lang="en-GB" i="1">
+                                      <a:latin typeface="Cambria Math" panose="02040503050406030204" pitchFamily="18" charset="0"/>
+                                      <a:ea typeface="Cambria Math" panose="02040503050406030204" pitchFamily="18" charset="0"/>
+                                    </a:rPr>
+                                    <m:t>𝐼</m:t>
+                                  </m:r>
+                                </m:e>
+                                <m:sup>
+                                  <m:r>
+                                    <a:rPr lang="en-GB" i="1">
+                                      <a:latin typeface="Cambria Math" panose="02040503050406030204" pitchFamily="18" charset="0"/>
+                                      <a:ea typeface="Cambria Math" panose="02040503050406030204" pitchFamily="18" charset="0"/>
+                                    </a:rPr>
+                                    <m:t>2</m:t>
+                                  </m:r>
+                                </m:sup>
+                              </m:sSup>
+                            </m:e>
+                          </m:d>
+                          <m:r>
+                            <a:rPr lang="en-GB" b="0" i="1" smtClean="0">
+                              <a:latin typeface="Cambria Math" panose="02040503050406030204" pitchFamily="18" charset="0"/>
+                              <a:ea typeface="Cambria Math" panose="02040503050406030204" pitchFamily="18" charset="0"/>
+                            </a:rPr>
+                            <m:t>+</m:t>
+                          </m:r>
+                          <m:d>
+                            <m:dPr>
+                              <m:begChr m:val="⟨"/>
+                              <m:endChr m:val="⟩"/>
+                              <m:ctrlPr>
+                                <a:rPr lang="en-GB" i="1">
+                                  <a:latin typeface="Cambria Math" panose="02040503050406030204" pitchFamily="18" charset="0"/>
+                                  <a:ea typeface="Cambria Math" panose="02040503050406030204" pitchFamily="18" charset="0"/>
+                                </a:rPr>
+                              </m:ctrlPr>
+                            </m:dPr>
+                            <m:e>
+                              <m:sSup>
+                                <m:sSupPr>
+                                  <m:ctrlPr>
+                                    <a:rPr lang="en-GB" i="1">
+                                      <a:latin typeface="Cambria Math" panose="02040503050406030204" pitchFamily="18" charset="0"/>
+                                      <a:ea typeface="Cambria Math" panose="02040503050406030204" pitchFamily="18" charset="0"/>
+                                    </a:rPr>
+                                  </m:ctrlPr>
+                                </m:sSupPr>
+                                <m:e>
+                                  <m:r>
+                                    <a:rPr lang="en-GB" i="1">
+                                      <a:latin typeface="Cambria Math" panose="02040503050406030204" pitchFamily="18" charset="0"/>
+                                      <a:ea typeface="Cambria Math" panose="02040503050406030204" pitchFamily="18" charset="0"/>
+                                    </a:rPr>
+                                    <m:t>𝑄</m:t>
+                                  </m:r>
+                                </m:e>
+                                <m:sup>
+                                  <m:r>
+                                    <a:rPr lang="en-GB" i="1">
+                                      <a:latin typeface="Cambria Math" panose="02040503050406030204" pitchFamily="18" charset="0"/>
+                                      <a:ea typeface="Cambria Math" panose="02040503050406030204" pitchFamily="18" charset="0"/>
+                                    </a:rPr>
+                                    <m:t>2</m:t>
+                                  </m:r>
+                                </m:sup>
+                              </m:sSup>
+                            </m:e>
+                          </m:d>
+                        </m:den>
+                      </m:f>
+                    </m:oMath>
+                  </m:oMathPara>
+                </a14:m>
+                <a:endParaRPr lang="en-GB" dirty="0"/>
+              </a:p>
+            </p:txBody>
+          </p:sp>
+        </mc:Choice>
+        <mc:Fallback>
+          <p:sp>
+            <p:nvSpPr>
+              <p:cNvPr id="8" name="TextBox 7"/>
+              <p:cNvSpPr txBox="1">
+                <a:spLocks noRot="1" noChangeAspect="1" noMove="1" noResize="1" noEditPoints="1" noAdjustHandles="1" noChangeArrowheads="1" noChangeShapeType="1" noTextEdit="1"/>
+              </p:cNvSpPr>
+              <p:nvPr/>
+            </p:nvSpPr>
+            <p:spPr>
+              <a:xfrm>
+                <a:off x="6156220" y="4581160"/>
+                <a:ext cx="1902316" cy="689356"/>
+              </a:xfrm>
+              <a:prstGeom prst="rect">
+                <a:avLst/>
+              </a:prstGeom>
+              <a:blipFill>
+                <a:blip r:embed="rId3"/>
+                <a:stretch>
+                  <a:fillRect/>
+                </a:stretch>
+              </a:blipFill>
+            </p:spPr>
+            <p:txBody>
+              <a:bodyPr/>
+              <a:lstStyle/>
+              <a:p>
+                <a:r>
+                  <a:rPr lang="en-GB">
+                    <a:noFill/>
+                  </a:rPr>
+                  <a:t> </a:t>
+                </a:r>
+              </a:p>
+            </p:txBody>
+          </p:sp>
+        </mc:Fallback>
+      </mc:AlternateContent>
     </p:spTree>
     <p:extLst>
       <p:ext uri="{BB962C8B-B14F-4D97-AF65-F5344CB8AC3E}">
@@ -41849,6 +42890,234 @@
               <a:rPr lang="en-GB" dirty="0"/>
               <a:t>Conclusion &amp; Comments</a:t>
             </a:r>
+          </a:p>
+        </p:txBody>
+      </p:sp>
+      <p:sp>
+        <p:nvSpPr>
+          <p:cNvPr id="7" name="Inhaltsplatzhalter 10"/>
+          <p:cNvSpPr txBox="1">
+            <a:spLocks/>
+          </p:cNvSpPr>
+          <p:nvPr/>
+        </p:nvSpPr>
+        <p:spPr>
+          <a:xfrm>
+            <a:off x="565024" y="1778048"/>
+            <a:ext cx="8496300" cy="3888539"/>
+          </a:xfrm>
+          <a:prstGeom prst="rect">
+            <a:avLst/>
+          </a:prstGeom>
+        </p:spPr>
+        <p:txBody>
+          <a:bodyPr vert="horz" lIns="140400" tIns="0" rIns="144000" bIns="0" rtlCol="0">
+            <a:noAutofit/>
+          </a:bodyPr>
+          <a:lstStyle>
+            <a:lvl1pPr marL="361950" indent="-361950" algn="l" defTabSz="914400" rtl="0" eaLnBrk="1" latinLnBrk="0" hangingPunct="1">
+              <a:lnSpc>
+                <a:spcPct val="100000"/>
+              </a:lnSpc>
+              <a:spcBef>
+                <a:spcPts val="500"/>
+              </a:spcBef>
+              <a:buClr>
+                <a:schemeClr val="accent1"/>
+              </a:buClr>
+              <a:buFont typeface="Wingdings" pitchFamily="2" charset="2"/>
+              <a:buChar char="§"/>
+              <a:defRPr sz="2400" kern="1200">
+                <a:solidFill>
+                  <a:schemeClr val="tx1"/>
+                </a:solidFill>
+                <a:latin typeface="+mn-lt"/>
+                <a:ea typeface="+mn-ea"/>
+                <a:cs typeface="+mn-cs"/>
+              </a:defRPr>
+            </a:lvl1pPr>
+            <a:lvl2pPr marL="627063" indent="-265113" algn="l" defTabSz="914400" rtl="0" eaLnBrk="1" latinLnBrk="0" hangingPunct="1">
+              <a:lnSpc>
+                <a:spcPct val="100000"/>
+              </a:lnSpc>
+              <a:spcBef>
+                <a:spcPts val="400"/>
+              </a:spcBef>
+              <a:buClr>
+                <a:schemeClr val="accent1"/>
+              </a:buClr>
+              <a:buFont typeface="Wingdings" pitchFamily="2" charset="2"/>
+              <a:buChar char="§"/>
+              <a:defRPr sz="2000" kern="1200">
+                <a:solidFill>
+                  <a:schemeClr val="tx1"/>
+                </a:solidFill>
+                <a:latin typeface="+mn-lt"/>
+                <a:ea typeface="+mn-ea"/>
+                <a:cs typeface="+mn-cs"/>
+              </a:defRPr>
+            </a:lvl2pPr>
+            <a:lvl3pPr marL="893763" indent="-266700" algn="l" defTabSz="914400" rtl="0" eaLnBrk="1" latinLnBrk="0" hangingPunct="1">
+              <a:lnSpc>
+                <a:spcPct val="100000"/>
+              </a:lnSpc>
+              <a:spcBef>
+                <a:spcPts val="400"/>
+              </a:spcBef>
+              <a:buClr>
+                <a:schemeClr val="accent1"/>
+              </a:buClr>
+              <a:buFont typeface="Wingdings" pitchFamily="2" charset="2"/>
+              <a:buChar char="§"/>
+              <a:defRPr sz="1800" kern="1200">
+                <a:solidFill>
+                  <a:schemeClr val="tx1"/>
+                </a:solidFill>
+                <a:latin typeface="+mn-lt"/>
+                <a:ea typeface="+mn-ea"/>
+                <a:cs typeface="+mn-cs"/>
+              </a:defRPr>
+            </a:lvl3pPr>
+            <a:lvl4pPr marL="1077913" indent="-177800" algn="l" defTabSz="914400" rtl="0" eaLnBrk="1" latinLnBrk="0" hangingPunct="1">
+              <a:lnSpc>
+                <a:spcPct val="100000"/>
+              </a:lnSpc>
+              <a:spcBef>
+                <a:spcPts val="400"/>
+              </a:spcBef>
+              <a:buClr>
+                <a:schemeClr val="accent1"/>
+              </a:buClr>
+              <a:buFont typeface="Wingdings" pitchFamily="2" charset="2"/>
+              <a:buChar char="§"/>
+              <a:defRPr sz="1600" kern="1200">
+                <a:solidFill>
+                  <a:schemeClr val="tx1"/>
+                </a:solidFill>
+                <a:latin typeface="+mn-lt"/>
+                <a:ea typeface="+mn-ea"/>
+                <a:cs typeface="+mn-cs"/>
+              </a:defRPr>
+            </a:lvl4pPr>
+            <a:lvl5pPr marL="1262063" indent="-184150" algn="l" defTabSz="914400" rtl="0" eaLnBrk="1" latinLnBrk="0" hangingPunct="1">
+              <a:lnSpc>
+                <a:spcPct val="100000"/>
+              </a:lnSpc>
+              <a:spcBef>
+                <a:spcPts val="400"/>
+              </a:spcBef>
+              <a:buClr>
+                <a:schemeClr val="accent1"/>
+              </a:buClr>
+              <a:buFont typeface="Wingdings" pitchFamily="2" charset="2"/>
+              <a:buChar char="§"/>
+              <a:defRPr sz="1400" kern="1200">
+                <a:solidFill>
+                  <a:schemeClr val="tx1"/>
+                </a:solidFill>
+                <a:latin typeface="+mn-lt"/>
+                <a:ea typeface="+mn-ea"/>
+                <a:cs typeface="+mn-cs"/>
+              </a:defRPr>
+            </a:lvl5pPr>
+            <a:lvl6pPr marL="2514600" indent="-228600" algn="l" defTabSz="914400" rtl="0" eaLnBrk="1" latinLnBrk="0" hangingPunct="1">
+              <a:spcBef>
+                <a:spcPct val="20000"/>
+              </a:spcBef>
+              <a:buFont typeface="Arial" pitchFamily="34" charset="0"/>
+              <a:buChar char="•"/>
+              <a:defRPr sz="2000" kern="1200">
+                <a:solidFill>
+                  <a:schemeClr val="tx1"/>
+                </a:solidFill>
+                <a:latin typeface="+mn-lt"/>
+                <a:ea typeface="+mn-ea"/>
+                <a:cs typeface="+mn-cs"/>
+              </a:defRPr>
+            </a:lvl6pPr>
+            <a:lvl7pPr marL="2971800" indent="-228600" algn="l" defTabSz="914400" rtl="0" eaLnBrk="1" latinLnBrk="0" hangingPunct="1">
+              <a:spcBef>
+                <a:spcPct val="20000"/>
+              </a:spcBef>
+              <a:buFont typeface="Arial" pitchFamily="34" charset="0"/>
+              <a:buChar char="•"/>
+              <a:defRPr sz="2000" kern="1200">
+                <a:solidFill>
+                  <a:schemeClr val="tx1"/>
+                </a:solidFill>
+                <a:latin typeface="+mn-lt"/>
+                <a:ea typeface="+mn-ea"/>
+                <a:cs typeface="+mn-cs"/>
+              </a:defRPr>
+            </a:lvl7pPr>
+            <a:lvl8pPr marL="3429000" indent="-228600" algn="l" defTabSz="914400" rtl="0" eaLnBrk="1" latinLnBrk="0" hangingPunct="1">
+              <a:spcBef>
+                <a:spcPct val="20000"/>
+              </a:spcBef>
+              <a:buFont typeface="Arial" pitchFamily="34" charset="0"/>
+              <a:buChar char="•"/>
+              <a:defRPr sz="2000" kern="1200">
+                <a:solidFill>
+                  <a:schemeClr val="tx1"/>
+                </a:solidFill>
+                <a:latin typeface="+mn-lt"/>
+                <a:ea typeface="+mn-ea"/>
+                <a:cs typeface="+mn-cs"/>
+              </a:defRPr>
+            </a:lvl8pPr>
+            <a:lvl9pPr marL="3886200" indent="-228600" algn="l" defTabSz="914400" rtl="0" eaLnBrk="1" latinLnBrk="0" hangingPunct="1">
+              <a:spcBef>
+                <a:spcPct val="20000"/>
+              </a:spcBef>
+              <a:buFont typeface="Arial" pitchFamily="34" charset="0"/>
+              <a:buChar char="•"/>
+              <a:defRPr sz="2000" kern="1200">
+                <a:solidFill>
+                  <a:schemeClr val="tx1"/>
+                </a:solidFill>
+                <a:latin typeface="+mn-lt"/>
+                <a:ea typeface="+mn-ea"/>
+                <a:cs typeface="+mn-cs"/>
+              </a:defRPr>
+            </a:lvl9pPr>
+          </a:lstStyle>
+          <a:p>
+            <a:pPr>
+              <a:lnSpc>
+                <a:spcPct val="150000"/>
+              </a:lnSpc>
+            </a:pPr>
+            <a:r>
+              <a:rPr lang="en-GB" dirty="0" smtClean="0"/>
+              <a:t>Direct experimental observation of DCE</a:t>
+            </a:r>
+          </a:p>
+          <a:p>
+            <a:pPr>
+              <a:lnSpc>
+                <a:spcPct val="150000"/>
+              </a:lnSpc>
+            </a:pPr>
+            <a:endParaRPr lang="en-GB" dirty="0" smtClean="0"/>
+          </a:p>
+          <a:p>
+            <a:pPr lvl="1">
+              <a:lnSpc>
+                <a:spcPct val="200000"/>
+              </a:lnSpc>
+            </a:pPr>
+            <a:endParaRPr lang="en-GB" dirty="0" smtClean="0"/>
+          </a:p>
+          <a:p>
+            <a:pPr marL="439737" indent="-342900"/>
+            <a:endParaRPr lang="en-GB" dirty="0" smtClean="0"/>
+          </a:p>
+          <a:p>
+            <a:pPr lvl="1"/>
+            <a:endParaRPr lang="en-GB" dirty="0" smtClean="0"/>
+          </a:p>
+          <a:p>
+            <a:endParaRPr lang="en-GB" dirty="0"/>
           </a:p>
         </p:txBody>
       </p:sp>

</xml_diff>